<commit_message>
Moved XStream specific code to jutils.core.io.xs package. Updated licenses.
</commit_message>
<xml_diff>
--- a/icons/JUtilsIcons.pptx
+++ b/icons/JUtilsIcons.pptx
@@ -6,6 +6,7 @@
   </p:sldMasterIdLst>
   <p:sldIdLst>
     <p:sldId id="257" r:id="rId2"/>
+    <p:sldId id="256" r:id="rId3"/>
   </p:sldIdLst>
   <p:sldSz cx="12192000" cy="6858000"/>
   <p:notesSz cx="6858000" cy="9144000"/>
@@ -259,7 +260,7 @@
           <a:p>
             <a:fld id="{4B23F753-79FB-41FF-B056-5F6BF77DE748}" type="datetimeFigureOut">
               <a:rPr lang="en-US" smtClean="0"/>
-              <a:t>4/14/2020</a:t>
+              <a:t>4/15/2020</a:t>
             </a:fld>
             <a:endParaRPr lang="en-US"/>
           </a:p>
@@ -457,7 +458,7 @@
           <a:p>
             <a:fld id="{4B23F753-79FB-41FF-B056-5F6BF77DE748}" type="datetimeFigureOut">
               <a:rPr lang="en-US" smtClean="0"/>
-              <a:t>4/14/2020</a:t>
+              <a:t>4/15/2020</a:t>
             </a:fld>
             <a:endParaRPr lang="en-US"/>
           </a:p>
@@ -665,7 +666,7 @@
           <a:p>
             <a:fld id="{4B23F753-79FB-41FF-B056-5F6BF77DE748}" type="datetimeFigureOut">
               <a:rPr lang="en-US" smtClean="0"/>
-              <a:t>4/14/2020</a:t>
+              <a:t>4/15/2020</a:t>
             </a:fld>
             <a:endParaRPr lang="en-US"/>
           </a:p>
@@ -863,7 +864,7 @@
           <a:p>
             <a:fld id="{4B23F753-79FB-41FF-B056-5F6BF77DE748}" type="datetimeFigureOut">
               <a:rPr lang="en-US" smtClean="0"/>
-              <a:t>4/14/2020</a:t>
+              <a:t>4/15/2020</a:t>
             </a:fld>
             <a:endParaRPr lang="en-US"/>
           </a:p>
@@ -1138,7 +1139,7 @@
           <a:p>
             <a:fld id="{4B23F753-79FB-41FF-B056-5F6BF77DE748}" type="datetimeFigureOut">
               <a:rPr lang="en-US" smtClean="0"/>
-              <a:t>4/14/2020</a:t>
+              <a:t>4/15/2020</a:t>
             </a:fld>
             <a:endParaRPr lang="en-US"/>
           </a:p>
@@ -1403,7 +1404,7 @@
           <a:p>
             <a:fld id="{4B23F753-79FB-41FF-B056-5F6BF77DE748}" type="datetimeFigureOut">
               <a:rPr lang="en-US" smtClean="0"/>
-              <a:t>4/14/2020</a:t>
+              <a:t>4/15/2020</a:t>
             </a:fld>
             <a:endParaRPr lang="en-US"/>
           </a:p>
@@ -1815,7 +1816,7 @@
           <a:p>
             <a:fld id="{4B23F753-79FB-41FF-B056-5F6BF77DE748}" type="datetimeFigureOut">
               <a:rPr lang="en-US" smtClean="0"/>
-              <a:t>4/14/2020</a:t>
+              <a:t>4/15/2020</a:t>
             </a:fld>
             <a:endParaRPr lang="en-US"/>
           </a:p>
@@ -1956,7 +1957,7 @@
           <a:p>
             <a:fld id="{4B23F753-79FB-41FF-B056-5F6BF77DE748}" type="datetimeFigureOut">
               <a:rPr lang="en-US" smtClean="0"/>
-              <a:t>4/14/2020</a:t>
+              <a:t>4/15/2020</a:t>
             </a:fld>
             <a:endParaRPr lang="en-US"/>
           </a:p>
@@ -2069,7 +2070,7 @@
           <a:p>
             <a:fld id="{4B23F753-79FB-41FF-B056-5F6BF77DE748}" type="datetimeFigureOut">
               <a:rPr lang="en-US" smtClean="0"/>
-              <a:t>4/14/2020</a:t>
+              <a:t>4/15/2020</a:t>
             </a:fld>
             <a:endParaRPr lang="en-US"/>
           </a:p>
@@ -2446,7 +2447,7 @@
           <a:p>
             <a:fld id="{4B23F753-79FB-41FF-B056-5F6BF77DE748}" type="datetimeFigureOut">
               <a:rPr lang="en-US" smtClean="0"/>
-              <a:t>4/14/2020</a:t>
+              <a:t>4/15/2020</a:t>
             </a:fld>
             <a:endParaRPr lang="en-US"/>
           </a:p>
@@ -2734,7 +2735,7 @@
           <a:p>
             <a:fld id="{4B23F753-79FB-41FF-B056-5F6BF77DE748}" type="datetimeFigureOut">
               <a:rPr lang="en-US" smtClean="0"/>
-              <a:t>4/14/2020</a:t>
+              <a:t>4/15/2020</a:t>
             </a:fld>
             <a:endParaRPr lang="en-US"/>
           </a:p>
@@ -2975,7 +2976,7 @@
           <a:p>
             <a:fld id="{4B23F753-79FB-41FF-B056-5F6BF77DE748}" type="datetimeFigureOut">
               <a:rPr lang="en-US" smtClean="0"/>
-              <a:t>4/14/2020</a:t>
+              <a:t>4/15/2020</a:t>
             </a:fld>
             <a:endParaRPr lang="en-US"/>
           </a:p>
@@ -3598,6 +3599,225 @@
 </p:sld>
 </file>
 
+<file path=ppt/slides/slide2.xml><?xml version="1.0" encoding="utf-8"?>
+<p:sld xmlns:a="http://schemas.openxmlformats.org/drawingml/2006/main" xmlns:r="http://schemas.openxmlformats.org/officeDocument/2006/relationships" xmlns:p="http://schemas.openxmlformats.org/presentationml/2006/main">
+  <p:cSld>
+    <p:spTree>
+      <p:nvGrpSpPr>
+        <p:cNvPr id="1" name=""/>
+        <p:cNvGrpSpPr/>
+        <p:nvPr/>
+      </p:nvGrpSpPr>
+      <p:grpSpPr>
+        <a:xfrm>
+          <a:off x="0" y="0"/>
+          <a:ext cx="0" cy="0"/>
+          <a:chOff x="0" y="0"/>
+          <a:chExt cx="0" cy="0"/>
+        </a:xfrm>
+      </p:grpSpPr>
+      <p:grpSp>
+        <p:nvGrpSpPr>
+          <p:cNvPr id="11" name="Group 10">
+            <a:extLst>
+              <a:ext uri="{FF2B5EF4-FFF2-40B4-BE49-F238E27FC236}">
+                <a16:creationId xmlns:a16="http://schemas.microsoft.com/office/drawing/2014/main" id="{BF3B4FEB-C822-4177-86F3-580C52682AAE}"/>
+              </a:ext>
+            </a:extLst>
+          </p:cNvPr>
+          <p:cNvGrpSpPr/>
+          <p:nvPr/>
+        </p:nvGrpSpPr>
+        <p:grpSpPr>
+          <a:xfrm>
+            <a:off x="6905625" y="327328"/>
+            <a:ext cx="2457450" cy="3062377"/>
+            <a:chOff x="6905625" y="327328"/>
+            <a:chExt cx="2457450" cy="3062377"/>
+          </a:xfrm>
+        </p:grpSpPr>
+        <p:sp>
+          <p:nvSpPr>
+            <p:cNvPr id="10" name="Oval 9">
+              <a:extLst>
+                <a:ext uri="{FF2B5EF4-FFF2-40B4-BE49-F238E27FC236}">
+                  <a16:creationId xmlns:a16="http://schemas.microsoft.com/office/drawing/2014/main" id="{B143715D-A67F-4457-8F79-3EC181306EDF}"/>
+                </a:ext>
+              </a:extLst>
+            </p:cNvPr>
+            <p:cNvSpPr/>
+            <p:nvPr/>
+          </p:nvSpPr>
+          <p:spPr>
+            <a:xfrm>
+              <a:off x="6905625" y="628649"/>
+              <a:ext cx="2457450" cy="2459736"/>
+            </a:xfrm>
+            <a:prstGeom prst="ellipse">
+              <a:avLst/>
+            </a:prstGeom>
+            <a:gradFill flip="none" rotWithShape="1">
+              <a:gsLst>
+                <a:gs pos="0">
+                  <a:srgbClr val="3379B9">
+                    <a:shade val="30000"/>
+                    <a:satMod val="115000"/>
+                  </a:srgbClr>
+                </a:gs>
+                <a:gs pos="50000">
+                  <a:srgbClr val="3379B9">
+                    <a:shade val="67500"/>
+                    <a:satMod val="115000"/>
+                  </a:srgbClr>
+                </a:gs>
+                <a:gs pos="100000">
+                  <a:srgbClr val="3379B9">
+                    <a:shade val="100000"/>
+                    <a:satMod val="115000"/>
+                  </a:srgbClr>
+                </a:gs>
+              </a:gsLst>
+              <a:lin ang="16200000" scaled="1"/>
+              <a:tileRect/>
+            </a:gradFill>
+            <a:effectLst>
+              <a:outerShdw blurRad="50800" dist="38100" dir="5400000" algn="t" rotWithShape="0">
+                <a:prstClr val="black">
+                  <a:alpha val="40000"/>
+                </a:prstClr>
+              </a:outerShdw>
+            </a:effectLst>
+            <a:scene3d>
+              <a:camera prst="orthographicFront"/>
+              <a:lightRig rig="threePt" dir="t"/>
+            </a:scene3d>
+            <a:sp3d>
+              <a:bevelT/>
+            </a:sp3d>
+          </p:spPr>
+          <p:style>
+            <a:lnRef idx="2">
+              <a:schemeClr val="accent1">
+                <a:shade val="50000"/>
+              </a:schemeClr>
+            </a:lnRef>
+            <a:fillRef idx="1">
+              <a:schemeClr val="accent1"/>
+            </a:fillRef>
+            <a:effectRef idx="0">
+              <a:schemeClr val="accent1"/>
+            </a:effectRef>
+            <a:fontRef idx="minor">
+              <a:schemeClr val="lt1"/>
+            </a:fontRef>
+          </p:style>
+          <p:txBody>
+            <a:bodyPr rtlCol="0" anchor="ctr"/>
+            <a:lstStyle/>
+            <a:p>
+              <a:pPr algn="ctr"/>
+              <a:endParaRPr lang="en-US"/>
+            </a:p>
+          </p:txBody>
+        </p:sp>
+        <p:sp>
+          <p:nvSpPr>
+            <p:cNvPr id="6" name="TextBox 5">
+              <a:extLst>
+                <a:ext uri="{FF2B5EF4-FFF2-40B4-BE49-F238E27FC236}">
+                  <a16:creationId xmlns:a16="http://schemas.microsoft.com/office/drawing/2014/main" id="{722DAF17-96CC-4379-97AB-22625EA7F280}"/>
+                </a:ext>
+              </a:extLst>
+            </p:cNvPr>
+            <p:cNvSpPr txBox="1"/>
+            <p:nvPr/>
+          </p:nvSpPr>
+          <p:spPr>
+            <a:xfrm>
+              <a:off x="7515883" y="327328"/>
+              <a:ext cx="1418658" cy="3062377"/>
+            </a:xfrm>
+            <a:prstGeom prst="rect">
+              <a:avLst/>
+            </a:prstGeom>
+            <a:noFill/>
+          </p:spPr>
+          <p:txBody>
+            <a:bodyPr wrap="none" lIns="0" tIns="0" rIns="0" bIns="0" rtlCol="0">
+              <a:spAutoFit/>
+              <a:scene3d>
+                <a:camera prst="orthographicFront"/>
+                <a:lightRig rig="threePt" dir="t"/>
+              </a:scene3d>
+              <a:sp3d extrusionH="57150">
+                <a:bevelT w="38100" h="38100"/>
+              </a:sp3d>
+            </a:bodyPr>
+            <a:lstStyle/>
+            <a:p>
+              <a:r>
+                <a:rPr lang="en-US" sz="19900" b="1" dirty="0">
+                  <a:solidFill>
+                    <a:schemeClr val="bg1"/>
+                  </a:solidFill>
+                  <a:effectLst>
+                    <a:outerShdw blurRad="50800" dist="38100" dir="2700000" algn="tl" rotWithShape="0">
+                      <a:prstClr val="black">
+                        <a:alpha val="40000"/>
+                      </a:prstClr>
+                    </a:outerShdw>
+                  </a:effectLst>
+                  <a:latin typeface="Arial" panose="020B0604020202020204" pitchFamily="34" charset="0"/>
+                  <a:cs typeface="Arial" panose="020B0604020202020204" pitchFamily="34" charset="0"/>
+                </a:rPr>
+                <a:t>J</a:t>
+              </a:r>
+            </a:p>
+          </p:txBody>
+        </p:sp>
+      </p:grpSp>
+      <p:pic>
+        <p:nvPicPr>
+          <p:cNvPr id="12" name="Picture 11">
+            <a:extLst>
+              <a:ext uri="{FF2B5EF4-FFF2-40B4-BE49-F238E27FC236}">
+                <a16:creationId xmlns:a16="http://schemas.microsoft.com/office/drawing/2014/main" id="{12058FD0-44C3-48E9-A8A0-15EB57C06E08}"/>
+              </a:ext>
+            </a:extLst>
+          </p:cNvPr>
+          <p:cNvPicPr>
+            <a:picLocks noChangeAspect="1"/>
+          </p:cNvPicPr>
+          <p:nvPr/>
+        </p:nvPicPr>
+        <p:blipFill rotWithShape="1">
+          <a:blip r:embed="rId2"/>
+          <a:srcRect t="7672" b="7882"/>
+          <a:stretch/>
+        </p:blipFill>
+        <p:spPr>
+          <a:xfrm>
+            <a:off x="4794391" y="2133600"/>
+            <a:ext cx="2603218" cy="2584433"/>
+          </a:xfrm>
+          <a:prstGeom prst="rect">
+            <a:avLst/>
+          </a:prstGeom>
+        </p:spPr>
+      </p:pic>
+    </p:spTree>
+    <p:extLst>
+      <p:ext uri="{BB962C8B-B14F-4D97-AF65-F5344CB8AC3E}">
+        <p14:creationId xmlns:p14="http://schemas.microsoft.com/office/powerpoint/2010/main" val="3981854064"/>
+      </p:ext>
+    </p:extLst>
+  </p:cSld>
+  <p:clrMapOvr>
+    <a:masterClrMapping/>
+  </p:clrMapOvr>
+</p:sld>
+</file>
+
 <file path=ppt/theme/theme1.xml><?xml version="1.0" encoding="utf-8"?>
 <a:theme xmlns:a="http://schemas.openxmlformats.org/drawingml/2006/main" name="Office Theme">
   <a:themeElements>

</xml_diff>

<commit_message>
Initial commit of hexinator and iris. Added Crc16 and Crc32.
</commit_message>
<xml_diff>
--- a/icons/JUtilsIcons.pptx
+++ b/icons/JUtilsIcons.pptx
@@ -7,6 +7,7 @@
   <p:sldIdLst>
     <p:sldId id="257" r:id="rId2"/>
     <p:sldId id="256" r:id="rId3"/>
+    <p:sldId id="258" r:id="rId4"/>
   </p:sldIdLst>
   <p:sldSz cx="12192000" cy="6858000"/>
   <p:notesSz cx="6858000" cy="9144000"/>
@@ -260,7 +261,7 @@
           <a:p>
             <a:fld id="{4B23F753-79FB-41FF-B056-5F6BF77DE748}" type="datetimeFigureOut">
               <a:rPr lang="en-US" smtClean="0"/>
-              <a:t>4/15/2020</a:t>
+              <a:t>12/17/2023</a:t>
             </a:fld>
             <a:endParaRPr lang="en-US"/>
           </a:p>
@@ -458,7 +459,7 @@
           <a:p>
             <a:fld id="{4B23F753-79FB-41FF-B056-5F6BF77DE748}" type="datetimeFigureOut">
               <a:rPr lang="en-US" smtClean="0"/>
-              <a:t>4/15/2020</a:t>
+              <a:t>12/17/2023</a:t>
             </a:fld>
             <a:endParaRPr lang="en-US"/>
           </a:p>
@@ -666,7 +667,7 @@
           <a:p>
             <a:fld id="{4B23F753-79FB-41FF-B056-5F6BF77DE748}" type="datetimeFigureOut">
               <a:rPr lang="en-US" smtClean="0"/>
-              <a:t>4/15/2020</a:t>
+              <a:t>12/17/2023</a:t>
             </a:fld>
             <a:endParaRPr lang="en-US"/>
           </a:p>
@@ -864,7 +865,7 @@
           <a:p>
             <a:fld id="{4B23F753-79FB-41FF-B056-5F6BF77DE748}" type="datetimeFigureOut">
               <a:rPr lang="en-US" smtClean="0"/>
-              <a:t>4/15/2020</a:t>
+              <a:t>12/17/2023</a:t>
             </a:fld>
             <a:endParaRPr lang="en-US"/>
           </a:p>
@@ -1139,7 +1140,7 @@
           <a:p>
             <a:fld id="{4B23F753-79FB-41FF-B056-5F6BF77DE748}" type="datetimeFigureOut">
               <a:rPr lang="en-US" smtClean="0"/>
-              <a:t>4/15/2020</a:t>
+              <a:t>12/17/2023</a:t>
             </a:fld>
             <a:endParaRPr lang="en-US"/>
           </a:p>
@@ -1404,7 +1405,7 @@
           <a:p>
             <a:fld id="{4B23F753-79FB-41FF-B056-5F6BF77DE748}" type="datetimeFigureOut">
               <a:rPr lang="en-US" smtClean="0"/>
-              <a:t>4/15/2020</a:t>
+              <a:t>12/17/2023</a:t>
             </a:fld>
             <a:endParaRPr lang="en-US"/>
           </a:p>
@@ -1816,7 +1817,7 @@
           <a:p>
             <a:fld id="{4B23F753-79FB-41FF-B056-5F6BF77DE748}" type="datetimeFigureOut">
               <a:rPr lang="en-US" smtClean="0"/>
-              <a:t>4/15/2020</a:t>
+              <a:t>12/17/2023</a:t>
             </a:fld>
             <a:endParaRPr lang="en-US"/>
           </a:p>
@@ -1957,7 +1958,7 @@
           <a:p>
             <a:fld id="{4B23F753-79FB-41FF-B056-5F6BF77DE748}" type="datetimeFigureOut">
               <a:rPr lang="en-US" smtClean="0"/>
-              <a:t>4/15/2020</a:t>
+              <a:t>12/17/2023</a:t>
             </a:fld>
             <a:endParaRPr lang="en-US"/>
           </a:p>
@@ -2070,7 +2071,7 @@
           <a:p>
             <a:fld id="{4B23F753-79FB-41FF-B056-5F6BF77DE748}" type="datetimeFigureOut">
               <a:rPr lang="en-US" smtClean="0"/>
-              <a:t>4/15/2020</a:t>
+              <a:t>12/17/2023</a:t>
             </a:fld>
             <a:endParaRPr lang="en-US"/>
           </a:p>
@@ -2447,7 +2448,7 @@
           <a:p>
             <a:fld id="{4B23F753-79FB-41FF-B056-5F6BF77DE748}" type="datetimeFigureOut">
               <a:rPr lang="en-US" smtClean="0"/>
-              <a:t>4/15/2020</a:t>
+              <a:t>12/17/2023</a:t>
             </a:fld>
             <a:endParaRPr lang="en-US"/>
           </a:p>
@@ -2735,7 +2736,7 @@
           <a:p>
             <a:fld id="{4B23F753-79FB-41FF-B056-5F6BF77DE748}" type="datetimeFigureOut">
               <a:rPr lang="en-US" smtClean="0"/>
-              <a:t>4/15/2020</a:t>
+              <a:t>12/17/2023</a:t>
             </a:fld>
             <a:endParaRPr lang="en-US"/>
           </a:p>
@@ -2976,7 +2977,7 @@
           <a:p>
             <a:fld id="{4B23F753-79FB-41FF-B056-5F6BF77DE748}" type="datetimeFigureOut">
               <a:rPr lang="en-US" smtClean="0"/>
-              <a:t>4/15/2020</a:t>
+              <a:t>12/17/2023</a:t>
             </a:fld>
             <a:endParaRPr lang="en-US"/>
           </a:p>
@@ -3818,6 +3819,341 @@
 </p:sld>
 </file>
 
+<file path=ppt/slides/slide3.xml><?xml version="1.0" encoding="utf-8"?>
+<p:sld xmlns:a="http://schemas.openxmlformats.org/drawingml/2006/main" xmlns:r="http://schemas.openxmlformats.org/officeDocument/2006/relationships" xmlns:p="http://schemas.openxmlformats.org/presentationml/2006/main">
+  <p:cSld>
+    <p:spTree>
+      <p:nvGrpSpPr>
+        <p:cNvPr id="1" name=""/>
+        <p:cNvGrpSpPr/>
+        <p:nvPr/>
+      </p:nvGrpSpPr>
+      <p:grpSpPr>
+        <a:xfrm>
+          <a:off x="0" y="0"/>
+          <a:ext cx="0" cy="0"/>
+          <a:chOff x="0" y="0"/>
+          <a:chExt cx="0" cy="0"/>
+        </a:xfrm>
+      </p:grpSpPr>
+      <p:grpSp>
+        <p:nvGrpSpPr>
+          <p:cNvPr id="6" name="Group 5">
+            <a:extLst>
+              <a:ext uri="{FF2B5EF4-FFF2-40B4-BE49-F238E27FC236}">
+                <a16:creationId xmlns:a16="http://schemas.microsoft.com/office/drawing/2014/main" id="{7FE132DB-9BDD-FB83-3E43-0B0C0D6B2F39}"/>
+              </a:ext>
+            </a:extLst>
+          </p:cNvPr>
+          <p:cNvGrpSpPr/>
+          <p:nvPr/>
+        </p:nvGrpSpPr>
+        <p:grpSpPr>
+          <a:xfrm>
+            <a:off x="4048816" y="1742877"/>
+            <a:ext cx="4966259" cy="4130863"/>
+            <a:chOff x="4048816" y="1742877"/>
+            <a:chExt cx="4966259" cy="4130863"/>
+          </a:xfrm>
+        </p:grpSpPr>
+        <p:sp>
+          <p:nvSpPr>
+            <p:cNvPr id="3" name="Oval 2">
+              <a:extLst>
+                <a:ext uri="{FF2B5EF4-FFF2-40B4-BE49-F238E27FC236}">
+                  <a16:creationId xmlns:a16="http://schemas.microsoft.com/office/drawing/2014/main" id="{4C39A413-F92E-7503-0760-3FC1BE7F694B}"/>
+                </a:ext>
+              </a:extLst>
+            </p:cNvPr>
+            <p:cNvSpPr/>
+            <p:nvPr/>
+          </p:nvSpPr>
+          <p:spPr>
+            <a:xfrm rot="2700000">
+              <a:off x="3599189" y="4062193"/>
+              <a:ext cx="2544793" cy="1078302"/>
+            </a:xfrm>
+            <a:prstGeom prst="ellipse">
+              <a:avLst/>
+            </a:prstGeom>
+            <a:ln w="28575"/>
+          </p:spPr>
+          <p:style>
+            <a:lnRef idx="2">
+              <a:schemeClr val="accent1">
+                <a:shade val="15000"/>
+              </a:schemeClr>
+            </a:lnRef>
+            <a:fillRef idx="1">
+              <a:schemeClr val="accent1"/>
+            </a:fillRef>
+            <a:effectRef idx="0">
+              <a:schemeClr val="accent1"/>
+            </a:effectRef>
+            <a:fontRef idx="minor">
+              <a:schemeClr val="lt1"/>
+            </a:fontRef>
+          </p:style>
+          <p:txBody>
+            <a:bodyPr rtlCol="0" anchor="ctr"/>
+            <a:lstStyle/>
+            <a:p>
+              <a:pPr algn="ctr"/>
+              <a:endParaRPr lang="en-US"/>
+            </a:p>
+          </p:txBody>
+        </p:sp>
+        <p:sp>
+          <p:nvSpPr>
+            <p:cNvPr id="4" name="Arrow: Up 3">
+              <a:extLst>
+                <a:ext uri="{FF2B5EF4-FFF2-40B4-BE49-F238E27FC236}">
+                  <a16:creationId xmlns:a16="http://schemas.microsoft.com/office/drawing/2014/main" id="{7F92E268-630E-5A76-253D-63030C9FFCA7}"/>
+                </a:ext>
+              </a:extLst>
+            </p:cNvPr>
+            <p:cNvSpPr/>
+            <p:nvPr/>
+          </p:nvSpPr>
+          <p:spPr>
+            <a:xfrm rot="2700000">
+              <a:off x="5291879" y="499814"/>
+              <a:ext cx="2480133" cy="4966259"/>
+            </a:xfrm>
+            <a:prstGeom prst="upArrow">
+              <a:avLst/>
+            </a:prstGeom>
+            <a:solidFill>
+              <a:srgbClr val="4380BD"/>
+            </a:solidFill>
+            <a:ln w="28575">
+              <a:solidFill>
+                <a:schemeClr val="tx1">
+                  <a:lumMod val="85000"/>
+                  <a:lumOff val="15000"/>
+                </a:schemeClr>
+              </a:solidFill>
+            </a:ln>
+          </p:spPr>
+          <p:style>
+            <a:lnRef idx="2">
+              <a:schemeClr val="accent1">
+                <a:shade val="15000"/>
+              </a:schemeClr>
+            </a:lnRef>
+            <a:fillRef idx="1">
+              <a:schemeClr val="accent1"/>
+            </a:fillRef>
+            <a:effectRef idx="0">
+              <a:schemeClr val="accent1"/>
+            </a:effectRef>
+            <a:fontRef idx="minor">
+              <a:schemeClr val="lt1"/>
+            </a:fontRef>
+          </p:style>
+          <p:txBody>
+            <a:bodyPr rtlCol="0" anchor="ctr"/>
+            <a:lstStyle/>
+            <a:p>
+              <a:pPr algn="ctr"/>
+              <a:endParaRPr lang="en-US"/>
+            </a:p>
+          </p:txBody>
+        </p:sp>
+      </p:grpSp>
+      <p:sp>
+        <p:nvSpPr>
+          <p:cNvPr id="5" name="Title 5">
+            <a:extLst>
+              <a:ext uri="{FF2B5EF4-FFF2-40B4-BE49-F238E27FC236}">
+                <a16:creationId xmlns:a16="http://schemas.microsoft.com/office/drawing/2014/main" id="{3A3B9CBE-C5F1-552D-444D-A87ABCB8E24C}"/>
+              </a:ext>
+            </a:extLst>
+          </p:cNvPr>
+          <p:cNvSpPr txBox="1">
+            <a:spLocks/>
+          </p:cNvSpPr>
+          <p:nvPr/>
+        </p:nvSpPr>
+        <p:spPr>
+          <a:xfrm>
+            <a:off x="101600" y="136526"/>
+            <a:ext cx="11988802" cy="639330"/>
+          </a:xfrm>
+          <a:prstGeom prst="rect">
+            <a:avLst/>
+          </a:prstGeom>
+        </p:spPr>
+        <p:txBody>
+          <a:bodyPr>
+            <a:normAutofit fontScale="90000" lnSpcReduction="10000"/>
+          </a:bodyPr>
+          <a:lstStyle>
+            <a:lvl1pPr algn="l" defTabSz="914400" rtl="0" eaLnBrk="1" latinLnBrk="0" hangingPunct="1">
+              <a:lnSpc>
+                <a:spcPct val="90000"/>
+              </a:lnSpc>
+              <a:spcBef>
+                <a:spcPct val="0"/>
+              </a:spcBef>
+              <a:buNone/>
+              <a:defRPr sz="4400" kern="1200">
+                <a:solidFill>
+                  <a:schemeClr val="tx1"/>
+                </a:solidFill>
+                <a:latin typeface="+mj-lt"/>
+                <a:ea typeface="+mj-ea"/>
+                <a:cs typeface="+mj-cs"/>
+              </a:defRPr>
+            </a:lvl1pPr>
+          </a:lstStyle>
+          <a:p>
+            <a:r>
+              <a:rPr lang="en-US"/>
+              <a:t>JLauncher</a:t>
+            </a:r>
+            <a:endParaRPr lang="en-US" dirty="0"/>
+          </a:p>
+        </p:txBody>
+      </p:sp>
+      <p:grpSp>
+        <p:nvGrpSpPr>
+          <p:cNvPr id="7" name="Group 6">
+            <a:extLst>
+              <a:ext uri="{FF2B5EF4-FFF2-40B4-BE49-F238E27FC236}">
+                <a16:creationId xmlns:a16="http://schemas.microsoft.com/office/drawing/2014/main" id="{C7341047-3EA1-6A4C-7C43-CB633C946C9E}"/>
+              </a:ext>
+            </a:extLst>
+          </p:cNvPr>
+          <p:cNvGrpSpPr/>
+          <p:nvPr/>
+        </p:nvGrpSpPr>
+        <p:grpSpPr>
+          <a:xfrm>
+            <a:off x="8851769" y="5763540"/>
+            <a:ext cx="315706" cy="262600"/>
+            <a:chOff x="4048816" y="1742877"/>
+            <a:chExt cx="4966259" cy="4130863"/>
+          </a:xfrm>
+        </p:grpSpPr>
+        <p:sp>
+          <p:nvSpPr>
+            <p:cNvPr id="8" name="Oval 7">
+              <a:extLst>
+                <a:ext uri="{FF2B5EF4-FFF2-40B4-BE49-F238E27FC236}">
+                  <a16:creationId xmlns:a16="http://schemas.microsoft.com/office/drawing/2014/main" id="{3DF92CBB-5571-C496-D092-C20B2C629A54}"/>
+                </a:ext>
+              </a:extLst>
+            </p:cNvPr>
+            <p:cNvSpPr/>
+            <p:nvPr/>
+          </p:nvSpPr>
+          <p:spPr>
+            <a:xfrm rot="2700000">
+              <a:off x="3599189" y="4062193"/>
+              <a:ext cx="2544793" cy="1078302"/>
+            </a:xfrm>
+            <a:prstGeom prst="ellipse">
+              <a:avLst/>
+            </a:prstGeom>
+            <a:ln w="9525"/>
+          </p:spPr>
+          <p:style>
+            <a:lnRef idx="2">
+              <a:schemeClr val="accent1">
+                <a:shade val="15000"/>
+              </a:schemeClr>
+            </a:lnRef>
+            <a:fillRef idx="1">
+              <a:schemeClr val="accent1"/>
+            </a:fillRef>
+            <a:effectRef idx="0">
+              <a:schemeClr val="accent1"/>
+            </a:effectRef>
+            <a:fontRef idx="minor">
+              <a:schemeClr val="lt1"/>
+            </a:fontRef>
+          </p:style>
+          <p:txBody>
+            <a:bodyPr rtlCol="0" anchor="ctr"/>
+            <a:lstStyle/>
+            <a:p>
+              <a:pPr algn="ctr"/>
+              <a:endParaRPr lang="en-US"/>
+            </a:p>
+          </p:txBody>
+        </p:sp>
+        <p:sp>
+          <p:nvSpPr>
+            <p:cNvPr id="9" name="Arrow: Up 8">
+              <a:extLst>
+                <a:ext uri="{FF2B5EF4-FFF2-40B4-BE49-F238E27FC236}">
+                  <a16:creationId xmlns:a16="http://schemas.microsoft.com/office/drawing/2014/main" id="{5D58227C-C6EE-8CA8-A6F6-BF1D69D13C87}"/>
+                </a:ext>
+              </a:extLst>
+            </p:cNvPr>
+            <p:cNvSpPr/>
+            <p:nvPr/>
+          </p:nvSpPr>
+          <p:spPr>
+            <a:xfrm rot="2700000">
+              <a:off x="5291879" y="499814"/>
+              <a:ext cx="2480133" cy="4966259"/>
+            </a:xfrm>
+            <a:prstGeom prst="upArrow">
+              <a:avLst/>
+            </a:prstGeom>
+            <a:solidFill>
+              <a:srgbClr val="4380BD"/>
+            </a:solidFill>
+            <a:ln w="9525">
+              <a:solidFill>
+                <a:schemeClr val="tx1">
+                  <a:lumMod val="85000"/>
+                  <a:lumOff val="15000"/>
+                </a:schemeClr>
+              </a:solidFill>
+            </a:ln>
+          </p:spPr>
+          <p:style>
+            <a:lnRef idx="2">
+              <a:schemeClr val="accent1">
+                <a:shade val="15000"/>
+              </a:schemeClr>
+            </a:lnRef>
+            <a:fillRef idx="1">
+              <a:schemeClr val="accent1"/>
+            </a:fillRef>
+            <a:effectRef idx="0">
+              <a:schemeClr val="accent1"/>
+            </a:effectRef>
+            <a:fontRef idx="minor">
+              <a:schemeClr val="lt1"/>
+            </a:fontRef>
+          </p:style>
+          <p:txBody>
+            <a:bodyPr rtlCol="0" anchor="ctr"/>
+            <a:lstStyle/>
+            <a:p>
+              <a:pPr algn="ctr"/>
+              <a:endParaRPr lang="en-US"/>
+            </a:p>
+          </p:txBody>
+        </p:sp>
+      </p:grpSp>
+    </p:spTree>
+    <p:extLst>
+      <p:ext uri="{BB962C8B-B14F-4D97-AF65-F5344CB8AC3E}">
+        <p14:creationId xmlns:p14="http://schemas.microsoft.com/office/powerpoint/2010/main" val="2837681297"/>
+      </p:ext>
+    </p:extLst>
+  </p:cSld>
+  <p:clrMapOvr>
+    <a:masterClrMapping/>
+  </p:clrMapOvr>
+</p:sld>
+</file>
+
 <file path=ppt/theme/theme1.xml><?xml version="1.0" encoding="utf-8"?>
 <a:theme xmlns:a="http://schemas.openxmlformats.org/drawingml/2006/main" name="Office Theme">
   <a:themeElements>

</xml_diff>

<commit_message>
Added icons. Added ConsumerTask.startAcceptingInput() and called where appropriate.
</commit_message>
<xml_diff>
--- a/icons/JUtilsIcons.pptx
+++ b/icons/JUtilsIcons.pptx
@@ -8,6 +8,9 @@
     <p:sldId id="257" r:id="rId2"/>
     <p:sldId id="256" r:id="rId3"/>
     <p:sldId id="258" r:id="rId4"/>
+    <p:sldId id="259" r:id="rId5"/>
+    <p:sldId id="260" r:id="rId6"/>
+    <p:sldId id="261" r:id="rId7"/>
   </p:sldIdLst>
   <p:sldSz cx="12192000" cy="6858000"/>
   <p:notesSz cx="6858000" cy="9144000"/>
@@ -261,7 +264,7 @@
           <a:p>
             <a:fld id="{4B23F753-79FB-41FF-B056-5F6BF77DE748}" type="datetimeFigureOut">
               <a:rPr lang="en-US" smtClean="0"/>
-              <a:t>12/17/2023</a:t>
+              <a:t>1/24/2024</a:t>
             </a:fld>
             <a:endParaRPr lang="en-US"/>
           </a:p>
@@ -335,6 +338,605 @@
 </file>
 
 <file path=ppt/slideLayouts/slideLayout10.xml><?xml version="1.0" encoding="utf-8"?>
+<p:sldLayout xmlns:a="http://schemas.openxmlformats.org/drawingml/2006/main" xmlns:r="http://schemas.openxmlformats.org/officeDocument/2006/relationships" xmlns:p="http://schemas.openxmlformats.org/presentationml/2006/main" type="objTx" preserve="1">
+  <p:cSld name="Content with Caption">
+    <p:spTree>
+      <p:nvGrpSpPr>
+        <p:cNvPr id="1" name=""/>
+        <p:cNvGrpSpPr/>
+        <p:nvPr/>
+      </p:nvGrpSpPr>
+      <p:grpSpPr>
+        <a:xfrm>
+          <a:off x="0" y="0"/>
+          <a:ext cx="0" cy="0"/>
+          <a:chOff x="0" y="0"/>
+          <a:chExt cx="0" cy="0"/>
+        </a:xfrm>
+      </p:grpSpPr>
+      <p:sp>
+        <p:nvSpPr>
+          <p:cNvPr id="2" name="Title 1">
+            <a:extLst>
+              <a:ext uri="{FF2B5EF4-FFF2-40B4-BE49-F238E27FC236}">
+                <a16:creationId xmlns:a16="http://schemas.microsoft.com/office/drawing/2014/main" id="{4C02AD79-0628-48F8-96FD-8DC1046A3DD3}"/>
+              </a:ext>
+            </a:extLst>
+          </p:cNvPr>
+          <p:cNvSpPr>
+            <a:spLocks noGrp="1"/>
+          </p:cNvSpPr>
+          <p:nvPr>
+            <p:ph type="title"/>
+          </p:nvPr>
+        </p:nvSpPr>
+        <p:spPr>
+          <a:xfrm>
+            <a:off x="839788" y="457200"/>
+            <a:ext cx="3932237" cy="1600200"/>
+          </a:xfrm>
+        </p:spPr>
+        <p:txBody>
+          <a:bodyPr anchor="b"/>
+          <a:lstStyle>
+            <a:lvl1pPr>
+              <a:defRPr sz="3200"/>
+            </a:lvl1pPr>
+          </a:lstStyle>
+          <a:p>
+            <a:r>
+              <a:rPr lang="en-US"/>
+              <a:t>Click to edit Master title style</a:t>
+            </a:r>
+          </a:p>
+        </p:txBody>
+      </p:sp>
+      <p:sp>
+        <p:nvSpPr>
+          <p:cNvPr id="3" name="Content Placeholder 2">
+            <a:extLst>
+              <a:ext uri="{FF2B5EF4-FFF2-40B4-BE49-F238E27FC236}">
+                <a16:creationId xmlns:a16="http://schemas.microsoft.com/office/drawing/2014/main" id="{1ED1F7CD-C81C-4821-A422-8C24E99556D4}"/>
+              </a:ext>
+            </a:extLst>
+          </p:cNvPr>
+          <p:cNvSpPr>
+            <a:spLocks noGrp="1"/>
+          </p:cNvSpPr>
+          <p:nvPr>
+            <p:ph idx="1"/>
+          </p:nvPr>
+        </p:nvSpPr>
+        <p:spPr>
+          <a:xfrm>
+            <a:off x="5183188" y="987425"/>
+            <a:ext cx="6172200" cy="4873625"/>
+          </a:xfrm>
+        </p:spPr>
+        <p:txBody>
+          <a:bodyPr/>
+          <a:lstStyle>
+            <a:lvl1pPr>
+              <a:defRPr sz="3200"/>
+            </a:lvl1pPr>
+            <a:lvl2pPr>
+              <a:defRPr sz="2800"/>
+            </a:lvl2pPr>
+            <a:lvl3pPr>
+              <a:defRPr sz="2400"/>
+            </a:lvl3pPr>
+            <a:lvl4pPr>
+              <a:defRPr sz="2000"/>
+            </a:lvl4pPr>
+            <a:lvl5pPr>
+              <a:defRPr sz="2000"/>
+            </a:lvl5pPr>
+            <a:lvl6pPr>
+              <a:defRPr sz="2000"/>
+            </a:lvl6pPr>
+            <a:lvl7pPr>
+              <a:defRPr sz="2000"/>
+            </a:lvl7pPr>
+            <a:lvl8pPr>
+              <a:defRPr sz="2000"/>
+            </a:lvl8pPr>
+            <a:lvl9pPr>
+              <a:defRPr sz="2000"/>
+            </a:lvl9pPr>
+          </a:lstStyle>
+          <a:p>
+            <a:pPr lvl="0"/>
+            <a:r>
+              <a:rPr lang="en-US"/>
+              <a:t>Click to edit Master text styles</a:t>
+            </a:r>
+          </a:p>
+          <a:p>
+            <a:pPr lvl="1"/>
+            <a:r>
+              <a:rPr lang="en-US"/>
+              <a:t>Second level</a:t>
+            </a:r>
+          </a:p>
+          <a:p>
+            <a:pPr lvl="2"/>
+            <a:r>
+              <a:rPr lang="en-US"/>
+              <a:t>Third level</a:t>
+            </a:r>
+          </a:p>
+          <a:p>
+            <a:pPr lvl="3"/>
+            <a:r>
+              <a:rPr lang="en-US"/>
+              <a:t>Fourth level</a:t>
+            </a:r>
+          </a:p>
+          <a:p>
+            <a:pPr lvl="4"/>
+            <a:r>
+              <a:rPr lang="en-US"/>
+              <a:t>Fifth level</a:t>
+            </a:r>
+          </a:p>
+        </p:txBody>
+      </p:sp>
+      <p:sp>
+        <p:nvSpPr>
+          <p:cNvPr id="4" name="Text Placeholder 3">
+            <a:extLst>
+              <a:ext uri="{FF2B5EF4-FFF2-40B4-BE49-F238E27FC236}">
+                <a16:creationId xmlns:a16="http://schemas.microsoft.com/office/drawing/2014/main" id="{20CAE0F1-5669-46B3-ACC0-2FE7B9619072}"/>
+              </a:ext>
+            </a:extLst>
+          </p:cNvPr>
+          <p:cNvSpPr>
+            <a:spLocks noGrp="1"/>
+          </p:cNvSpPr>
+          <p:nvPr>
+            <p:ph type="body" sz="half" idx="2"/>
+          </p:nvPr>
+        </p:nvSpPr>
+        <p:spPr>
+          <a:xfrm>
+            <a:off x="839788" y="2057400"/>
+            <a:ext cx="3932237" cy="3811588"/>
+          </a:xfrm>
+        </p:spPr>
+        <p:txBody>
+          <a:bodyPr/>
+          <a:lstStyle>
+            <a:lvl1pPr marL="0" indent="0">
+              <a:buNone/>
+              <a:defRPr sz="1600"/>
+            </a:lvl1pPr>
+            <a:lvl2pPr marL="457200" indent="0">
+              <a:buNone/>
+              <a:defRPr sz="1400"/>
+            </a:lvl2pPr>
+            <a:lvl3pPr marL="914400" indent="0">
+              <a:buNone/>
+              <a:defRPr sz="1200"/>
+            </a:lvl3pPr>
+            <a:lvl4pPr marL="1371600" indent="0">
+              <a:buNone/>
+              <a:defRPr sz="1000"/>
+            </a:lvl4pPr>
+            <a:lvl5pPr marL="1828800" indent="0">
+              <a:buNone/>
+              <a:defRPr sz="1000"/>
+            </a:lvl5pPr>
+            <a:lvl6pPr marL="2286000" indent="0">
+              <a:buNone/>
+              <a:defRPr sz="1000"/>
+            </a:lvl6pPr>
+            <a:lvl7pPr marL="2743200" indent="0">
+              <a:buNone/>
+              <a:defRPr sz="1000"/>
+            </a:lvl7pPr>
+            <a:lvl8pPr marL="3200400" indent="0">
+              <a:buNone/>
+              <a:defRPr sz="1000"/>
+            </a:lvl8pPr>
+            <a:lvl9pPr marL="3657600" indent="0">
+              <a:buNone/>
+              <a:defRPr sz="1000"/>
+            </a:lvl9pPr>
+          </a:lstStyle>
+          <a:p>
+            <a:pPr lvl="0"/>
+            <a:r>
+              <a:rPr lang="en-US"/>
+              <a:t>Click to edit Master text styles</a:t>
+            </a:r>
+          </a:p>
+        </p:txBody>
+      </p:sp>
+      <p:sp>
+        <p:nvSpPr>
+          <p:cNvPr id="5" name="Date Placeholder 4">
+            <a:extLst>
+              <a:ext uri="{FF2B5EF4-FFF2-40B4-BE49-F238E27FC236}">
+                <a16:creationId xmlns:a16="http://schemas.microsoft.com/office/drawing/2014/main" id="{A2AAD2A3-AF58-435C-9A30-466E71828E5E}"/>
+              </a:ext>
+            </a:extLst>
+          </p:cNvPr>
+          <p:cNvSpPr>
+            <a:spLocks noGrp="1"/>
+          </p:cNvSpPr>
+          <p:nvPr>
+            <p:ph type="dt" sz="half" idx="10"/>
+          </p:nvPr>
+        </p:nvSpPr>
+        <p:spPr/>
+        <p:txBody>
+          <a:bodyPr/>
+          <a:lstStyle/>
+          <a:p>
+            <a:fld id="{4B23F753-79FB-41FF-B056-5F6BF77DE748}" type="datetimeFigureOut">
+              <a:rPr lang="en-US" smtClean="0"/>
+              <a:t>1/24/2024</a:t>
+            </a:fld>
+            <a:endParaRPr lang="en-US"/>
+          </a:p>
+        </p:txBody>
+      </p:sp>
+      <p:sp>
+        <p:nvSpPr>
+          <p:cNvPr id="6" name="Footer Placeholder 5">
+            <a:extLst>
+              <a:ext uri="{FF2B5EF4-FFF2-40B4-BE49-F238E27FC236}">
+                <a16:creationId xmlns:a16="http://schemas.microsoft.com/office/drawing/2014/main" id="{1D404FD0-EA6D-47A7-B28B-0BCE737D391A}"/>
+              </a:ext>
+            </a:extLst>
+          </p:cNvPr>
+          <p:cNvSpPr>
+            <a:spLocks noGrp="1"/>
+          </p:cNvSpPr>
+          <p:nvPr>
+            <p:ph type="ftr" sz="quarter" idx="11"/>
+          </p:nvPr>
+        </p:nvSpPr>
+        <p:spPr/>
+        <p:txBody>
+          <a:bodyPr/>
+          <a:lstStyle/>
+          <a:p>
+            <a:endParaRPr lang="en-US"/>
+          </a:p>
+        </p:txBody>
+      </p:sp>
+      <p:sp>
+        <p:nvSpPr>
+          <p:cNvPr id="7" name="Slide Number Placeholder 6">
+            <a:extLst>
+              <a:ext uri="{FF2B5EF4-FFF2-40B4-BE49-F238E27FC236}">
+                <a16:creationId xmlns:a16="http://schemas.microsoft.com/office/drawing/2014/main" id="{51AB0153-6B5C-41CA-AFBC-6901A9DAA9CD}"/>
+              </a:ext>
+            </a:extLst>
+          </p:cNvPr>
+          <p:cNvSpPr>
+            <a:spLocks noGrp="1"/>
+          </p:cNvSpPr>
+          <p:nvPr>
+            <p:ph type="sldNum" sz="quarter" idx="12"/>
+          </p:nvPr>
+        </p:nvSpPr>
+        <p:spPr/>
+        <p:txBody>
+          <a:bodyPr/>
+          <a:lstStyle/>
+          <a:p>
+            <a:fld id="{28399D25-E7A0-46ED-A17A-14974008713C}" type="slidenum">
+              <a:rPr lang="en-US" smtClean="0"/>
+              <a:t>‹#›</a:t>
+            </a:fld>
+            <a:endParaRPr lang="en-US"/>
+          </a:p>
+        </p:txBody>
+      </p:sp>
+    </p:spTree>
+    <p:extLst>
+      <p:ext uri="{BB962C8B-B14F-4D97-AF65-F5344CB8AC3E}">
+        <p14:creationId xmlns:p14="http://schemas.microsoft.com/office/powerpoint/2010/main" val="353058090"/>
+      </p:ext>
+    </p:extLst>
+  </p:cSld>
+  <p:clrMapOvr>
+    <a:masterClrMapping/>
+  </p:clrMapOvr>
+</p:sldLayout>
+</file>
+
+<file path=ppt/slideLayouts/slideLayout11.xml><?xml version="1.0" encoding="utf-8"?>
+<p:sldLayout xmlns:a="http://schemas.openxmlformats.org/drawingml/2006/main" xmlns:r="http://schemas.openxmlformats.org/officeDocument/2006/relationships" xmlns:p="http://schemas.openxmlformats.org/presentationml/2006/main" type="picTx" preserve="1">
+  <p:cSld name="Picture with Caption">
+    <p:spTree>
+      <p:nvGrpSpPr>
+        <p:cNvPr id="1" name=""/>
+        <p:cNvGrpSpPr/>
+        <p:nvPr/>
+      </p:nvGrpSpPr>
+      <p:grpSpPr>
+        <a:xfrm>
+          <a:off x="0" y="0"/>
+          <a:ext cx="0" cy="0"/>
+          <a:chOff x="0" y="0"/>
+          <a:chExt cx="0" cy="0"/>
+        </a:xfrm>
+      </p:grpSpPr>
+      <p:sp>
+        <p:nvSpPr>
+          <p:cNvPr id="2" name="Title 1">
+            <a:extLst>
+              <a:ext uri="{FF2B5EF4-FFF2-40B4-BE49-F238E27FC236}">
+                <a16:creationId xmlns:a16="http://schemas.microsoft.com/office/drawing/2014/main" id="{98D301F1-97BE-4F90-B6D7-98AC5A10DCBA}"/>
+              </a:ext>
+            </a:extLst>
+          </p:cNvPr>
+          <p:cNvSpPr>
+            <a:spLocks noGrp="1"/>
+          </p:cNvSpPr>
+          <p:nvPr>
+            <p:ph type="title"/>
+          </p:nvPr>
+        </p:nvSpPr>
+        <p:spPr>
+          <a:xfrm>
+            <a:off x="839788" y="457200"/>
+            <a:ext cx="3932237" cy="1600200"/>
+          </a:xfrm>
+        </p:spPr>
+        <p:txBody>
+          <a:bodyPr anchor="b"/>
+          <a:lstStyle>
+            <a:lvl1pPr>
+              <a:defRPr sz="3200"/>
+            </a:lvl1pPr>
+          </a:lstStyle>
+          <a:p>
+            <a:r>
+              <a:rPr lang="en-US"/>
+              <a:t>Click to edit Master title style</a:t>
+            </a:r>
+          </a:p>
+        </p:txBody>
+      </p:sp>
+      <p:sp>
+        <p:nvSpPr>
+          <p:cNvPr id="3" name="Picture Placeholder 2">
+            <a:extLst>
+              <a:ext uri="{FF2B5EF4-FFF2-40B4-BE49-F238E27FC236}">
+                <a16:creationId xmlns:a16="http://schemas.microsoft.com/office/drawing/2014/main" id="{D9189197-B16F-42D1-8527-C734EFFC860E}"/>
+              </a:ext>
+            </a:extLst>
+          </p:cNvPr>
+          <p:cNvSpPr>
+            <a:spLocks noGrp="1"/>
+          </p:cNvSpPr>
+          <p:nvPr>
+            <p:ph type="pic" idx="1"/>
+          </p:nvPr>
+        </p:nvSpPr>
+        <p:spPr>
+          <a:xfrm>
+            <a:off x="5183188" y="987425"/>
+            <a:ext cx="6172200" cy="4873625"/>
+          </a:xfrm>
+        </p:spPr>
+        <p:txBody>
+          <a:bodyPr/>
+          <a:lstStyle>
+            <a:lvl1pPr marL="0" indent="0">
+              <a:buNone/>
+              <a:defRPr sz="3200"/>
+            </a:lvl1pPr>
+            <a:lvl2pPr marL="457200" indent="0">
+              <a:buNone/>
+              <a:defRPr sz="2800"/>
+            </a:lvl2pPr>
+            <a:lvl3pPr marL="914400" indent="0">
+              <a:buNone/>
+              <a:defRPr sz="2400"/>
+            </a:lvl3pPr>
+            <a:lvl4pPr marL="1371600" indent="0">
+              <a:buNone/>
+              <a:defRPr sz="2000"/>
+            </a:lvl4pPr>
+            <a:lvl5pPr marL="1828800" indent="0">
+              <a:buNone/>
+              <a:defRPr sz="2000"/>
+            </a:lvl5pPr>
+            <a:lvl6pPr marL="2286000" indent="0">
+              <a:buNone/>
+              <a:defRPr sz="2000"/>
+            </a:lvl6pPr>
+            <a:lvl7pPr marL="2743200" indent="0">
+              <a:buNone/>
+              <a:defRPr sz="2000"/>
+            </a:lvl7pPr>
+            <a:lvl8pPr marL="3200400" indent="0">
+              <a:buNone/>
+              <a:defRPr sz="2000"/>
+            </a:lvl8pPr>
+            <a:lvl9pPr marL="3657600" indent="0">
+              <a:buNone/>
+              <a:defRPr sz="2000"/>
+            </a:lvl9pPr>
+          </a:lstStyle>
+          <a:p>
+            <a:endParaRPr lang="en-US"/>
+          </a:p>
+        </p:txBody>
+      </p:sp>
+      <p:sp>
+        <p:nvSpPr>
+          <p:cNvPr id="4" name="Text Placeholder 3">
+            <a:extLst>
+              <a:ext uri="{FF2B5EF4-FFF2-40B4-BE49-F238E27FC236}">
+                <a16:creationId xmlns:a16="http://schemas.microsoft.com/office/drawing/2014/main" id="{7C337D73-10AA-440A-8ADC-65AF0CA7286B}"/>
+              </a:ext>
+            </a:extLst>
+          </p:cNvPr>
+          <p:cNvSpPr>
+            <a:spLocks noGrp="1"/>
+          </p:cNvSpPr>
+          <p:nvPr>
+            <p:ph type="body" sz="half" idx="2"/>
+          </p:nvPr>
+        </p:nvSpPr>
+        <p:spPr>
+          <a:xfrm>
+            <a:off x="839788" y="2057400"/>
+            <a:ext cx="3932237" cy="3811588"/>
+          </a:xfrm>
+        </p:spPr>
+        <p:txBody>
+          <a:bodyPr/>
+          <a:lstStyle>
+            <a:lvl1pPr marL="0" indent="0">
+              <a:buNone/>
+              <a:defRPr sz="1600"/>
+            </a:lvl1pPr>
+            <a:lvl2pPr marL="457200" indent="0">
+              <a:buNone/>
+              <a:defRPr sz="1400"/>
+            </a:lvl2pPr>
+            <a:lvl3pPr marL="914400" indent="0">
+              <a:buNone/>
+              <a:defRPr sz="1200"/>
+            </a:lvl3pPr>
+            <a:lvl4pPr marL="1371600" indent="0">
+              <a:buNone/>
+              <a:defRPr sz="1000"/>
+            </a:lvl4pPr>
+            <a:lvl5pPr marL="1828800" indent="0">
+              <a:buNone/>
+              <a:defRPr sz="1000"/>
+            </a:lvl5pPr>
+            <a:lvl6pPr marL="2286000" indent="0">
+              <a:buNone/>
+              <a:defRPr sz="1000"/>
+            </a:lvl6pPr>
+            <a:lvl7pPr marL="2743200" indent="0">
+              <a:buNone/>
+              <a:defRPr sz="1000"/>
+            </a:lvl7pPr>
+            <a:lvl8pPr marL="3200400" indent="0">
+              <a:buNone/>
+              <a:defRPr sz="1000"/>
+            </a:lvl8pPr>
+            <a:lvl9pPr marL="3657600" indent="0">
+              <a:buNone/>
+              <a:defRPr sz="1000"/>
+            </a:lvl9pPr>
+          </a:lstStyle>
+          <a:p>
+            <a:pPr lvl="0"/>
+            <a:r>
+              <a:rPr lang="en-US"/>
+              <a:t>Click to edit Master text styles</a:t>
+            </a:r>
+          </a:p>
+        </p:txBody>
+      </p:sp>
+      <p:sp>
+        <p:nvSpPr>
+          <p:cNvPr id="5" name="Date Placeholder 4">
+            <a:extLst>
+              <a:ext uri="{FF2B5EF4-FFF2-40B4-BE49-F238E27FC236}">
+                <a16:creationId xmlns:a16="http://schemas.microsoft.com/office/drawing/2014/main" id="{EA2304FB-4594-40C5-B659-258E31904B53}"/>
+              </a:ext>
+            </a:extLst>
+          </p:cNvPr>
+          <p:cNvSpPr>
+            <a:spLocks noGrp="1"/>
+          </p:cNvSpPr>
+          <p:nvPr>
+            <p:ph type="dt" sz="half" idx="10"/>
+          </p:nvPr>
+        </p:nvSpPr>
+        <p:spPr/>
+        <p:txBody>
+          <a:bodyPr/>
+          <a:lstStyle/>
+          <a:p>
+            <a:fld id="{4B23F753-79FB-41FF-B056-5F6BF77DE748}" type="datetimeFigureOut">
+              <a:rPr lang="en-US" smtClean="0"/>
+              <a:t>1/24/2024</a:t>
+            </a:fld>
+            <a:endParaRPr lang="en-US"/>
+          </a:p>
+        </p:txBody>
+      </p:sp>
+      <p:sp>
+        <p:nvSpPr>
+          <p:cNvPr id="6" name="Footer Placeholder 5">
+            <a:extLst>
+              <a:ext uri="{FF2B5EF4-FFF2-40B4-BE49-F238E27FC236}">
+                <a16:creationId xmlns:a16="http://schemas.microsoft.com/office/drawing/2014/main" id="{C4162AB5-A424-4726-869A-88FB7D7DB4AC}"/>
+              </a:ext>
+            </a:extLst>
+          </p:cNvPr>
+          <p:cNvSpPr>
+            <a:spLocks noGrp="1"/>
+          </p:cNvSpPr>
+          <p:nvPr>
+            <p:ph type="ftr" sz="quarter" idx="11"/>
+          </p:nvPr>
+        </p:nvSpPr>
+        <p:spPr/>
+        <p:txBody>
+          <a:bodyPr/>
+          <a:lstStyle/>
+          <a:p>
+            <a:endParaRPr lang="en-US"/>
+          </a:p>
+        </p:txBody>
+      </p:sp>
+      <p:sp>
+        <p:nvSpPr>
+          <p:cNvPr id="7" name="Slide Number Placeholder 6">
+            <a:extLst>
+              <a:ext uri="{FF2B5EF4-FFF2-40B4-BE49-F238E27FC236}">
+                <a16:creationId xmlns:a16="http://schemas.microsoft.com/office/drawing/2014/main" id="{E2F4DD65-CE1E-4962-B0DB-034AED4F065E}"/>
+              </a:ext>
+            </a:extLst>
+          </p:cNvPr>
+          <p:cNvSpPr>
+            <a:spLocks noGrp="1"/>
+          </p:cNvSpPr>
+          <p:nvPr>
+            <p:ph type="sldNum" sz="quarter" idx="12"/>
+          </p:nvPr>
+        </p:nvSpPr>
+        <p:spPr/>
+        <p:txBody>
+          <a:bodyPr/>
+          <a:lstStyle/>
+          <a:p>
+            <a:fld id="{28399D25-E7A0-46ED-A17A-14974008713C}" type="slidenum">
+              <a:rPr lang="en-US" smtClean="0"/>
+              <a:t>‹#›</a:t>
+            </a:fld>
+            <a:endParaRPr lang="en-US"/>
+          </a:p>
+        </p:txBody>
+      </p:sp>
+    </p:spTree>
+    <p:extLst>
+      <p:ext uri="{BB962C8B-B14F-4D97-AF65-F5344CB8AC3E}">
+        <p14:creationId xmlns:p14="http://schemas.microsoft.com/office/powerpoint/2010/main" val="3281335597"/>
+      </p:ext>
+    </p:extLst>
+  </p:cSld>
+  <p:clrMapOvr>
+    <a:masterClrMapping/>
+  </p:clrMapOvr>
+</p:sldLayout>
+</file>
+
+<file path=ppt/slideLayouts/slideLayout12.xml><?xml version="1.0" encoding="utf-8"?>
 <p:sldLayout xmlns:a="http://schemas.openxmlformats.org/drawingml/2006/main" xmlns:r="http://schemas.openxmlformats.org/officeDocument/2006/relationships" xmlns:p="http://schemas.openxmlformats.org/presentationml/2006/main" type="vertTx" preserve="1">
   <p:cSld name="Title and Vertical Text">
     <p:spTree>
@@ -459,7 +1061,7 @@
           <a:p>
             <a:fld id="{4B23F753-79FB-41FF-B056-5F6BF77DE748}" type="datetimeFigureOut">
               <a:rPr lang="en-US" smtClean="0"/>
-              <a:t>12/17/2023</a:t>
+              <a:t>1/24/2024</a:t>
             </a:fld>
             <a:endParaRPr lang="en-US"/>
           </a:p>
@@ -532,7 +1134,7 @@
 </p:sldLayout>
 </file>
 
-<file path=ppt/slideLayouts/slideLayout11.xml><?xml version="1.0" encoding="utf-8"?>
+<file path=ppt/slideLayouts/slideLayout13.xml><?xml version="1.0" encoding="utf-8"?>
 <p:sldLayout xmlns:a="http://schemas.openxmlformats.org/drawingml/2006/main" xmlns:r="http://schemas.openxmlformats.org/officeDocument/2006/relationships" xmlns:p="http://schemas.openxmlformats.org/presentationml/2006/main" type="vertTitleAndTx" preserve="1">
   <p:cSld name="Vertical Title and Text">
     <p:spTree>
@@ -667,7 +1269,7 @@
           <a:p>
             <a:fld id="{4B23F753-79FB-41FF-B056-5F6BF77DE748}" type="datetimeFigureOut">
               <a:rPr lang="en-US" smtClean="0"/>
-              <a:t>12/17/2023</a:t>
+              <a:t>1/24/2024</a:t>
             </a:fld>
             <a:endParaRPr lang="en-US"/>
           </a:p>
@@ -865,7 +1467,7 @@
           <a:p>
             <a:fld id="{4B23F753-79FB-41FF-B056-5F6BF77DE748}" type="datetimeFigureOut">
               <a:rPr lang="en-US" smtClean="0"/>
-              <a:t>12/17/2023</a:t>
+              <a:t>1/24/2024</a:t>
             </a:fld>
             <a:endParaRPr lang="en-US"/>
           </a:p>
@@ -1140,7 +1742,7 @@
           <a:p>
             <a:fld id="{4B23F753-79FB-41FF-B056-5F6BF77DE748}" type="datetimeFigureOut">
               <a:rPr lang="en-US" smtClean="0"/>
-              <a:t>12/17/2023</a:t>
+              <a:t>1/24/2024</a:t>
             </a:fld>
             <a:endParaRPr lang="en-US"/>
           </a:p>
@@ -1405,7 +2007,7 @@
           <a:p>
             <a:fld id="{4B23F753-79FB-41FF-B056-5F6BF77DE748}" type="datetimeFigureOut">
               <a:rPr lang="en-US" smtClean="0"/>
-              <a:t>12/17/2023</a:t>
+              <a:t>1/24/2024</a:t>
             </a:fld>
             <a:endParaRPr lang="en-US"/>
           </a:p>
@@ -1817,7 +2419,7 @@
           <a:p>
             <a:fld id="{4B23F753-79FB-41FF-B056-5F6BF77DE748}" type="datetimeFigureOut">
               <a:rPr lang="en-US" smtClean="0"/>
-              <a:t>12/17/2023</a:t>
+              <a:t>1/24/2024</a:t>
             </a:fld>
             <a:endParaRPr lang="en-US"/>
           </a:p>
@@ -1958,7 +2560,7 @@
           <a:p>
             <a:fld id="{4B23F753-79FB-41FF-B056-5F6BF77DE748}" type="datetimeFigureOut">
               <a:rPr lang="en-US" smtClean="0"/>
-              <a:t>12/17/2023</a:t>
+              <a:t>1/24/2024</a:t>
             </a:fld>
             <a:endParaRPr lang="en-US"/>
           </a:p>
@@ -2071,7 +2673,120 @@
           <a:p>
             <a:fld id="{4B23F753-79FB-41FF-B056-5F6BF77DE748}" type="datetimeFigureOut">
               <a:rPr lang="en-US" smtClean="0"/>
-              <a:t>12/17/2023</a:t>
+              <a:t>1/24/2024</a:t>
+            </a:fld>
+            <a:endParaRPr lang="en-US"/>
+          </a:p>
+        </p:txBody>
+      </p:sp>
+      <p:sp>
+        <p:nvSpPr>
+          <p:cNvPr id="3" name="Footer Placeholder 2">
+            <a:extLst>
+              <a:ext uri="{FF2B5EF4-FFF2-40B4-BE49-F238E27FC236}">
+                <a16:creationId xmlns:a16="http://schemas.microsoft.com/office/drawing/2014/main" id="{C2806F51-A9A0-45E6-AAB4-75C495F5EA1A}"/>
+              </a:ext>
+            </a:extLst>
+          </p:cNvPr>
+          <p:cNvSpPr>
+            <a:spLocks noGrp="1"/>
+          </p:cNvSpPr>
+          <p:nvPr>
+            <p:ph type="ftr" sz="quarter" idx="11"/>
+          </p:nvPr>
+        </p:nvSpPr>
+        <p:spPr/>
+        <p:txBody>
+          <a:bodyPr/>
+          <a:lstStyle/>
+          <a:p>
+            <a:endParaRPr lang="en-US"/>
+          </a:p>
+        </p:txBody>
+      </p:sp>
+      <p:sp>
+        <p:nvSpPr>
+          <p:cNvPr id="4" name="Slide Number Placeholder 3">
+            <a:extLst>
+              <a:ext uri="{FF2B5EF4-FFF2-40B4-BE49-F238E27FC236}">
+                <a16:creationId xmlns:a16="http://schemas.microsoft.com/office/drawing/2014/main" id="{9A6D126F-6B69-424E-9DA2-01551D65B362}"/>
+              </a:ext>
+            </a:extLst>
+          </p:cNvPr>
+          <p:cNvSpPr>
+            <a:spLocks noGrp="1"/>
+          </p:cNvSpPr>
+          <p:nvPr>
+            <p:ph type="sldNum" sz="quarter" idx="12"/>
+          </p:nvPr>
+        </p:nvSpPr>
+        <p:spPr/>
+        <p:txBody>
+          <a:bodyPr/>
+          <a:lstStyle/>
+          <a:p>
+            <a:fld id="{28399D25-E7A0-46ED-A17A-14974008713C}" type="slidenum">
+              <a:rPr lang="en-US" smtClean="0"/>
+              <a:t>‹#›</a:t>
+            </a:fld>
+            <a:endParaRPr lang="en-US"/>
+          </a:p>
+        </p:txBody>
+      </p:sp>
+    </p:spTree>
+    <p:extLst>
+      <p:ext uri="{BB962C8B-B14F-4D97-AF65-F5344CB8AC3E}">
+        <p14:creationId xmlns:p14="http://schemas.microsoft.com/office/powerpoint/2010/main" val="1627950767"/>
+      </p:ext>
+    </p:extLst>
+  </p:cSld>
+  <p:clrMapOvr>
+    <a:masterClrMapping/>
+  </p:clrMapOvr>
+</p:sldLayout>
+</file>
+
+<file path=ppt/slideLayouts/slideLayout8.xml><?xml version="1.0" encoding="utf-8"?>
+<p:sldLayout xmlns:a="http://schemas.openxmlformats.org/drawingml/2006/main" xmlns:r="http://schemas.openxmlformats.org/officeDocument/2006/relationships" xmlns:p="http://schemas.openxmlformats.org/presentationml/2006/main" type="blank" preserve="1">
+  <p:cSld name="Canvas768">
+    <p:spTree>
+      <p:nvGrpSpPr>
+        <p:cNvPr id="1" name=""/>
+        <p:cNvGrpSpPr/>
+        <p:nvPr/>
+      </p:nvGrpSpPr>
+      <p:grpSpPr>
+        <a:xfrm>
+          <a:off x="0" y="0"/>
+          <a:ext cx="0" cy="0"/>
+          <a:chOff x="0" y="0"/>
+          <a:chExt cx="0" cy="0"/>
+        </a:xfrm>
+      </p:grpSpPr>
+      <p:sp>
+        <p:nvSpPr>
+          <p:cNvPr id="2" name="Date Placeholder 1">
+            <a:extLst>
+              <a:ext uri="{FF2B5EF4-FFF2-40B4-BE49-F238E27FC236}">
+                <a16:creationId xmlns:a16="http://schemas.microsoft.com/office/drawing/2014/main" id="{09145668-EEE4-4AFA-B15A-83B17FE07A2B}"/>
+              </a:ext>
+            </a:extLst>
+          </p:cNvPr>
+          <p:cNvSpPr>
+            <a:spLocks noGrp="1"/>
+          </p:cNvSpPr>
+          <p:nvPr>
+            <p:ph type="dt" sz="half" idx="10"/>
+          </p:nvPr>
+        </p:nvSpPr>
+        <p:spPr/>
+        <p:txBody>
+          <a:bodyPr/>
+          <a:lstStyle/>
+          <a:p>
+            <a:fld id="{4B23F753-79FB-41FF-B056-5F6BF77DE748}" type="datetimeFigureOut">
+              <a:rPr lang="en-US" smtClean="0"/>
+              <a:t>1/24/2024</a:t>
             </a:fld>
             <a:endParaRPr lang="en-US"/>
           </a:p>
@@ -2200,7 +2915,7 @@
     </p:spTree>
     <p:extLst>
       <p:ext uri="{BB962C8B-B14F-4D97-AF65-F5344CB8AC3E}">
-        <p14:creationId xmlns:p14="http://schemas.microsoft.com/office/powerpoint/2010/main" val="1627950767"/>
+        <p14:creationId xmlns:p14="http://schemas.microsoft.com/office/powerpoint/2010/main" val="453415695"/>
       </p:ext>
     </p:extLst>
   </p:cSld>
@@ -2210,9 +2925,9 @@
 </p:sldLayout>
 </file>
 
-<file path=ppt/slideLayouts/slideLayout8.xml><?xml version="1.0" encoding="utf-8"?>
-<p:sldLayout xmlns:a="http://schemas.openxmlformats.org/drawingml/2006/main" xmlns:r="http://schemas.openxmlformats.org/officeDocument/2006/relationships" xmlns:p="http://schemas.openxmlformats.org/presentationml/2006/main" type="objTx" preserve="1">
-  <p:cSld name="Content with Caption">
+<file path=ppt/slideLayouts/slideLayout9.xml><?xml version="1.0" encoding="utf-8"?>
+<p:sldLayout xmlns:a="http://schemas.openxmlformats.org/drawingml/2006/main" xmlns:r="http://schemas.openxmlformats.org/officeDocument/2006/relationships" xmlns:p="http://schemas.openxmlformats.org/presentationml/2006/main" type="blank" preserve="1">
+  <p:cSld name="Canvas768/16">
     <p:spTree>
       <p:nvGrpSpPr>
         <p:cNvPr id="1" name=""/>
@@ -2229,208 +2944,10 @@
       </p:grpSpPr>
       <p:sp>
         <p:nvSpPr>
-          <p:cNvPr id="2" name="Title 1">
-            <a:extLst>
-              <a:ext uri="{FF2B5EF4-FFF2-40B4-BE49-F238E27FC236}">
-                <a16:creationId xmlns:a16="http://schemas.microsoft.com/office/drawing/2014/main" id="{4C02AD79-0628-48F8-96FD-8DC1046A3DD3}"/>
-              </a:ext>
-            </a:extLst>
-          </p:cNvPr>
-          <p:cNvSpPr>
-            <a:spLocks noGrp="1"/>
-          </p:cNvSpPr>
-          <p:nvPr>
-            <p:ph type="title"/>
-          </p:nvPr>
-        </p:nvSpPr>
-        <p:spPr>
-          <a:xfrm>
-            <a:off x="839788" y="457200"/>
-            <a:ext cx="3932237" cy="1600200"/>
-          </a:xfrm>
-        </p:spPr>
-        <p:txBody>
-          <a:bodyPr anchor="b"/>
-          <a:lstStyle>
-            <a:lvl1pPr>
-              <a:defRPr sz="3200"/>
-            </a:lvl1pPr>
-          </a:lstStyle>
-          <a:p>
-            <a:r>
-              <a:rPr lang="en-US"/>
-              <a:t>Click to edit Master title style</a:t>
-            </a:r>
-          </a:p>
-        </p:txBody>
-      </p:sp>
-      <p:sp>
-        <p:nvSpPr>
-          <p:cNvPr id="3" name="Content Placeholder 2">
-            <a:extLst>
-              <a:ext uri="{FF2B5EF4-FFF2-40B4-BE49-F238E27FC236}">
-                <a16:creationId xmlns:a16="http://schemas.microsoft.com/office/drawing/2014/main" id="{1ED1F7CD-C81C-4821-A422-8C24E99556D4}"/>
-              </a:ext>
-            </a:extLst>
-          </p:cNvPr>
-          <p:cNvSpPr>
-            <a:spLocks noGrp="1"/>
-          </p:cNvSpPr>
-          <p:nvPr>
-            <p:ph idx="1"/>
-          </p:nvPr>
-        </p:nvSpPr>
-        <p:spPr>
-          <a:xfrm>
-            <a:off x="5183188" y="987425"/>
-            <a:ext cx="6172200" cy="4873625"/>
-          </a:xfrm>
-        </p:spPr>
-        <p:txBody>
-          <a:bodyPr/>
-          <a:lstStyle>
-            <a:lvl1pPr>
-              <a:defRPr sz="3200"/>
-            </a:lvl1pPr>
-            <a:lvl2pPr>
-              <a:defRPr sz="2800"/>
-            </a:lvl2pPr>
-            <a:lvl3pPr>
-              <a:defRPr sz="2400"/>
-            </a:lvl3pPr>
-            <a:lvl4pPr>
-              <a:defRPr sz="2000"/>
-            </a:lvl4pPr>
-            <a:lvl5pPr>
-              <a:defRPr sz="2000"/>
-            </a:lvl5pPr>
-            <a:lvl6pPr>
-              <a:defRPr sz="2000"/>
-            </a:lvl6pPr>
-            <a:lvl7pPr>
-              <a:defRPr sz="2000"/>
-            </a:lvl7pPr>
-            <a:lvl8pPr>
-              <a:defRPr sz="2000"/>
-            </a:lvl8pPr>
-            <a:lvl9pPr>
-              <a:defRPr sz="2000"/>
-            </a:lvl9pPr>
-          </a:lstStyle>
-          <a:p>
-            <a:pPr lvl="0"/>
-            <a:r>
-              <a:rPr lang="en-US"/>
-              <a:t>Click to edit Master text styles</a:t>
-            </a:r>
-          </a:p>
-          <a:p>
-            <a:pPr lvl="1"/>
-            <a:r>
-              <a:rPr lang="en-US"/>
-              <a:t>Second level</a:t>
-            </a:r>
-          </a:p>
-          <a:p>
-            <a:pPr lvl="2"/>
-            <a:r>
-              <a:rPr lang="en-US"/>
-              <a:t>Third level</a:t>
-            </a:r>
-          </a:p>
-          <a:p>
-            <a:pPr lvl="3"/>
-            <a:r>
-              <a:rPr lang="en-US"/>
-              <a:t>Fourth level</a:t>
-            </a:r>
-          </a:p>
-          <a:p>
-            <a:pPr lvl="4"/>
-            <a:r>
-              <a:rPr lang="en-US"/>
-              <a:t>Fifth level</a:t>
-            </a:r>
-          </a:p>
-        </p:txBody>
-      </p:sp>
-      <p:sp>
-        <p:nvSpPr>
-          <p:cNvPr id="4" name="Text Placeholder 3">
-            <a:extLst>
-              <a:ext uri="{FF2B5EF4-FFF2-40B4-BE49-F238E27FC236}">
-                <a16:creationId xmlns:a16="http://schemas.microsoft.com/office/drawing/2014/main" id="{20CAE0F1-5669-46B3-ACC0-2FE7B9619072}"/>
-              </a:ext>
-            </a:extLst>
-          </p:cNvPr>
-          <p:cNvSpPr>
-            <a:spLocks noGrp="1"/>
-          </p:cNvSpPr>
-          <p:nvPr>
-            <p:ph type="body" sz="half" idx="2"/>
-          </p:nvPr>
-        </p:nvSpPr>
-        <p:spPr>
-          <a:xfrm>
-            <a:off x="839788" y="2057400"/>
-            <a:ext cx="3932237" cy="3811588"/>
-          </a:xfrm>
-        </p:spPr>
-        <p:txBody>
-          <a:bodyPr/>
-          <a:lstStyle>
-            <a:lvl1pPr marL="0" indent="0">
-              <a:buNone/>
-              <a:defRPr sz="1600"/>
-            </a:lvl1pPr>
-            <a:lvl2pPr marL="457200" indent="0">
-              <a:buNone/>
-              <a:defRPr sz="1400"/>
-            </a:lvl2pPr>
-            <a:lvl3pPr marL="914400" indent="0">
-              <a:buNone/>
-              <a:defRPr sz="1200"/>
-            </a:lvl3pPr>
-            <a:lvl4pPr marL="1371600" indent="0">
-              <a:buNone/>
-              <a:defRPr sz="1000"/>
-            </a:lvl4pPr>
-            <a:lvl5pPr marL="1828800" indent="0">
-              <a:buNone/>
-              <a:defRPr sz="1000"/>
-            </a:lvl5pPr>
-            <a:lvl6pPr marL="2286000" indent="0">
-              <a:buNone/>
-              <a:defRPr sz="1000"/>
-            </a:lvl6pPr>
-            <a:lvl7pPr marL="2743200" indent="0">
-              <a:buNone/>
-              <a:defRPr sz="1000"/>
-            </a:lvl7pPr>
-            <a:lvl8pPr marL="3200400" indent="0">
-              <a:buNone/>
-              <a:defRPr sz="1000"/>
-            </a:lvl8pPr>
-            <a:lvl9pPr marL="3657600" indent="0">
-              <a:buNone/>
-              <a:defRPr sz="1000"/>
-            </a:lvl9pPr>
-          </a:lstStyle>
-          <a:p>
-            <a:pPr lvl="0"/>
-            <a:r>
-              <a:rPr lang="en-US"/>
-              <a:t>Click to edit Master text styles</a:t>
-            </a:r>
-          </a:p>
-        </p:txBody>
-      </p:sp>
-      <p:sp>
-        <p:nvSpPr>
-          <p:cNvPr id="5" name="Date Placeholder 4">
-            <a:extLst>
-              <a:ext uri="{FF2B5EF4-FFF2-40B4-BE49-F238E27FC236}">
-                <a16:creationId xmlns:a16="http://schemas.microsoft.com/office/drawing/2014/main" id="{A2AAD2A3-AF58-435C-9A30-466E71828E5E}"/>
+          <p:cNvPr id="2" name="Date Placeholder 1">
+            <a:extLst>
+              <a:ext uri="{FF2B5EF4-FFF2-40B4-BE49-F238E27FC236}">
+                <a16:creationId xmlns:a16="http://schemas.microsoft.com/office/drawing/2014/main" id="{09145668-EEE4-4AFA-B15A-83B17FE07A2B}"/>
               </a:ext>
             </a:extLst>
           </p:cNvPr>
@@ -2448,7 +2965,7 @@
           <a:p>
             <a:fld id="{4B23F753-79FB-41FF-B056-5F6BF77DE748}" type="datetimeFigureOut">
               <a:rPr lang="en-US" smtClean="0"/>
-              <a:t>12/17/2023</a:t>
+              <a:t>1/24/2024</a:t>
             </a:fld>
             <a:endParaRPr lang="en-US"/>
           </a:p>
@@ -2456,10 +2973,10 @@
       </p:sp>
       <p:sp>
         <p:nvSpPr>
-          <p:cNvPr id="6" name="Footer Placeholder 5">
-            <a:extLst>
-              <a:ext uri="{FF2B5EF4-FFF2-40B4-BE49-F238E27FC236}">
-                <a16:creationId xmlns:a16="http://schemas.microsoft.com/office/drawing/2014/main" id="{1D404FD0-EA6D-47A7-B28B-0BCE737D391A}"/>
+          <p:cNvPr id="3" name="Footer Placeholder 2">
+            <a:extLst>
+              <a:ext uri="{FF2B5EF4-FFF2-40B4-BE49-F238E27FC236}">
+                <a16:creationId xmlns:a16="http://schemas.microsoft.com/office/drawing/2014/main" id="{C2806F51-A9A0-45E6-AAB4-75C495F5EA1A}"/>
               </a:ext>
             </a:extLst>
           </p:cNvPr>
@@ -2481,10 +2998,10 @@
       </p:sp>
       <p:sp>
         <p:nvSpPr>
-          <p:cNvPr id="7" name="Slide Number Placeholder 6">
-            <a:extLst>
-              <a:ext uri="{FF2B5EF4-FFF2-40B4-BE49-F238E27FC236}">
-                <a16:creationId xmlns:a16="http://schemas.microsoft.com/office/drawing/2014/main" id="{51AB0153-6B5C-41CA-AFBC-6901A9DAA9CD}"/>
+          <p:cNvPr id="4" name="Slide Number Placeholder 3">
+            <a:extLst>
+              <a:ext uri="{FF2B5EF4-FFF2-40B4-BE49-F238E27FC236}">
+                <a16:creationId xmlns:a16="http://schemas.microsoft.com/office/drawing/2014/main" id="{9A6D126F-6B69-424E-9DA2-01551D65B362}"/>
               </a:ext>
             </a:extLst>
           </p:cNvPr>
@@ -2508,298 +3025,1402 @@
           </a:p>
         </p:txBody>
       </p:sp>
+      <p:sp>
+        <p:nvSpPr>
+          <p:cNvPr id="6" name="TextBox 5">
+            <a:extLst>
+              <a:ext uri="{FF2B5EF4-FFF2-40B4-BE49-F238E27FC236}">
+                <a16:creationId xmlns:a16="http://schemas.microsoft.com/office/drawing/2014/main" id="{8744FE8E-B9BF-4405-A76E-6501CDD44121}"/>
+              </a:ext>
+            </a:extLst>
+          </p:cNvPr>
+          <p:cNvSpPr txBox="1"/>
+          <p:nvPr userDrawn="1"/>
+        </p:nvSpPr>
+        <p:spPr>
+          <a:xfrm>
+            <a:off x="3619500" y="586598"/>
+            <a:ext cx="4953000" cy="369332"/>
+          </a:xfrm>
+          <a:prstGeom prst="rect">
+            <a:avLst/>
+          </a:prstGeom>
+          <a:noFill/>
+        </p:spPr>
+        <p:txBody>
+          <a:bodyPr wrap="square" rtlCol="0">
+            <a:spAutoFit/>
+          </a:bodyPr>
+          <a:lstStyle/>
+          <a:p>
+            <a:pPr algn="ctr"/>
+            <a:r>
+              <a:rPr lang="en-US" b="1" dirty="0"/>
+              <a:t>768 x 768</a:t>
+            </a:r>
+          </a:p>
+        </p:txBody>
+      </p:sp>
+      <p:grpSp>
+        <p:nvGrpSpPr>
+          <p:cNvPr id="39" name="Group 38">
+            <a:extLst>
+              <a:ext uri="{FF2B5EF4-FFF2-40B4-BE49-F238E27FC236}">
+                <a16:creationId xmlns:a16="http://schemas.microsoft.com/office/drawing/2014/main" id="{E9E4BC20-6053-8FE7-C0E4-8F0C12AC8F72}"/>
+              </a:ext>
+            </a:extLst>
+          </p:cNvPr>
+          <p:cNvGrpSpPr/>
+          <p:nvPr userDrawn="1"/>
+        </p:nvGrpSpPr>
+        <p:grpSpPr>
+          <a:xfrm>
+            <a:off x="3619500" y="952500"/>
+            <a:ext cx="4953000" cy="4953000"/>
+            <a:chOff x="3619500" y="952500"/>
+            <a:chExt cx="4953000" cy="4953000"/>
+          </a:xfrm>
+        </p:grpSpPr>
+        <p:pic>
+          <p:nvPicPr>
+            <p:cNvPr id="5" name="Picture 4">
+              <a:extLst>
+                <a:ext uri="{FF2B5EF4-FFF2-40B4-BE49-F238E27FC236}">
+                  <a16:creationId xmlns:a16="http://schemas.microsoft.com/office/drawing/2014/main" id="{6D8DDDF1-FDCC-4A16-9AE2-33F7FB214C53}"/>
+                </a:ext>
+              </a:extLst>
+            </p:cNvPr>
+            <p:cNvPicPr>
+              <a:picLocks noChangeAspect="1"/>
+            </p:cNvPicPr>
+            <p:nvPr userDrawn="1"/>
+          </p:nvPicPr>
+          <p:blipFill>
+            <a:blip r:embed="rId2"/>
+            <a:stretch>
+              <a:fillRect/>
+            </a:stretch>
+          </p:blipFill>
+          <p:spPr>
+            <a:xfrm>
+              <a:off x="3619500" y="952500"/>
+              <a:ext cx="4953000" cy="4953000"/>
+            </a:xfrm>
+            <a:prstGeom prst="rect">
+              <a:avLst/>
+            </a:prstGeom>
+          </p:spPr>
+        </p:pic>
+        <p:cxnSp>
+          <p:nvCxnSpPr>
+            <p:cNvPr id="8" name="Straight Connector 7">
+              <a:extLst>
+                <a:ext uri="{FF2B5EF4-FFF2-40B4-BE49-F238E27FC236}">
+                  <a16:creationId xmlns:a16="http://schemas.microsoft.com/office/drawing/2014/main" id="{C8C79C60-236E-E373-5820-ADBB8E8A7A5D}"/>
+                </a:ext>
+              </a:extLst>
+            </p:cNvPr>
+            <p:cNvCxnSpPr>
+              <a:stCxn id="5" idx="0"/>
+              <a:endCxn id="5" idx="2"/>
+            </p:cNvCxnSpPr>
+            <p:nvPr userDrawn="1"/>
+          </p:nvCxnSpPr>
+          <p:spPr>
+            <a:xfrm>
+              <a:off x="6096000" y="952500"/>
+              <a:ext cx="0" cy="4953000"/>
+            </a:xfrm>
+            <a:prstGeom prst="line">
+              <a:avLst/>
+            </a:prstGeom>
+            <a:ln w="19050">
+              <a:solidFill>
+                <a:schemeClr val="accent1"/>
+              </a:solidFill>
+            </a:ln>
+          </p:spPr>
+          <p:style>
+            <a:lnRef idx="1">
+              <a:schemeClr val="accent1"/>
+            </a:lnRef>
+            <a:fillRef idx="0">
+              <a:schemeClr val="accent1"/>
+            </a:fillRef>
+            <a:effectRef idx="0">
+              <a:schemeClr val="accent1"/>
+            </a:effectRef>
+            <a:fontRef idx="minor">
+              <a:schemeClr val="tx1"/>
+            </a:fontRef>
+          </p:style>
+        </p:cxnSp>
+        <p:cxnSp>
+          <p:nvCxnSpPr>
+            <p:cNvPr id="9" name="Straight Connector 8">
+              <a:extLst>
+                <a:ext uri="{FF2B5EF4-FFF2-40B4-BE49-F238E27FC236}">
+                  <a16:creationId xmlns:a16="http://schemas.microsoft.com/office/drawing/2014/main" id="{358F0916-E4AE-DA4F-FA51-EC1E9A59DEA9}"/>
+                </a:ext>
+              </a:extLst>
+            </p:cNvPr>
+            <p:cNvCxnSpPr/>
+            <p:nvPr userDrawn="1"/>
+          </p:nvCxnSpPr>
+          <p:spPr>
+            <a:xfrm>
+              <a:off x="4896928" y="952500"/>
+              <a:ext cx="0" cy="4953000"/>
+            </a:xfrm>
+            <a:prstGeom prst="line">
+              <a:avLst/>
+            </a:prstGeom>
+            <a:ln w="19050">
+              <a:solidFill>
+                <a:srgbClr val="00B050"/>
+              </a:solidFill>
+            </a:ln>
+          </p:spPr>
+          <p:style>
+            <a:lnRef idx="1">
+              <a:schemeClr val="accent1"/>
+            </a:lnRef>
+            <a:fillRef idx="0">
+              <a:schemeClr val="accent1"/>
+            </a:fillRef>
+            <a:effectRef idx="0">
+              <a:schemeClr val="accent1"/>
+            </a:effectRef>
+            <a:fontRef idx="minor">
+              <a:schemeClr val="tx1"/>
+            </a:fontRef>
+          </p:style>
+        </p:cxnSp>
+        <p:cxnSp>
+          <p:nvCxnSpPr>
+            <p:cNvPr id="10" name="Straight Connector 9">
+              <a:extLst>
+                <a:ext uri="{FF2B5EF4-FFF2-40B4-BE49-F238E27FC236}">
+                  <a16:creationId xmlns:a16="http://schemas.microsoft.com/office/drawing/2014/main" id="{4DB4057A-B753-22FA-BE04-78CBB1012A52}"/>
+                </a:ext>
+              </a:extLst>
+            </p:cNvPr>
+            <p:cNvCxnSpPr/>
+            <p:nvPr userDrawn="1"/>
+          </p:nvCxnSpPr>
+          <p:spPr>
+            <a:xfrm>
+              <a:off x="7346830" y="952500"/>
+              <a:ext cx="0" cy="4953000"/>
+            </a:xfrm>
+            <a:prstGeom prst="line">
+              <a:avLst/>
+            </a:prstGeom>
+            <a:ln w="19050">
+              <a:solidFill>
+                <a:srgbClr val="00B050"/>
+              </a:solidFill>
+            </a:ln>
+          </p:spPr>
+          <p:style>
+            <a:lnRef idx="1">
+              <a:schemeClr val="accent1"/>
+            </a:lnRef>
+            <a:fillRef idx="0">
+              <a:schemeClr val="accent1"/>
+            </a:fillRef>
+            <a:effectRef idx="0">
+              <a:schemeClr val="accent1"/>
+            </a:effectRef>
+            <a:fontRef idx="minor">
+              <a:schemeClr val="tx1"/>
+            </a:fontRef>
+          </p:style>
+        </p:cxnSp>
+        <p:cxnSp>
+          <p:nvCxnSpPr>
+            <p:cNvPr id="11" name="Straight Connector 10">
+              <a:extLst>
+                <a:ext uri="{FF2B5EF4-FFF2-40B4-BE49-F238E27FC236}">
+                  <a16:creationId xmlns:a16="http://schemas.microsoft.com/office/drawing/2014/main" id="{1A56E5AF-0E50-48EA-D67D-7B74BE31DFD1}"/>
+                </a:ext>
+              </a:extLst>
+            </p:cNvPr>
+            <p:cNvCxnSpPr/>
+            <p:nvPr userDrawn="1"/>
+          </p:nvCxnSpPr>
+          <p:spPr>
+            <a:xfrm>
+              <a:off x="7950680" y="952500"/>
+              <a:ext cx="0" cy="4953000"/>
+            </a:xfrm>
+            <a:prstGeom prst="line">
+              <a:avLst/>
+            </a:prstGeom>
+            <a:ln w="19050">
+              <a:solidFill>
+                <a:schemeClr val="tx1">
+                  <a:lumMod val="50000"/>
+                  <a:lumOff val="50000"/>
+                </a:schemeClr>
+              </a:solidFill>
+            </a:ln>
+          </p:spPr>
+          <p:style>
+            <a:lnRef idx="1">
+              <a:schemeClr val="accent1"/>
+            </a:lnRef>
+            <a:fillRef idx="0">
+              <a:schemeClr val="accent1"/>
+            </a:fillRef>
+            <a:effectRef idx="0">
+              <a:schemeClr val="accent1"/>
+            </a:effectRef>
+            <a:fontRef idx="minor">
+              <a:schemeClr val="tx1"/>
+            </a:fontRef>
+          </p:style>
+        </p:cxnSp>
+        <p:cxnSp>
+          <p:nvCxnSpPr>
+            <p:cNvPr id="12" name="Straight Connector 11">
+              <a:extLst>
+                <a:ext uri="{FF2B5EF4-FFF2-40B4-BE49-F238E27FC236}">
+                  <a16:creationId xmlns:a16="http://schemas.microsoft.com/office/drawing/2014/main" id="{6463181B-5716-14E4-E817-7D567ABA75F2}"/>
+                </a:ext>
+              </a:extLst>
+            </p:cNvPr>
+            <p:cNvCxnSpPr/>
+            <p:nvPr userDrawn="1"/>
+          </p:nvCxnSpPr>
+          <p:spPr>
+            <a:xfrm>
+              <a:off x="6734355" y="952500"/>
+              <a:ext cx="0" cy="4953000"/>
+            </a:xfrm>
+            <a:prstGeom prst="line">
+              <a:avLst/>
+            </a:prstGeom>
+            <a:ln w="19050">
+              <a:solidFill>
+                <a:schemeClr val="tx1">
+                  <a:lumMod val="50000"/>
+                  <a:lumOff val="50000"/>
+                </a:schemeClr>
+              </a:solidFill>
+            </a:ln>
+          </p:spPr>
+          <p:style>
+            <a:lnRef idx="1">
+              <a:schemeClr val="accent1"/>
+            </a:lnRef>
+            <a:fillRef idx="0">
+              <a:schemeClr val="accent1"/>
+            </a:fillRef>
+            <a:effectRef idx="0">
+              <a:schemeClr val="accent1"/>
+            </a:effectRef>
+            <a:fontRef idx="minor">
+              <a:schemeClr val="tx1"/>
+            </a:fontRef>
+          </p:style>
+        </p:cxnSp>
+        <p:cxnSp>
+          <p:nvCxnSpPr>
+            <p:cNvPr id="13" name="Straight Connector 12">
+              <a:extLst>
+                <a:ext uri="{FF2B5EF4-FFF2-40B4-BE49-F238E27FC236}">
+                  <a16:creationId xmlns:a16="http://schemas.microsoft.com/office/drawing/2014/main" id="{0D0BF19F-4BB1-578C-1C35-B5B9B78EC1C8}"/>
+                </a:ext>
+              </a:extLst>
+            </p:cNvPr>
+            <p:cNvCxnSpPr/>
+            <p:nvPr userDrawn="1"/>
+          </p:nvCxnSpPr>
+          <p:spPr>
+            <a:xfrm>
+              <a:off x="5509404" y="952500"/>
+              <a:ext cx="0" cy="4953000"/>
+            </a:xfrm>
+            <a:prstGeom prst="line">
+              <a:avLst/>
+            </a:prstGeom>
+            <a:ln w="19050">
+              <a:solidFill>
+                <a:schemeClr val="tx1">
+                  <a:lumMod val="50000"/>
+                  <a:lumOff val="50000"/>
+                </a:schemeClr>
+              </a:solidFill>
+            </a:ln>
+          </p:spPr>
+          <p:style>
+            <a:lnRef idx="1">
+              <a:schemeClr val="accent1"/>
+            </a:lnRef>
+            <a:fillRef idx="0">
+              <a:schemeClr val="accent1"/>
+            </a:fillRef>
+            <a:effectRef idx="0">
+              <a:schemeClr val="accent1"/>
+            </a:effectRef>
+            <a:fontRef idx="minor">
+              <a:schemeClr val="tx1"/>
+            </a:fontRef>
+          </p:style>
+        </p:cxnSp>
+        <p:cxnSp>
+          <p:nvCxnSpPr>
+            <p:cNvPr id="14" name="Straight Connector 13">
+              <a:extLst>
+                <a:ext uri="{FF2B5EF4-FFF2-40B4-BE49-F238E27FC236}">
+                  <a16:creationId xmlns:a16="http://schemas.microsoft.com/office/drawing/2014/main" id="{B41B0884-49F3-BCEC-62B2-DA8322944B63}"/>
+                </a:ext>
+              </a:extLst>
+            </p:cNvPr>
+            <p:cNvCxnSpPr/>
+            <p:nvPr userDrawn="1"/>
+          </p:nvCxnSpPr>
+          <p:spPr>
+            <a:xfrm>
+              <a:off x="4258574" y="952500"/>
+              <a:ext cx="0" cy="4953000"/>
+            </a:xfrm>
+            <a:prstGeom prst="line">
+              <a:avLst/>
+            </a:prstGeom>
+            <a:ln w="19050">
+              <a:solidFill>
+                <a:schemeClr val="tx1">
+                  <a:lumMod val="50000"/>
+                  <a:lumOff val="50000"/>
+                </a:schemeClr>
+              </a:solidFill>
+            </a:ln>
+          </p:spPr>
+          <p:style>
+            <a:lnRef idx="1">
+              <a:schemeClr val="accent1"/>
+            </a:lnRef>
+            <a:fillRef idx="0">
+              <a:schemeClr val="accent1"/>
+            </a:fillRef>
+            <a:effectRef idx="0">
+              <a:schemeClr val="accent1"/>
+            </a:effectRef>
+            <a:fontRef idx="minor">
+              <a:schemeClr val="tx1"/>
+            </a:fontRef>
+          </p:style>
+        </p:cxnSp>
+        <p:cxnSp>
+          <p:nvCxnSpPr>
+            <p:cNvPr id="15" name="Straight Connector 14">
+              <a:extLst>
+                <a:ext uri="{FF2B5EF4-FFF2-40B4-BE49-F238E27FC236}">
+                  <a16:creationId xmlns:a16="http://schemas.microsoft.com/office/drawing/2014/main" id="{160D9FCD-BC46-749A-D114-6428E95150B5}"/>
+                </a:ext>
+              </a:extLst>
+            </p:cNvPr>
+            <p:cNvCxnSpPr/>
+            <p:nvPr userDrawn="1"/>
+          </p:nvCxnSpPr>
+          <p:spPr>
+            <a:xfrm>
+              <a:off x="6412302" y="952500"/>
+              <a:ext cx="0" cy="4953000"/>
+            </a:xfrm>
+            <a:prstGeom prst="line">
+              <a:avLst/>
+            </a:prstGeom>
+            <a:ln w="19050">
+              <a:solidFill>
+                <a:schemeClr val="tx1">
+                  <a:lumMod val="50000"/>
+                  <a:lumOff val="50000"/>
+                </a:schemeClr>
+              </a:solidFill>
+            </a:ln>
+          </p:spPr>
+          <p:style>
+            <a:lnRef idx="1">
+              <a:schemeClr val="accent1"/>
+            </a:lnRef>
+            <a:fillRef idx="0">
+              <a:schemeClr val="accent1"/>
+            </a:fillRef>
+            <a:effectRef idx="0">
+              <a:schemeClr val="accent1"/>
+            </a:effectRef>
+            <a:fontRef idx="minor">
+              <a:schemeClr val="tx1"/>
+            </a:fontRef>
+          </p:style>
+        </p:cxnSp>
+        <p:cxnSp>
+          <p:nvCxnSpPr>
+            <p:cNvPr id="16" name="Straight Connector 15">
+              <a:extLst>
+                <a:ext uri="{FF2B5EF4-FFF2-40B4-BE49-F238E27FC236}">
+                  <a16:creationId xmlns:a16="http://schemas.microsoft.com/office/drawing/2014/main" id="{F85C370F-FAC3-587B-2F69-48F134365C8B}"/>
+                </a:ext>
+              </a:extLst>
+            </p:cNvPr>
+            <p:cNvCxnSpPr/>
+            <p:nvPr userDrawn="1"/>
+          </p:nvCxnSpPr>
+          <p:spPr>
+            <a:xfrm>
+              <a:off x="5213230" y="952500"/>
+              <a:ext cx="0" cy="4953000"/>
+            </a:xfrm>
+            <a:prstGeom prst="line">
+              <a:avLst/>
+            </a:prstGeom>
+            <a:ln w="19050">
+              <a:solidFill>
+                <a:schemeClr val="tx1">
+                  <a:lumMod val="50000"/>
+                  <a:lumOff val="50000"/>
+                </a:schemeClr>
+              </a:solidFill>
+            </a:ln>
+          </p:spPr>
+          <p:style>
+            <a:lnRef idx="1">
+              <a:schemeClr val="accent1"/>
+            </a:lnRef>
+            <a:fillRef idx="0">
+              <a:schemeClr val="accent1"/>
+            </a:fillRef>
+            <a:effectRef idx="0">
+              <a:schemeClr val="accent1"/>
+            </a:effectRef>
+            <a:fontRef idx="minor">
+              <a:schemeClr val="tx1"/>
+            </a:fontRef>
+          </p:style>
+        </p:cxnSp>
+        <p:cxnSp>
+          <p:nvCxnSpPr>
+            <p:cNvPr id="17" name="Straight Connector 16">
+              <a:extLst>
+                <a:ext uri="{FF2B5EF4-FFF2-40B4-BE49-F238E27FC236}">
+                  <a16:creationId xmlns:a16="http://schemas.microsoft.com/office/drawing/2014/main" id="{8F6C85EF-3A30-D193-6FD2-8B9F8392DE15}"/>
+                </a:ext>
+              </a:extLst>
+            </p:cNvPr>
+            <p:cNvCxnSpPr/>
+            <p:nvPr userDrawn="1"/>
+          </p:nvCxnSpPr>
+          <p:spPr>
+            <a:xfrm>
+              <a:off x="7663132" y="952500"/>
+              <a:ext cx="0" cy="4953000"/>
+            </a:xfrm>
+            <a:prstGeom prst="line">
+              <a:avLst/>
+            </a:prstGeom>
+            <a:ln w="19050">
+              <a:solidFill>
+                <a:schemeClr val="tx1">
+                  <a:lumMod val="50000"/>
+                  <a:lumOff val="50000"/>
+                </a:schemeClr>
+              </a:solidFill>
+            </a:ln>
+          </p:spPr>
+          <p:style>
+            <a:lnRef idx="1">
+              <a:schemeClr val="accent1"/>
+            </a:lnRef>
+            <a:fillRef idx="0">
+              <a:schemeClr val="accent1"/>
+            </a:fillRef>
+            <a:effectRef idx="0">
+              <a:schemeClr val="accent1"/>
+            </a:effectRef>
+            <a:fontRef idx="minor">
+              <a:schemeClr val="tx1"/>
+            </a:fontRef>
+          </p:style>
+        </p:cxnSp>
+        <p:cxnSp>
+          <p:nvCxnSpPr>
+            <p:cNvPr id="18" name="Straight Connector 17">
+              <a:extLst>
+                <a:ext uri="{FF2B5EF4-FFF2-40B4-BE49-F238E27FC236}">
+                  <a16:creationId xmlns:a16="http://schemas.microsoft.com/office/drawing/2014/main" id="{F2513460-3C86-41A9-23DB-CDC886654691}"/>
+                </a:ext>
+              </a:extLst>
+            </p:cNvPr>
+            <p:cNvCxnSpPr/>
+            <p:nvPr userDrawn="1"/>
+          </p:nvCxnSpPr>
+          <p:spPr>
+            <a:xfrm>
+              <a:off x="8266982" y="952500"/>
+              <a:ext cx="0" cy="4953000"/>
+            </a:xfrm>
+            <a:prstGeom prst="line">
+              <a:avLst/>
+            </a:prstGeom>
+            <a:ln w="19050">
+              <a:solidFill>
+                <a:schemeClr val="tx1">
+                  <a:lumMod val="50000"/>
+                  <a:lumOff val="50000"/>
+                </a:schemeClr>
+              </a:solidFill>
+            </a:ln>
+          </p:spPr>
+          <p:style>
+            <a:lnRef idx="1">
+              <a:schemeClr val="accent1"/>
+            </a:lnRef>
+            <a:fillRef idx="0">
+              <a:schemeClr val="accent1"/>
+            </a:fillRef>
+            <a:effectRef idx="0">
+              <a:schemeClr val="accent1"/>
+            </a:effectRef>
+            <a:fontRef idx="minor">
+              <a:schemeClr val="tx1"/>
+            </a:fontRef>
+          </p:style>
+        </p:cxnSp>
+        <p:cxnSp>
+          <p:nvCxnSpPr>
+            <p:cNvPr id="19" name="Straight Connector 18">
+              <a:extLst>
+                <a:ext uri="{FF2B5EF4-FFF2-40B4-BE49-F238E27FC236}">
+                  <a16:creationId xmlns:a16="http://schemas.microsoft.com/office/drawing/2014/main" id="{ED4973E6-A163-7289-B3DE-EFF8F0815D8B}"/>
+                </a:ext>
+              </a:extLst>
+            </p:cNvPr>
+            <p:cNvCxnSpPr/>
+            <p:nvPr userDrawn="1"/>
+          </p:nvCxnSpPr>
+          <p:spPr>
+            <a:xfrm>
+              <a:off x="7050657" y="952500"/>
+              <a:ext cx="0" cy="4953000"/>
+            </a:xfrm>
+            <a:prstGeom prst="line">
+              <a:avLst/>
+            </a:prstGeom>
+            <a:ln w="19050">
+              <a:solidFill>
+                <a:schemeClr val="tx1">
+                  <a:lumMod val="50000"/>
+                  <a:lumOff val="50000"/>
+                </a:schemeClr>
+              </a:solidFill>
+            </a:ln>
+          </p:spPr>
+          <p:style>
+            <a:lnRef idx="1">
+              <a:schemeClr val="accent1"/>
+            </a:lnRef>
+            <a:fillRef idx="0">
+              <a:schemeClr val="accent1"/>
+            </a:fillRef>
+            <a:effectRef idx="0">
+              <a:schemeClr val="accent1"/>
+            </a:effectRef>
+            <a:fontRef idx="minor">
+              <a:schemeClr val="tx1"/>
+            </a:fontRef>
+          </p:style>
+        </p:cxnSp>
+        <p:cxnSp>
+          <p:nvCxnSpPr>
+            <p:cNvPr id="20" name="Straight Connector 19">
+              <a:extLst>
+                <a:ext uri="{FF2B5EF4-FFF2-40B4-BE49-F238E27FC236}">
+                  <a16:creationId xmlns:a16="http://schemas.microsoft.com/office/drawing/2014/main" id="{204B905E-F34A-BDDE-D4AE-D57ADDCABEC9}"/>
+                </a:ext>
+              </a:extLst>
+            </p:cNvPr>
+            <p:cNvCxnSpPr/>
+            <p:nvPr userDrawn="1"/>
+          </p:nvCxnSpPr>
+          <p:spPr>
+            <a:xfrm>
+              <a:off x="5802846" y="952500"/>
+              <a:ext cx="0" cy="4953000"/>
+            </a:xfrm>
+            <a:prstGeom prst="line">
+              <a:avLst/>
+            </a:prstGeom>
+            <a:ln w="19050">
+              <a:solidFill>
+                <a:schemeClr val="tx1">
+                  <a:lumMod val="50000"/>
+                  <a:lumOff val="50000"/>
+                </a:schemeClr>
+              </a:solidFill>
+            </a:ln>
+          </p:spPr>
+          <p:style>
+            <a:lnRef idx="1">
+              <a:schemeClr val="accent1"/>
+            </a:lnRef>
+            <a:fillRef idx="0">
+              <a:schemeClr val="accent1"/>
+            </a:fillRef>
+            <a:effectRef idx="0">
+              <a:schemeClr val="accent1"/>
+            </a:effectRef>
+            <a:fontRef idx="minor">
+              <a:schemeClr val="tx1"/>
+            </a:fontRef>
+          </p:style>
+        </p:cxnSp>
+        <p:cxnSp>
+          <p:nvCxnSpPr>
+            <p:cNvPr id="21" name="Straight Connector 20">
+              <a:extLst>
+                <a:ext uri="{FF2B5EF4-FFF2-40B4-BE49-F238E27FC236}">
+                  <a16:creationId xmlns:a16="http://schemas.microsoft.com/office/drawing/2014/main" id="{C4E8B480-DD49-D557-C282-FC95C3A14C3A}"/>
+                </a:ext>
+              </a:extLst>
+            </p:cNvPr>
+            <p:cNvCxnSpPr/>
+            <p:nvPr userDrawn="1"/>
+          </p:nvCxnSpPr>
+          <p:spPr>
+            <a:xfrm>
+              <a:off x="4574876" y="952500"/>
+              <a:ext cx="0" cy="4953000"/>
+            </a:xfrm>
+            <a:prstGeom prst="line">
+              <a:avLst/>
+            </a:prstGeom>
+            <a:ln w="19050">
+              <a:solidFill>
+                <a:schemeClr val="tx1">
+                  <a:lumMod val="50000"/>
+                  <a:lumOff val="50000"/>
+                </a:schemeClr>
+              </a:solidFill>
+            </a:ln>
+          </p:spPr>
+          <p:style>
+            <a:lnRef idx="1">
+              <a:schemeClr val="accent1"/>
+            </a:lnRef>
+            <a:fillRef idx="0">
+              <a:schemeClr val="accent1"/>
+            </a:fillRef>
+            <a:effectRef idx="0">
+              <a:schemeClr val="accent1"/>
+            </a:effectRef>
+            <a:fontRef idx="minor">
+              <a:schemeClr val="tx1"/>
+            </a:fontRef>
+          </p:style>
+        </p:cxnSp>
+        <p:cxnSp>
+          <p:nvCxnSpPr>
+            <p:cNvPr id="22" name="Straight Connector 21">
+              <a:extLst>
+                <a:ext uri="{FF2B5EF4-FFF2-40B4-BE49-F238E27FC236}">
+                  <a16:creationId xmlns:a16="http://schemas.microsoft.com/office/drawing/2014/main" id="{8D793A45-A37C-841D-E563-3163DD69E6E9}"/>
+                </a:ext>
+              </a:extLst>
+            </p:cNvPr>
+            <p:cNvCxnSpPr/>
+            <p:nvPr userDrawn="1"/>
+          </p:nvCxnSpPr>
+          <p:spPr>
+            <a:xfrm>
+              <a:off x="3948024" y="952500"/>
+              <a:ext cx="0" cy="4953000"/>
+            </a:xfrm>
+            <a:prstGeom prst="line">
+              <a:avLst/>
+            </a:prstGeom>
+            <a:ln w="19050">
+              <a:solidFill>
+                <a:schemeClr val="tx1">
+                  <a:lumMod val="50000"/>
+                  <a:lumOff val="50000"/>
+                </a:schemeClr>
+              </a:solidFill>
+            </a:ln>
+          </p:spPr>
+          <p:style>
+            <a:lnRef idx="1">
+              <a:schemeClr val="accent1"/>
+            </a:lnRef>
+            <a:fillRef idx="0">
+              <a:schemeClr val="accent1"/>
+            </a:fillRef>
+            <a:effectRef idx="0">
+              <a:schemeClr val="accent1"/>
+            </a:effectRef>
+            <a:fontRef idx="minor">
+              <a:schemeClr val="tx1"/>
+            </a:fontRef>
+          </p:style>
+        </p:cxnSp>
+        <p:cxnSp>
+          <p:nvCxnSpPr>
+            <p:cNvPr id="23" name="Straight Connector 22">
+              <a:extLst>
+                <a:ext uri="{FF2B5EF4-FFF2-40B4-BE49-F238E27FC236}">
+                  <a16:creationId xmlns:a16="http://schemas.microsoft.com/office/drawing/2014/main" id="{6A95FE22-C66A-B298-9224-E53B9CBBC9A5}"/>
+                </a:ext>
+              </a:extLst>
+            </p:cNvPr>
+            <p:cNvCxnSpPr/>
+            <p:nvPr userDrawn="1"/>
+          </p:nvCxnSpPr>
+          <p:spPr>
+            <a:xfrm rot="5400000">
+              <a:off x="6096000" y="954367"/>
+              <a:ext cx="0" cy="4953000"/>
+            </a:xfrm>
+            <a:prstGeom prst="line">
+              <a:avLst/>
+            </a:prstGeom>
+            <a:ln w="19050">
+              <a:solidFill>
+                <a:schemeClr val="accent1"/>
+              </a:solidFill>
+            </a:ln>
+          </p:spPr>
+          <p:style>
+            <a:lnRef idx="1">
+              <a:schemeClr val="accent1"/>
+            </a:lnRef>
+            <a:fillRef idx="0">
+              <a:schemeClr val="accent1"/>
+            </a:fillRef>
+            <a:effectRef idx="0">
+              <a:schemeClr val="accent1"/>
+            </a:effectRef>
+            <a:fontRef idx="minor">
+              <a:schemeClr val="tx1"/>
+            </a:fontRef>
+          </p:style>
+        </p:cxnSp>
+        <p:cxnSp>
+          <p:nvCxnSpPr>
+            <p:cNvPr id="24" name="Straight Connector 23">
+              <a:extLst>
+                <a:ext uri="{FF2B5EF4-FFF2-40B4-BE49-F238E27FC236}">
+                  <a16:creationId xmlns:a16="http://schemas.microsoft.com/office/drawing/2014/main" id="{BE2B7EB2-5DE6-F2AB-FFBE-722398805FB1}"/>
+                </a:ext>
+              </a:extLst>
+            </p:cNvPr>
+            <p:cNvCxnSpPr/>
+            <p:nvPr userDrawn="1"/>
+          </p:nvCxnSpPr>
+          <p:spPr>
+            <a:xfrm rot="5400000">
+              <a:off x="6096000" y="-252325"/>
+              <a:ext cx="0" cy="4953000"/>
+            </a:xfrm>
+            <a:prstGeom prst="line">
+              <a:avLst/>
+            </a:prstGeom>
+            <a:ln w="19050">
+              <a:solidFill>
+                <a:srgbClr val="00B050"/>
+              </a:solidFill>
+            </a:ln>
+          </p:spPr>
+          <p:style>
+            <a:lnRef idx="1">
+              <a:schemeClr val="accent1"/>
+            </a:lnRef>
+            <a:fillRef idx="0">
+              <a:schemeClr val="accent1"/>
+            </a:fillRef>
+            <a:effectRef idx="0">
+              <a:schemeClr val="accent1"/>
+            </a:effectRef>
+            <a:fontRef idx="minor">
+              <a:schemeClr val="tx1"/>
+            </a:fontRef>
+          </p:style>
+        </p:cxnSp>
+        <p:cxnSp>
+          <p:nvCxnSpPr>
+            <p:cNvPr id="25" name="Straight Connector 24">
+              <a:extLst>
+                <a:ext uri="{FF2B5EF4-FFF2-40B4-BE49-F238E27FC236}">
+                  <a16:creationId xmlns:a16="http://schemas.microsoft.com/office/drawing/2014/main" id="{C9C0B10D-E0BD-45CC-428D-D58208A32729}"/>
+                </a:ext>
+              </a:extLst>
+            </p:cNvPr>
+            <p:cNvCxnSpPr/>
+            <p:nvPr userDrawn="1"/>
+          </p:nvCxnSpPr>
+          <p:spPr>
+            <a:xfrm rot="5400000">
+              <a:off x="6096000" y="2197577"/>
+              <a:ext cx="0" cy="4953000"/>
+            </a:xfrm>
+            <a:prstGeom prst="line">
+              <a:avLst/>
+            </a:prstGeom>
+            <a:ln w="19050">
+              <a:solidFill>
+                <a:srgbClr val="00B050"/>
+              </a:solidFill>
+            </a:ln>
+          </p:spPr>
+          <p:style>
+            <a:lnRef idx="1">
+              <a:schemeClr val="accent1"/>
+            </a:lnRef>
+            <a:fillRef idx="0">
+              <a:schemeClr val="accent1"/>
+            </a:fillRef>
+            <a:effectRef idx="0">
+              <a:schemeClr val="accent1"/>
+            </a:effectRef>
+            <a:fontRef idx="minor">
+              <a:schemeClr val="tx1"/>
+            </a:fontRef>
+          </p:style>
+        </p:cxnSp>
+        <p:cxnSp>
+          <p:nvCxnSpPr>
+            <p:cNvPr id="26" name="Straight Connector 25">
+              <a:extLst>
+                <a:ext uri="{FF2B5EF4-FFF2-40B4-BE49-F238E27FC236}">
+                  <a16:creationId xmlns:a16="http://schemas.microsoft.com/office/drawing/2014/main" id="{256B860A-C138-6AFC-0857-39473237E5AF}"/>
+                </a:ext>
+              </a:extLst>
+            </p:cNvPr>
+            <p:cNvCxnSpPr/>
+            <p:nvPr userDrawn="1"/>
+          </p:nvCxnSpPr>
+          <p:spPr>
+            <a:xfrm rot="5400000">
+              <a:off x="6096000" y="2801427"/>
+              <a:ext cx="0" cy="4953000"/>
+            </a:xfrm>
+            <a:prstGeom prst="line">
+              <a:avLst/>
+            </a:prstGeom>
+            <a:ln w="19050">
+              <a:solidFill>
+                <a:schemeClr val="tx1">
+                  <a:lumMod val="50000"/>
+                  <a:lumOff val="50000"/>
+                </a:schemeClr>
+              </a:solidFill>
+            </a:ln>
+          </p:spPr>
+          <p:style>
+            <a:lnRef idx="1">
+              <a:schemeClr val="accent1"/>
+            </a:lnRef>
+            <a:fillRef idx="0">
+              <a:schemeClr val="accent1"/>
+            </a:fillRef>
+            <a:effectRef idx="0">
+              <a:schemeClr val="accent1"/>
+            </a:effectRef>
+            <a:fontRef idx="minor">
+              <a:schemeClr val="tx1"/>
+            </a:fontRef>
+          </p:style>
+        </p:cxnSp>
+        <p:cxnSp>
+          <p:nvCxnSpPr>
+            <p:cNvPr id="27" name="Straight Connector 26">
+              <a:extLst>
+                <a:ext uri="{FF2B5EF4-FFF2-40B4-BE49-F238E27FC236}">
+                  <a16:creationId xmlns:a16="http://schemas.microsoft.com/office/drawing/2014/main" id="{409B52C1-19BC-43A9-28B0-339A0689031A}"/>
+                </a:ext>
+              </a:extLst>
+            </p:cNvPr>
+            <p:cNvCxnSpPr/>
+            <p:nvPr userDrawn="1"/>
+          </p:nvCxnSpPr>
+          <p:spPr>
+            <a:xfrm rot="5400000">
+              <a:off x="6096000" y="1585102"/>
+              <a:ext cx="0" cy="4953000"/>
+            </a:xfrm>
+            <a:prstGeom prst="line">
+              <a:avLst/>
+            </a:prstGeom>
+            <a:ln w="19050">
+              <a:solidFill>
+                <a:schemeClr val="tx1">
+                  <a:lumMod val="50000"/>
+                  <a:lumOff val="50000"/>
+                </a:schemeClr>
+              </a:solidFill>
+            </a:ln>
+          </p:spPr>
+          <p:style>
+            <a:lnRef idx="1">
+              <a:schemeClr val="accent1"/>
+            </a:lnRef>
+            <a:fillRef idx="0">
+              <a:schemeClr val="accent1"/>
+            </a:fillRef>
+            <a:effectRef idx="0">
+              <a:schemeClr val="accent1"/>
+            </a:effectRef>
+            <a:fontRef idx="minor">
+              <a:schemeClr val="tx1"/>
+            </a:fontRef>
+          </p:style>
+        </p:cxnSp>
+        <p:cxnSp>
+          <p:nvCxnSpPr>
+            <p:cNvPr id="28" name="Straight Connector 27">
+              <a:extLst>
+                <a:ext uri="{FF2B5EF4-FFF2-40B4-BE49-F238E27FC236}">
+                  <a16:creationId xmlns:a16="http://schemas.microsoft.com/office/drawing/2014/main" id="{66C514AA-28EB-F313-ED1F-AEE0FCD8B72F}"/>
+                </a:ext>
+              </a:extLst>
+            </p:cNvPr>
+            <p:cNvCxnSpPr/>
+            <p:nvPr userDrawn="1"/>
+          </p:nvCxnSpPr>
+          <p:spPr>
+            <a:xfrm rot="5400000">
+              <a:off x="6096000" y="360151"/>
+              <a:ext cx="0" cy="4953000"/>
+            </a:xfrm>
+            <a:prstGeom prst="line">
+              <a:avLst/>
+            </a:prstGeom>
+            <a:ln w="19050">
+              <a:solidFill>
+                <a:schemeClr val="tx1">
+                  <a:lumMod val="50000"/>
+                  <a:lumOff val="50000"/>
+                </a:schemeClr>
+              </a:solidFill>
+            </a:ln>
+          </p:spPr>
+          <p:style>
+            <a:lnRef idx="1">
+              <a:schemeClr val="accent1"/>
+            </a:lnRef>
+            <a:fillRef idx="0">
+              <a:schemeClr val="accent1"/>
+            </a:fillRef>
+            <a:effectRef idx="0">
+              <a:schemeClr val="accent1"/>
+            </a:effectRef>
+            <a:fontRef idx="minor">
+              <a:schemeClr val="tx1"/>
+            </a:fontRef>
+          </p:style>
+        </p:cxnSp>
+        <p:cxnSp>
+          <p:nvCxnSpPr>
+            <p:cNvPr id="29" name="Straight Connector 28">
+              <a:extLst>
+                <a:ext uri="{FF2B5EF4-FFF2-40B4-BE49-F238E27FC236}">
+                  <a16:creationId xmlns:a16="http://schemas.microsoft.com/office/drawing/2014/main" id="{2D8B3D85-4EDA-0E09-B3AE-4E2550D09577}"/>
+                </a:ext>
+              </a:extLst>
+            </p:cNvPr>
+            <p:cNvCxnSpPr/>
+            <p:nvPr userDrawn="1"/>
+          </p:nvCxnSpPr>
+          <p:spPr>
+            <a:xfrm rot="5400000">
+              <a:off x="6096000" y="-890679"/>
+              <a:ext cx="0" cy="4953000"/>
+            </a:xfrm>
+            <a:prstGeom prst="line">
+              <a:avLst/>
+            </a:prstGeom>
+            <a:ln w="19050">
+              <a:solidFill>
+                <a:schemeClr val="tx1">
+                  <a:lumMod val="50000"/>
+                  <a:lumOff val="50000"/>
+                </a:schemeClr>
+              </a:solidFill>
+            </a:ln>
+          </p:spPr>
+          <p:style>
+            <a:lnRef idx="1">
+              <a:schemeClr val="accent1"/>
+            </a:lnRef>
+            <a:fillRef idx="0">
+              <a:schemeClr val="accent1"/>
+            </a:fillRef>
+            <a:effectRef idx="0">
+              <a:schemeClr val="accent1"/>
+            </a:effectRef>
+            <a:fontRef idx="minor">
+              <a:schemeClr val="tx1"/>
+            </a:fontRef>
+          </p:style>
+        </p:cxnSp>
+        <p:cxnSp>
+          <p:nvCxnSpPr>
+            <p:cNvPr id="30" name="Straight Connector 29">
+              <a:extLst>
+                <a:ext uri="{FF2B5EF4-FFF2-40B4-BE49-F238E27FC236}">
+                  <a16:creationId xmlns:a16="http://schemas.microsoft.com/office/drawing/2014/main" id="{7063788D-B564-8E39-21CD-329688FFB64C}"/>
+                </a:ext>
+              </a:extLst>
+            </p:cNvPr>
+            <p:cNvCxnSpPr/>
+            <p:nvPr userDrawn="1"/>
+          </p:nvCxnSpPr>
+          <p:spPr>
+            <a:xfrm rot="5400000">
+              <a:off x="6096000" y="1263049"/>
+              <a:ext cx="0" cy="4953000"/>
+            </a:xfrm>
+            <a:prstGeom prst="line">
+              <a:avLst/>
+            </a:prstGeom>
+            <a:ln w="19050">
+              <a:solidFill>
+                <a:schemeClr val="tx1">
+                  <a:lumMod val="50000"/>
+                  <a:lumOff val="50000"/>
+                </a:schemeClr>
+              </a:solidFill>
+            </a:ln>
+          </p:spPr>
+          <p:style>
+            <a:lnRef idx="1">
+              <a:schemeClr val="accent1"/>
+            </a:lnRef>
+            <a:fillRef idx="0">
+              <a:schemeClr val="accent1"/>
+            </a:fillRef>
+            <a:effectRef idx="0">
+              <a:schemeClr val="accent1"/>
+            </a:effectRef>
+            <a:fontRef idx="minor">
+              <a:schemeClr val="tx1"/>
+            </a:fontRef>
+          </p:style>
+        </p:cxnSp>
+        <p:cxnSp>
+          <p:nvCxnSpPr>
+            <p:cNvPr id="31" name="Straight Connector 30">
+              <a:extLst>
+                <a:ext uri="{FF2B5EF4-FFF2-40B4-BE49-F238E27FC236}">
+                  <a16:creationId xmlns:a16="http://schemas.microsoft.com/office/drawing/2014/main" id="{57D1784F-6845-67A9-A8D2-2E4D284022E0}"/>
+                </a:ext>
+              </a:extLst>
+            </p:cNvPr>
+            <p:cNvCxnSpPr/>
+            <p:nvPr userDrawn="1"/>
+          </p:nvCxnSpPr>
+          <p:spPr>
+            <a:xfrm rot="5400000">
+              <a:off x="6096000" y="63977"/>
+              <a:ext cx="0" cy="4953000"/>
+            </a:xfrm>
+            <a:prstGeom prst="line">
+              <a:avLst/>
+            </a:prstGeom>
+            <a:ln w="19050">
+              <a:solidFill>
+                <a:schemeClr val="tx1">
+                  <a:lumMod val="50000"/>
+                  <a:lumOff val="50000"/>
+                </a:schemeClr>
+              </a:solidFill>
+            </a:ln>
+          </p:spPr>
+          <p:style>
+            <a:lnRef idx="1">
+              <a:schemeClr val="accent1"/>
+            </a:lnRef>
+            <a:fillRef idx="0">
+              <a:schemeClr val="accent1"/>
+            </a:fillRef>
+            <a:effectRef idx="0">
+              <a:schemeClr val="accent1"/>
+            </a:effectRef>
+            <a:fontRef idx="minor">
+              <a:schemeClr val="tx1"/>
+            </a:fontRef>
+          </p:style>
+        </p:cxnSp>
+        <p:cxnSp>
+          <p:nvCxnSpPr>
+            <p:cNvPr id="32" name="Straight Connector 31">
+              <a:extLst>
+                <a:ext uri="{FF2B5EF4-FFF2-40B4-BE49-F238E27FC236}">
+                  <a16:creationId xmlns:a16="http://schemas.microsoft.com/office/drawing/2014/main" id="{C92C9CE7-0105-EFCB-7720-E76003E8ACB0}"/>
+                </a:ext>
+              </a:extLst>
+            </p:cNvPr>
+            <p:cNvCxnSpPr/>
+            <p:nvPr userDrawn="1"/>
+          </p:nvCxnSpPr>
+          <p:spPr>
+            <a:xfrm rot="5400000">
+              <a:off x="6096000" y="2513879"/>
+              <a:ext cx="0" cy="4953000"/>
+            </a:xfrm>
+            <a:prstGeom prst="line">
+              <a:avLst/>
+            </a:prstGeom>
+            <a:ln w="19050">
+              <a:solidFill>
+                <a:schemeClr val="tx1">
+                  <a:lumMod val="50000"/>
+                  <a:lumOff val="50000"/>
+                </a:schemeClr>
+              </a:solidFill>
+            </a:ln>
+          </p:spPr>
+          <p:style>
+            <a:lnRef idx="1">
+              <a:schemeClr val="accent1"/>
+            </a:lnRef>
+            <a:fillRef idx="0">
+              <a:schemeClr val="accent1"/>
+            </a:fillRef>
+            <a:effectRef idx="0">
+              <a:schemeClr val="accent1"/>
+            </a:effectRef>
+            <a:fontRef idx="minor">
+              <a:schemeClr val="tx1"/>
+            </a:fontRef>
+          </p:style>
+        </p:cxnSp>
+        <p:cxnSp>
+          <p:nvCxnSpPr>
+            <p:cNvPr id="33" name="Straight Connector 32">
+              <a:extLst>
+                <a:ext uri="{FF2B5EF4-FFF2-40B4-BE49-F238E27FC236}">
+                  <a16:creationId xmlns:a16="http://schemas.microsoft.com/office/drawing/2014/main" id="{5C0BEB12-4E34-844C-F77B-CF934F911264}"/>
+                </a:ext>
+              </a:extLst>
+            </p:cNvPr>
+            <p:cNvCxnSpPr/>
+            <p:nvPr userDrawn="1"/>
+          </p:nvCxnSpPr>
+          <p:spPr>
+            <a:xfrm rot="5400000">
+              <a:off x="6096000" y="3117729"/>
+              <a:ext cx="0" cy="4953000"/>
+            </a:xfrm>
+            <a:prstGeom prst="line">
+              <a:avLst/>
+            </a:prstGeom>
+            <a:ln w="19050">
+              <a:solidFill>
+                <a:schemeClr val="tx1">
+                  <a:lumMod val="50000"/>
+                  <a:lumOff val="50000"/>
+                </a:schemeClr>
+              </a:solidFill>
+            </a:ln>
+          </p:spPr>
+          <p:style>
+            <a:lnRef idx="1">
+              <a:schemeClr val="accent1"/>
+            </a:lnRef>
+            <a:fillRef idx="0">
+              <a:schemeClr val="accent1"/>
+            </a:fillRef>
+            <a:effectRef idx="0">
+              <a:schemeClr val="accent1"/>
+            </a:effectRef>
+            <a:fontRef idx="minor">
+              <a:schemeClr val="tx1"/>
+            </a:fontRef>
+          </p:style>
+        </p:cxnSp>
+        <p:cxnSp>
+          <p:nvCxnSpPr>
+            <p:cNvPr id="34" name="Straight Connector 33">
+              <a:extLst>
+                <a:ext uri="{FF2B5EF4-FFF2-40B4-BE49-F238E27FC236}">
+                  <a16:creationId xmlns:a16="http://schemas.microsoft.com/office/drawing/2014/main" id="{F8704209-912D-2A11-364A-7C803D740E0A}"/>
+                </a:ext>
+              </a:extLst>
+            </p:cNvPr>
+            <p:cNvCxnSpPr/>
+            <p:nvPr userDrawn="1"/>
+          </p:nvCxnSpPr>
+          <p:spPr>
+            <a:xfrm rot="5400000">
+              <a:off x="6096000" y="1901404"/>
+              <a:ext cx="0" cy="4953000"/>
+            </a:xfrm>
+            <a:prstGeom prst="line">
+              <a:avLst/>
+            </a:prstGeom>
+            <a:ln w="19050">
+              <a:solidFill>
+                <a:schemeClr val="tx1">
+                  <a:lumMod val="50000"/>
+                  <a:lumOff val="50000"/>
+                </a:schemeClr>
+              </a:solidFill>
+            </a:ln>
+          </p:spPr>
+          <p:style>
+            <a:lnRef idx="1">
+              <a:schemeClr val="accent1"/>
+            </a:lnRef>
+            <a:fillRef idx="0">
+              <a:schemeClr val="accent1"/>
+            </a:fillRef>
+            <a:effectRef idx="0">
+              <a:schemeClr val="accent1"/>
+            </a:effectRef>
+            <a:fontRef idx="minor">
+              <a:schemeClr val="tx1"/>
+            </a:fontRef>
+          </p:style>
+        </p:cxnSp>
+        <p:cxnSp>
+          <p:nvCxnSpPr>
+            <p:cNvPr id="35" name="Straight Connector 34">
+              <a:extLst>
+                <a:ext uri="{FF2B5EF4-FFF2-40B4-BE49-F238E27FC236}">
+                  <a16:creationId xmlns:a16="http://schemas.microsoft.com/office/drawing/2014/main" id="{E6CF9AB5-5B4E-317F-8301-817815780D9C}"/>
+                </a:ext>
+              </a:extLst>
+            </p:cNvPr>
+            <p:cNvCxnSpPr/>
+            <p:nvPr userDrawn="1"/>
+          </p:nvCxnSpPr>
+          <p:spPr>
+            <a:xfrm rot="5400000">
+              <a:off x="6096000" y="645973"/>
+              <a:ext cx="0" cy="4953000"/>
+            </a:xfrm>
+            <a:prstGeom prst="line">
+              <a:avLst/>
+            </a:prstGeom>
+            <a:ln w="19050">
+              <a:solidFill>
+                <a:schemeClr val="tx1">
+                  <a:lumMod val="50000"/>
+                  <a:lumOff val="50000"/>
+                </a:schemeClr>
+              </a:solidFill>
+            </a:ln>
+          </p:spPr>
+          <p:style>
+            <a:lnRef idx="1">
+              <a:schemeClr val="accent1"/>
+            </a:lnRef>
+            <a:fillRef idx="0">
+              <a:schemeClr val="accent1"/>
+            </a:fillRef>
+            <a:effectRef idx="0">
+              <a:schemeClr val="accent1"/>
+            </a:effectRef>
+            <a:fontRef idx="minor">
+              <a:schemeClr val="tx1"/>
+            </a:fontRef>
+          </p:style>
+        </p:cxnSp>
+        <p:cxnSp>
+          <p:nvCxnSpPr>
+            <p:cNvPr id="36" name="Straight Connector 35">
+              <a:extLst>
+                <a:ext uri="{FF2B5EF4-FFF2-40B4-BE49-F238E27FC236}">
+                  <a16:creationId xmlns:a16="http://schemas.microsoft.com/office/drawing/2014/main" id="{F17390F8-7257-9D13-311A-299DD9F24025}"/>
+                </a:ext>
+              </a:extLst>
+            </p:cNvPr>
+            <p:cNvCxnSpPr/>
+            <p:nvPr userDrawn="1"/>
+          </p:nvCxnSpPr>
+          <p:spPr>
+            <a:xfrm rot="5400000">
+              <a:off x="6096000" y="-574377"/>
+              <a:ext cx="0" cy="4953000"/>
+            </a:xfrm>
+            <a:prstGeom prst="line">
+              <a:avLst/>
+            </a:prstGeom>
+            <a:ln w="19050">
+              <a:solidFill>
+                <a:schemeClr val="tx1">
+                  <a:lumMod val="50000"/>
+                  <a:lumOff val="50000"/>
+                </a:schemeClr>
+              </a:solidFill>
+            </a:ln>
+          </p:spPr>
+          <p:style>
+            <a:lnRef idx="1">
+              <a:schemeClr val="accent1"/>
+            </a:lnRef>
+            <a:fillRef idx="0">
+              <a:schemeClr val="accent1"/>
+            </a:fillRef>
+            <a:effectRef idx="0">
+              <a:schemeClr val="accent1"/>
+            </a:effectRef>
+            <a:fontRef idx="minor">
+              <a:schemeClr val="tx1"/>
+            </a:fontRef>
+          </p:style>
+        </p:cxnSp>
+        <p:cxnSp>
+          <p:nvCxnSpPr>
+            <p:cNvPr id="37" name="Straight Connector 36">
+              <a:extLst>
+                <a:ext uri="{FF2B5EF4-FFF2-40B4-BE49-F238E27FC236}">
+                  <a16:creationId xmlns:a16="http://schemas.microsoft.com/office/drawing/2014/main" id="{59D0653D-C66A-D94B-E3DD-E925FB6D292E}"/>
+                </a:ext>
+              </a:extLst>
+            </p:cNvPr>
+            <p:cNvCxnSpPr/>
+            <p:nvPr userDrawn="1"/>
+          </p:nvCxnSpPr>
+          <p:spPr>
+            <a:xfrm rot="5400000">
+              <a:off x="6096000" y="-1201229"/>
+              <a:ext cx="0" cy="4953000"/>
+            </a:xfrm>
+            <a:prstGeom prst="line">
+              <a:avLst/>
+            </a:prstGeom>
+            <a:ln w="19050">
+              <a:solidFill>
+                <a:schemeClr val="tx1">
+                  <a:lumMod val="50000"/>
+                  <a:lumOff val="50000"/>
+                </a:schemeClr>
+              </a:solidFill>
+            </a:ln>
+          </p:spPr>
+          <p:style>
+            <a:lnRef idx="1">
+              <a:schemeClr val="accent1"/>
+            </a:lnRef>
+            <a:fillRef idx="0">
+              <a:schemeClr val="accent1"/>
+            </a:fillRef>
+            <a:effectRef idx="0">
+              <a:schemeClr val="accent1"/>
+            </a:effectRef>
+            <a:fontRef idx="minor">
+              <a:schemeClr val="tx1"/>
+            </a:fontRef>
+          </p:style>
+        </p:cxnSp>
+      </p:grpSp>
     </p:spTree>
     <p:extLst>
       <p:ext uri="{BB962C8B-B14F-4D97-AF65-F5344CB8AC3E}">
-        <p14:creationId xmlns:p14="http://schemas.microsoft.com/office/powerpoint/2010/main" val="353058090"/>
-      </p:ext>
-    </p:extLst>
-  </p:cSld>
-  <p:clrMapOvr>
-    <a:masterClrMapping/>
-  </p:clrMapOvr>
-</p:sldLayout>
-</file>
-
-<file path=ppt/slideLayouts/slideLayout9.xml><?xml version="1.0" encoding="utf-8"?>
-<p:sldLayout xmlns:a="http://schemas.openxmlformats.org/drawingml/2006/main" xmlns:r="http://schemas.openxmlformats.org/officeDocument/2006/relationships" xmlns:p="http://schemas.openxmlformats.org/presentationml/2006/main" type="picTx" preserve="1">
-  <p:cSld name="Picture with Caption">
-    <p:spTree>
-      <p:nvGrpSpPr>
-        <p:cNvPr id="1" name=""/>
-        <p:cNvGrpSpPr/>
-        <p:nvPr/>
-      </p:nvGrpSpPr>
-      <p:grpSpPr>
-        <a:xfrm>
-          <a:off x="0" y="0"/>
-          <a:ext cx="0" cy="0"/>
-          <a:chOff x="0" y="0"/>
-          <a:chExt cx="0" cy="0"/>
-        </a:xfrm>
-      </p:grpSpPr>
-      <p:sp>
-        <p:nvSpPr>
-          <p:cNvPr id="2" name="Title 1">
-            <a:extLst>
-              <a:ext uri="{FF2B5EF4-FFF2-40B4-BE49-F238E27FC236}">
-                <a16:creationId xmlns:a16="http://schemas.microsoft.com/office/drawing/2014/main" id="{98D301F1-97BE-4F90-B6D7-98AC5A10DCBA}"/>
-              </a:ext>
-            </a:extLst>
-          </p:cNvPr>
-          <p:cNvSpPr>
-            <a:spLocks noGrp="1"/>
-          </p:cNvSpPr>
-          <p:nvPr>
-            <p:ph type="title"/>
-          </p:nvPr>
-        </p:nvSpPr>
-        <p:spPr>
-          <a:xfrm>
-            <a:off x="839788" y="457200"/>
-            <a:ext cx="3932237" cy="1600200"/>
-          </a:xfrm>
-        </p:spPr>
-        <p:txBody>
-          <a:bodyPr anchor="b"/>
-          <a:lstStyle>
-            <a:lvl1pPr>
-              <a:defRPr sz="3200"/>
-            </a:lvl1pPr>
-          </a:lstStyle>
-          <a:p>
-            <a:r>
-              <a:rPr lang="en-US"/>
-              <a:t>Click to edit Master title style</a:t>
-            </a:r>
-          </a:p>
-        </p:txBody>
-      </p:sp>
-      <p:sp>
-        <p:nvSpPr>
-          <p:cNvPr id="3" name="Picture Placeholder 2">
-            <a:extLst>
-              <a:ext uri="{FF2B5EF4-FFF2-40B4-BE49-F238E27FC236}">
-                <a16:creationId xmlns:a16="http://schemas.microsoft.com/office/drawing/2014/main" id="{D9189197-B16F-42D1-8527-C734EFFC860E}"/>
-              </a:ext>
-            </a:extLst>
-          </p:cNvPr>
-          <p:cNvSpPr>
-            <a:spLocks noGrp="1"/>
-          </p:cNvSpPr>
-          <p:nvPr>
-            <p:ph type="pic" idx="1"/>
-          </p:nvPr>
-        </p:nvSpPr>
-        <p:spPr>
-          <a:xfrm>
-            <a:off x="5183188" y="987425"/>
-            <a:ext cx="6172200" cy="4873625"/>
-          </a:xfrm>
-        </p:spPr>
-        <p:txBody>
-          <a:bodyPr/>
-          <a:lstStyle>
-            <a:lvl1pPr marL="0" indent="0">
-              <a:buNone/>
-              <a:defRPr sz="3200"/>
-            </a:lvl1pPr>
-            <a:lvl2pPr marL="457200" indent="0">
-              <a:buNone/>
-              <a:defRPr sz="2800"/>
-            </a:lvl2pPr>
-            <a:lvl3pPr marL="914400" indent="0">
-              <a:buNone/>
-              <a:defRPr sz="2400"/>
-            </a:lvl3pPr>
-            <a:lvl4pPr marL="1371600" indent="0">
-              <a:buNone/>
-              <a:defRPr sz="2000"/>
-            </a:lvl4pPr>
-            <a:lvl5pPr marL="1828800" indent="0">
-              <a:buNone/>
-              <a:defRPr sz="2000"/>
-            </a:lvl5pPr>
-            <a:lvl6pPr marL="2286000" indent="0">
-              <a:buNone/>
-              <a:defRPr sz="2000"/>
-            </a:lvl6pPr>
-            <a:lvl7pPr marL="2743200" indent="0">
-              <a:buNone/>
-              <a:defRPr sz="2000"/>
-            </a:lvl7pPr>
-            <a:lvl8pPr marL="3200400" indent="0">
-              <a:buNone/>
-              <a:defRPr sz="2000"/>
-            </a:lvl8pPr>
-            <a:lvl9pPr marL="3657600" indent="0">
-              <a:buNone/>
-              <a:defRPr sz="2000"/>
-            </a:lvl9pPr>
-          </a:lstStyle>
-          <a:p>
-            <a:endParaRPr lang="en-US"/>
-          </a:p>
-        </p:txBody>
-      </p:sp>
-      <p:sp>
-        <p:nvSpPr>
-          <p:cNvPr id="4" name="Text Placeholder 3">
-            <a:extLst>
-              <a:ext uri="{FF2B5EF4-FFF2-40B4-BE49-F238E27FC236}">
-                <a16:creationId xmlns:a16="http://schemas.microsoft.com/office/drawing/2014/main" id="{7C337D73-10AA-440A-8ADC-65AF0CA7286B}"/>
-              </a:ext>
-            </a:extLst>
-          </p:cNvPr>
-          <p:cNvSpPr>
-            <a:spLocks noGrp="1"/>
-          </p:cNvSpPr>
-          <p:nvPr>
-            <p:ph type="body" sz="half" idx="2"/>
-          </p:nvPr>
-        </p:nvSpPr>
-        <p:spPr>
-          <a:xfrm>
-            <a:off x="839788" y="2057400"/>
-            <a:ext cx="3932237" cy="3811588"/>
-          </a:xfrm>
-        </p:spPr>
-        <p:txBody>
-          <a:bodyPr/>
-          <a:lstStyle>
-            <a:lvl1pPr marL="0" indent="0">
-              <a:buNone/>
-              <a:defRPr sz="1600"/>
-            </a:lvl1pPr>
-            <a:lvl2pPr marL="457200" indent="0">
-              <a:buNone/>
-              <a:defRPr sz="1400"/>
-            </a:lvl2pPr>
-            <a:lvl3pPr marL="914400" indent="0">
-              <a:buNone/>
-              <a:defRPr sz="1200"/>
-            </a:lvl3pPr>
-            <a:lvl4pPr marL="1371600" indent="0">
-              <a:buNone/>
-              <a:defRPr sz="1000"/>
-            </a:lvl4pPr>
-            <a:lvl5pPr marL="1828800" indent="0">
-              <a:buNone/>
-              <a:defRPr sz="1000"/>
-            </a:lvl5pPr>
-            <a:lvl6pPr marL="2286000" indent="0">
-              <a:buNone/>
-              <a:defRPr sz="1000"/>
-            </a:lvl6pPr>
-            <a:lvl7pPr marL="2743200" indent="0">
-              <a:buNone/>
-              <a:defRPr sz="1000"/>
-            </a:lvl7pPr>
-            <a:lvl8pPr marL="3200400" indent="0">
-              <a:buNone/>
-              <a:defRPr sz="1000"/>
-            </a:lvl8pPr>
-            <a:lvl9pPr marL="3657600" indent="0">
-              <a:buNone/>
-              <a:defRPr sz="1000"/>
-            </a:lvl9pPr>
-          </a:lstStyle>
-          <a:p>
-            <a:pPr lvl="0"/>
-            <a:r>
-              <a:rPr lang="en-US"/>
-              <a:t>Click to edit Master text styles</a:t>
-            </a:r>
-          </a:p>
-        </p:txBody>
-      </p:sp>
-      <p:sp>
-        <p:nvSpPr>
-          <p:cNvPr id="5" name="Date Placeholder 4">
-            <a:extLst>
-              <a:ext uri="{FF2B5EF4-FFF2-40B4-BE49-F238E27FC236}">
-                <a16:creationId xmlns:a16="http://schemas.microsoft.com/office/drawing/2014/main" id="{EA2304FB-4594-40C5-B659-258E31904B53}"/>
-              </a:ext>
-            </a:extLst>
-          </p:cNvPr>
-          <p:cNvSpPr>
-            <a:spLocks noGrp="1"/>
-          </p:cNvSpPr>
-          <p:nvPr>
-            <p:ph type="dt" sz="half" idx="10"/>
-          </p:nvPr>
-        </p:nvSpPr>
-        <p:spPr/>
-        <p:txBody>
-          <a:bodyPr/>
-          <a:lstStyle/>
-          <a:p>
-            <a:fld id="{4B23F753-79FB-41FF-B056-5F6BF77DE748}" type="datetimeFigureOut">
-              <a:rPr lang="en-US" smtClean="0"/>
-              <a:t>12/17/2023</a:t>
-            </a:fld>
-            <a:endParaRPr lang="en-US"/>
-          </a:p>
-        </p:txBody>
-      </p:sp>
-      <p:sp>
-        <p:nvSpPr>
-          <p:cNvPr id="6" name="Footer Placeholder 5">
-            <a:extLst>
-              <a:ext uri="{FF2B5EF4-FFF2-40B4-BE49-F238E27FC236}">
-                <a16:creationId xmlns:a16="http://schemas.microsoft.com/office/drawing/2014/main" id="{C4162AB5-A424-4726-869A-88FB7D7DB4AC}"/>
-              </a:ext>
-            </a:extLst>
-          </p:cNvPr>
-          <p:cNvSpPr>
-            <a:spLocks noGrp="1"/>
-          </p:cNvSpPr>
-          <p:nvPr>
-            <p:ph type="ftr" sz="quarter" idx="11"/>
-          </p:nvPr>
-        </p:nvSpPr>
-        <p:spPr/>
-        <p:txBody>
-          <a:bodyPr/>
-          <a:lstStyle/>
-          <a:p>
-            <a:endParaRPr lang="en-US"/>
-          </a:p>
-        </p:txBody>
-      </p:sp>
-      <p:sp>
-        <p:nvSpPr>
-          <p:cNvPr id="7" name="Slide Number Placeholder 6">
-            <a:extLst>
-              <a:ext uri="{FF2B5EF4-FFF2-40B4-BE49-F238E27FC236}">
-                <a16:creationId xmlns:a16="http://schemas.microsoft.com/office/drawing/2014/main" id="{E2F4DD65-CE1E-4962-B0DB-034AED4F065E}"/>
-              </a:ext>
-            </a:extLst>
-          </p:cNvPr>
-          <p:cNvSpPr>
-            <a:spLocks noGrp="1"/>
-          </p:cNvSpPr>
-          <p:nvPr>
-            <p:ph type="sldNum" sz="quarter" idx="12"/>
-          </p:nvPr>
-        </p:nvSpPr>
-        <p:spPr/>
-        <p:txBody>
-          <a:bodyPr/>
-          <a:lstStyle/>
-          <a:p>
-            <a:fld id="{28399D25-E7A0-46ED-A17A-14974008713C}" type="slidenum">
-              <a:rPr lang="en-US" smtClean="0"/>
-              <a:t>‹#›</a:t>
-            </a:fld>
-            <a:endParaRPr lang="en-US"/>
-          </a:p>
-        </p:txBody>
-      </p:sp>
-    </p:spTree>
-    <p:extLst>
-      <p:ext uri="{BB962C8B-B14F-4D97-AF65-F5344CB8AC3E}">
-        <p14:creationId xmlns:p14="http://schemas.microsoft.com/office/powerpoint/2010/main" val="3281335597"/>
+        <p14:creationId xmlns:p14="http://schemas.microsoft.com/office/powerpoint/2010/main" val="1172310121"/>
       </p:ext>
     </p:extLst>
   </p:cSld>
@@ -2977,7 +4598,7 @@
           <a:p>
             <a:fld id="{4B23F753-79FB-41FF-B056-5F6BF77DE748}" type="datetimeFigureOut">
               <a:rPr lang="en-US" smtClean="0"/>
-              <a:t>12/17/2023</a:t>
+              <a:t>1/24/2024</a:t>
             </a:fld>
             <a:endParaRPr lang="en-US"/>
           </a:p>
@@ -3089,10 +4710,12 @@
     <p:sldLayoutId id="2147483653" r:id="rId5"/>
     <p:sldLayoutId id="2147483654" r:id="rId6"/>
     <p:sldLayoutId id="2147483655" r:id="rId7"/>
-    <p:sldLayoutId id="2147483656" r:id="rId8"/>
-    <p:sldLayoutId id="2147483657" r:id="rId9"/>
-    <p:sldLayoutId id="2147483658" r:id="rId10"/>
-    <p:sldLayoutId id="2147483659" r:id="rId11"/>
+    <p:sldLayoutId id="2147483660" r:id="rId8"/>
+    <p:sldLayoutId id="2147483661" r:id="rId9"/>
+    <p:sldLayoutId id="2147483656" r:id="rId10"/>
+    <p:sldLayoutId id="2147483657" r:id="rId11"/>
+    <p:sldLayoutId id="2147483658" r:id="rId12"/>
+    <p:sldLayoutId id="2147483659" r:id="rId13"/>
   </p:sldLayoutIdLst>
   <p:txStyles>
     <p:titleStyle>
@@ -4154,6 +5777,1973 @@
 </p:sld>
 </file>
 
+<file path=ppt/slides/slide4.xml><?xml version="1.0" encoding="utf-8"?>
+<p:sld xmlns:a="http://schemas.openxmlformats.org/drawingml/2006/main" xmlns:r="http://schemas.openxmlformats.org/officeDocument/2006/relationships" xmlns:p="http://schemas.openxmlformats.org/presentationml/2006/main">
+  <p:cSld>
+    <p:spTree>
+      <p:nvGrpSpPr>
+        <p:cNvPr id="1" name=""/>
+        <p:cNvGrpSpPr/>
+        <p:nvPr/>
+      </p:nvGrpSpPr>
+      <p:grpSpPr>
+        <a:xfrm>
+          <a:off x="0" y="0"/>
+          <a:ext cx="0" cy="0"/>
+          <a:chOff x="0" y="0"/>
+          <a:chExt cx="0" cy="0"/>
+        </a:xfrm>
+      </p:grpSpPr>
+      <p:sp>
+        <p:nvSpPr>
+          <p:cNvPr id="5" name="Title 5">
+            <a:extLst>
+              <a:ext uri="{FF2B5EF4-FFF2-40B4-BE49-F238E27FC236}">
+                <a16:creationId xmlns:a16="http://schemas.microsoft.com/office/drawing/2014/main" id="{3A3B9CBE-C5F1-552D-444D-A87ABCB8E24C}"/>
+              </a:ext>
+            </a:extLst>
+          </p:cNvPr>
+          <p:cNvSpPr txBox="1">
+            <a:spLocks/>
+          </p:cNvSpPr>
+          <p:nvPr/>
+        </p:nvSpPr>
+        <p:spPr>
+          <a:xfrm>
+            <a:off x="101600" y="136526"/>
+            <a:ext cx="11988802" cy="639330"/>
+          </a:xfrm>
+          <a:prstGeom prst="rect">
+            <a:avLst/>
+          </a:prstGeom>
+        </p:spPr>
+        <p:txBody>
+          <a:bodyPr>
+            <a:normAutofit fontScale="90000" lnSpcReduction="10000"/>
+          </a:bodyPr>
+          <a:lstStyle>
+            <a:lvl1pPr algn="l" defTabSz="914400" rtl="0" eaLnBrk="1" latinLnBrk="0" hangingPunct="1">
+              <a:lnSpc>
+                <a:spcPct val="90000"/>
+              </a:lnSpc>
+              <a:spcBef>
+                <a:spcPct val="0"/>
+              </a:spcBef>
+              <a:buNone/>
+              <a:defRPr sz="4400" kern="1200">
+                <a:solidFill>
+                  <a:schemeClr val="tx1"/>
+                </a:solidFill>
+                <a:latin typeface="+mj-lt"/>
+                <a:ea typeface="+mj-ea"/>
+                <a:cs typeface="+mj-cs"/>
+              </a:defRPr>
+            </a:lvl1pPr>
+          </a:lstStyle>
+          <a:p>
+            <a:r>
+              <a:rPr lang="en-US" dirty="0"/>
+              <a:t>IRIS</a:t>
+            </a:r>
+          </a:p>
+        </p:txBody>
+      </p:sp>
+      <p:grpSp>
+        <p:nvGrpSpPr>
+          <p:cNvPr id="11" name="Group 10">
+            <a:extLst>
+              <a:ext uri="{FF2B5EF4-FFF2-40B4-BE49-F238E27FC236}">
+                <a16:creationId xmlns:a16="http://schemas.microsoft.com/office/drawing/2014/main" id="{95E02C45-4599-F4A9-3AF6-40B81A9D649F}"/>
+              </a:ext>
+            </a:extLst>
+          </p:cNvPr>
+          <p:cNvGrpSpPr/>
+          <p:nvPr/>
+        </p:nvGrpSpPr>
+        <p:grpSpPr>
+          <a:xfrm>
+            <a:off x="3630967" y="958788"/>
+            <a:ext cx="4935984" cy="4944862"/>
+            <a:chOff x="3630967" y="958788"/>
+            <a:chExt cx="4935984" cy="4944862"/>
+          </a:xfrm>
+        </p:grpSpPr>
+        <p:sp>
+          <p:nvSpPr>
+            <p:cNvPr id="3" name="Oval 2">
+              <a:extLst>
+                <a:ext uri="{FF2B5EF4-FFF2-40B4-BE49-F238E27FC236}">
+                  <a16:creationId xmlns:a16="http://schemas.microsoft.com/office/drawing/2014/main" id="{4C39A413-F92E-7503-0760-3FC1BE7F694B}"/>
+                </a:ext>
+              </a:extLst>
+            </p:cNvPr>
+            <p:cNvSpPr/>
+            <p:nvPr/>
+          </p:nvSpPr>
+          <p:spPr>
+            <a:xfrm rot="5400000">
+              <a:off x="3952040" y="1265353"/>
+              <a:ext cx="4287917" cy="4331735"/>
+            </a:xfrm>
+            <a:prstGeom prst="ellipse">
+              <a:avLst/>
+            </a:prstGeom>
+            <a:solidFill>
+              <a:schemeClr val="accent6">
+                <a:lumMod val="75000"/>
+              </a:schemeClr>
+            </a:solidFill>
+            <a:ln w="28575">
+              <a:noFill/>
+            </a:ln>
+          </p:spPr>
+          <p:style>
+            <a:lnRef idx="2">
+              <a:schemeClr val="accent1">
+                <a:shade val="15000"/>
+              </a:schemeClr>
+            </a:lnRef>
+            <a:fillRef idx="1">
+              <a:schemeClr val="accent1"/>
+            </a:fillRef>
+            <a:effectRef idx="0">
+              <a:schemeClr val="accent1"/>
+            </a:effectRef>
+            <a:fontRef idx="minor">
+              <a:schemeClr val="lt1"/>
+            </a:fontRef>
+          </p:style>
+          <p:txBody>
+            <a:bodyPr rtlCol="0" anchor="ctr"/>
+            <a:lstStyle/>
+            <a:p>
+              <a:pPr algn="ctr"/>
+              <a:endParaRPr lang="en-US"/>
+            </a:p>
+          </p:txBody>
+        </p:sp>
+        <p:sp>
+          <p:nvSpPr>
+            <p:cNvPr id="2" name="Oval 1">
+              <a:extLst>
+                <a:ext uri="{FF2B5EF4-FFF2-40B4-BE49-F238E27FC236}">
+                  <a16:creationId xmlns:a16="http://schemas.microsoft.com/office/drawing/2014/main" id="{881F8C2A-46BF-BC11-A301-94D4622191F7}"/>
+                </a:ext>
+              </a:extLst>
+            </p:cNvPr>
+            <p:cNvSpPr/>
+            <p:nvPr/>
+          </p:nvSpPr>
+          <p:spPr>
+            <a:xfrm rot="5400000">
+              <a:off x="4913788" y="2214977"/>
+              <a:ext cx="2432481" cy="2459117"/>
+            </a:xfrm>
+            <a:prstGeom prst="ellipse">
+              <a:avLst/>
+            </a:prstGeom>
+            <a:solidFill>
+              <a:schemeClr val="tx1"/>
+            </a:solidFill>
+            <a:ln w="28575">
+              <a:noFill/>
+            </a:ln>
+          </p:spPr>
+          <p:style>
+            <a:lnRef idx="2">
+              <a:schemeClr val="accent1">
+                <a:shade val="15000"/>
+              </a:schemeClr>
+            </a:lnRef>
+            <a:fillRef idx="1">
+              <a:schemeClr val="accent1"/>
+            </a:fillRef>
+            <a:effectRef idx="0">
+              <a:schemeClr val="accent1"/>
+            </a:effectRef>
+            <a:fontRef idx="minor">
+              <a:schemeClr val="lt1"/>
+            </a:fontRef>
+          </p:style>
+          <p:txBody>
+            <a:bodyPr rtlCol="0" anchor="ctr"/>
+            <a:lstStyle/>
+            <a:p>
+              <a:pPr algn="ctr"/>
+              <a:endParaRPr lang="en-US"/>
+            </a:p>
+          </p:txBody>
+        </p:sp>
+        <p:sp>
+          <p:nvSpPr>
+            <p:cNvPr id="10" name="Rectangle 9">
+              <a:extLst>
+                <a:ext uri="{FF2B5EF4-FFF2-40B4-BE49-F238E27FC236}">
+                  <a16:creationId xmlns:a16="http://schemas.microsoft.com/office/drawing/2014/main" id="{ACEDF5C6-BDB1-1935-B6AA-72C2994E9916}"/>
+                </a:ext>
+              </a:extLst>
+            </p:cNvPr>
+            <p:cNvSpPr/>
+            <p:nvPr/>
+          </p:nvSpPr>
+          <p:spPr>
+            <a:xfrm>
+              <a:off x="3630967" y="958788"/>
+              <a:ext cx="4935984" cy="4944862"/>
+            </a:xfrm>
+            <a:prstGeom prst="rect">
+              <a:avLst/>
+            </a:prstGeom>
+            <a:noFill/>
+            <a:ln>
+              <a:noFill/>
+            </a:ln>
+          </p:spPr>
+          <p:style>
+            <a:lnRef idx="2">
+              <a:schemeClr val="accent1">
+                <a:shade val="15000"/>
+              </a:schemeClr>
+            </a:lnRef>
+            <a:fillRef idx="1">
+              <a:schemeClr val="accent1"/>
+            </a:fillRef>
+            <a:effectRef idx="0">
+              <a:schemeClr val="accent1"/>
+            </a:effectRef>
+            <a:fontRef idx="minor">
+              <a:schemeClr val="lt1"/>
+            </a:fontRef>
+          </p:style>
+          <p:txBody>
+            <a:bodyPr rtlCol="0" anchor="ctr"/>
+            <a:lstStyle/>
+            <a:p>
+              <a:pPr algn="ctr"/>
+              <a:endParaRPr lang="en-US"/>
+            </a:p>
+          </p:txBody>
+        </p:sp>
+      </p:grpSp>
+    </p:spTree>
+    <p:extLst>
+      <p:ext uri="{BB962C8B-B14F-4D97-AF65-F5344CB8AC3E}">
+        <p14:creationId xmlns:p14="http://schemas.microsoft.com/office/powerpoint/2010/main" val="2425491290"/>
+      </p:ext>
+    </p:extLst>
+  </p:cSld>
+  <p:clrMapOvr>
+    <a:masterClrMapping/>
+  </p:clrMapOvr>
+</p:sld>
+</file>
+
+<file path=ppt/slides/slide5.xml><?xml version="1.0" encoding="utf-8"?>
+<p:sld xmlns:a="http://schemas.openxmlformats.org/drawingml/2006/main" xmlns:r="http://schemas.openxmlformats.org/officeDocument/2006/relationships" xmlns:p="http://schemas.openxmlformats.org/presentationml/2006/main">
+  <p:cSld>
+    <p:spTree>
+      <p:nvGrpSpPr>
+        <p:cNvPr id="1" name=""/>
+        <p:cNvGrpSpPr/>
+        <p:nvPr/>
+      </p:nvGrpSpPr>
+      <p:grpSpPr>
+        <a:xfrm>
+          <a:off x="0" y="0"/>
+          <a:ext cx="0" cy="0"/>
+          <a:chOff x="0" y="0"/>
+          <a:chExt cx="0" cy="0"/>
+        </a:xfrm>
+      </p:grpSpPr>
+      <p:sp>
+        <p:nvSpPr>
+          <p:cNvPr id="2" name="Title 5">
+            <a:extLst>
+              <a:ext uri="{FF2B5EF4-FFF2-40B4-BE49-F238E27FC236}">
+                <a16:creationId xmlns:a16="http://schemas.microsoft.com/office/drawing/2014/main" id="{85878678-B9C6-1AEF-1359-AC7715189738}"/>
+              </a:ext>
+            </a:extLst>
+          </p:cNvPr>
+          <p:cNvSpPr txBox="1">
+            <a:spLocks/>
+          </p:cNvSpPr>
+          <p:nvPr/>
+        </p:nvSpPr>
+        <p:spPr>
+          <a:xfrm>
+            <a:off x="101600" y="136526"/>
+            <a:ext cx="11988802" cy="639330"/>
+          </a:xfrm>
+          <a:prstGeom prst="rect">
+            <a:avLst/>
+          </a:prstGeom>
+        </p:spPr>
+        <p:txBody>
+          <a:bodyPr>
+            <a:normAutofit fontScale="90000" lnSpcReduction="10000"/>
+          </a:bodyPr>
+          <a:lstStyle>
+            <a:lvl1pPr algn="l" defTabSz="914400" rtl="0" eaLnBrk="1" latinLnBrk="0" hangingPunct="1">
+              <a:lnSpc>
+                <a:spcPct val="90000"/>
+              </a:lnSpc>
+              <a:spcBef>
+                <a:spcPct val="0"/>
+              </a:spcBef>
+              <a:buNone/>
+              <a:defRPr sz="4400" kern="1200">
+                <a:solidFill>
+                  <a:schemeClr val="tx1"/>
+                </a:solidFill>
+                <a:latin typeface="+mj-lt"/>
+                <a:ea typeface="+mj-ea"/>
+                <a:cs typeface="+mj-cs"/>
+              </a:defRPr>
+            </a:lvl1pPr>
+          </a:lstStyle>
+          <a:p>
+            <a:r>
+              <a:rPr lang="en-US" dirty="0"/>
+              <a:t>Serial Console</a:t>
+            </a:r>
+          </a:p>
+        </p:txBody>
+      </p:sp>
+      <p:grpSp>
+        <p:nvGrpSpPr>
+          <p:cNvPr id="22" name="Group 21">
+            <a:extLst>
+              <a:ext uri="{FF2B5EF4-FFF2-40B4-BE49-F238E27FC236}">
+                <a16:creationId xmlns:a16="http://schemas.microsoft.com/office/drawing/2014/main" id="{4F0839D5-5E3A-C805-954D-9583669F1F88}"/>
+              </a:ext>
+            </a:extLst>
+          </p:cNvPr>
+          <p:cNvGrpSpPr/>
+          <p:nvPr/>
+        </p:nvGrpSpPr>
+        <p:grpSpPr>
+          <a:xfrm>
+            <a:off x="3672840" y="1005840"/>
+            <a:ext cx="4838700" cy="4846320"/>
+            <a:chOff x="3672840" y="1005840"/>
+            <a:chExt cx="4838700" cy="4846320"/>
+          </a:xfrm>
+        </p:grpSpPr>
+        <p:sp>
+          <p:nvSpPr>
+            <p:cNvPr id="4" name="Rectangle: Rounded Corners 3">
+              <a:extLst>
+                <a:ext uri="{FF2B5EF4-FFF2-40B4-BE49-F238E27FC236}">
+                  <a16:creationId xmlns:a16="http://schemas.microsoft.com/office/drawing/2014/main" id="{A7142646-E53A-8B9B-2C6F-C72CB877E9C3}"/>
+                </a:ext>
+              </a:extLst>
+            </p:cNvPr>
+            <p:cNvSpPr/>
+            <p:nvPr/>
+          </p:nvSpPr>
+          <p:spPr>
+            <a:xfrm>
+              <a:off x="3950899" y="1285336"/>
+              <a:ext cx="4304580" cy="4295955"/>
+            </a:xfrm>
+            <a:prstGeom prst="roundRect">
+              <a:avLst>
+                <a:gd name="adj" fmla="val 13655"/>
+              </a:avLst>
+            </a:prstGeom>
+            <a:solidFill>
+              <a:schemeClr val="accent1">
+                <a:lumMod val="50000"/>
+              </a:schemeClr>
+            </a:solidFill>
+            <a:ln w="76200">
+              <a:solidFill>
+                <a:schemeClr val="tx1"/>
+              </a:solidFill>
+            </a:ln>
+          </p:spPr>
+          <p:style>
+            <a:lnRef idx="2">
+              <a:schemeClr val="accent1">
+                <a:shade val="15000"/>
+              </a:schemeClr>
+            </a:lnRef>
+            <a:fillRef idx="1">
+              <a:schemeClr val="accent1"/>
+            </a:fillRef>
+            <a:effectRef idx="0">
+              <a:schemeClr val="accent1"/>
+            </a:effectRef>
+            <a:fontRef idx="minor">
+              <a:schemeClr val="lt1"/>
+            </a:fontRef>
+          </p:style>
+          <p:txBody>
+            <a:bodyPr rtlCol="0" anchor="ctr"/>
+            <a:lstStyle/>
+            <a:p>
+              <a:pPr algn="ctr"/>
+              <a:endParaRPr lang="en-US"/>
+            </a:p>
+          </p:txBody>
+        </p:sp>
+        <p:sp>
+          <p:nvSpPr>
+            <p:cNvPr id="18" name="Trapezoid 17">
+              <a:extLst>
+                <a:ext uri="{FF2B5EF4-FFF2-40B4-BE49-F238E27FC236}">
+                  <a16:creationId xmlns:a16="http://schemas.microsoft.com/office/drawing/2014/main" id="{692454D8-09A6-BE6E-E38C-555B37474958}"/>
+                </a:ext>
+              </a:extLst>
+            </p:cNvPr>
+            <p:cNvSpPr/>
+            <p:nvPr/>
+          </p:nvSpPr>
+          <p:spPr>
+            <a:xfrm rot="10800000">
+              <a:off x="4248148" y="2545079"/>
+              <a:ext cx="3695699" cy="1844039"/>
+            </a:xfrm>
+            <a:custGeom>
+              <a:avLst/>
+              <a:gdLst>
+                <a:gd name="connsiteX0" fmla="*/ 0 w 1595887"/>
+                <a:gd name="connsiteY0" fmla="*/ 750499 h 750499"/>
+                <a:gd name="connsiteX1" fmla="*/ 187625 w 1595887"/>
+                <a:gd name="connsiteY1" fmla="*/ 0 h 750499"/>
+                <a:gd name="connsiteX2" fmla="*/ 1408262 w 1595887"/>
+                <a:gd name="connsiteY2" fmla="*/ 0 h 750499"/>
+                <a:gd name="connsiteX3" fmla="*/ 1595887 w 1595887"/>
+                <a:gd name="connsiteY3" fmla="*/ 750499 h 750499"/>
+                <a:gd name="connsiteX4" fmla="*/ 0 w 1595887"/>
+                <a:gd name="connsiteY4" fmla="*/ 750499 h 750499"/>
+                <a:gd name="connsiteX0" fmla="*/ 0 w 1595887"/>
+                <a:gd name="connsiteY0" fmla="*/ 750499 h 750499"/>
+                <a:gd name="connsiteX1" fmla="*/ 25879 w 1595887"/>
+                <a:gd name="connsiteY1" fmla="*/ 638355 h 750499"/>
+                <a:gd name="connsiteX2" fmla="*/ 187625 w 1595887"/>
+                <a:gd name="connsiteY2" fmla="*/ 0 h 750499"/>
+                <a:gd name="connsiteX3" fmla="*/ 1408262 w 1595887"/>
+                <a:gd name="connsiteY3" fmla="*/ 0 h 750499"/>
+                <a:gd name="connsiteX4" fmla="*/ 1595887 w 1595887"/>
+                <a:gd name="connsiteY4" fmla="*/ 750499 h 750499"/>
+                <a:gd name="connsiteX5" fmla="*/ 0 w 1595887"/>
+                <a:gd name="connsiteY5" fmla="*/ 750499 h 750499"/>
+                <a:gd name="connsiteX0" fmla="*/ 60713 w 1570336"/>
+                <a:gd name="connsiteY0" fmla="*/ 750499 h 750499"/>
+                <a:gd name="connsiteX1" fmla="*/ 328 w 1570336"/>
+                <a:gd name="connsiteY1" fmla="*/ 638355 h 750499"/>
+                <a:gd name="connsiteX2" fmla="*/ 162074 w 1570336"/>
+                <a:gd name="connsiteY2" fmla="*/ 0 h 750499"/>
+                <a:gd name="connsiteX3" fmla="*/ 1382711 w 1570336"/>
+                <a:gd name="connsiteY3" fmla="*/ 0 h 750499"/>
+                <a:gd name="connsiteX4" fmla="*/ 1570336 w 1570336"/>
+                <a:gd name="connsiteY4" fmla="*/ 750499 h 750499"/>
+                <a:gd name="connsiteX5" fmla="*/ 60713 w 1570336"/>
+                <a:gd name="connsiteY5" fmla="*/ 750499 h 750499"/>
+                <a:gd name="connsiteX0" fmla="*/ 61222 w 1570845"/>
+                <a:gd name="connsiteY0" fmla="*/ 750499 h 750499"/>
+                <a:gd name="connsiteX1" fmla="*/ 837 w 1570845"/>
+                <a:gd name="connsiteY1" fmla="*/ 638355 h 750499"/>
+                <a:gd name="connsiteX2" fmla="*/ 162583 w 1570845"/>
+                <a:gd name="connsiteY2" fmla="*/ 0 h 750499"/>
+                <a:gd name="connsiteX3" fmla="*/ 1383220 w 1570845"/>
+                <a:gd name="connsiteY3" fmla="*/ 0 h 750499"/>
+                <a:gd name="connsiteX4" fmla="*/ 1570845 w 1570845"/>
+                <a:gd name="connsiteY4" fmla="*/ 750499 h 750499"/>
+                <a:gd name="connsiteX5" fmla="*/ 61222 w 1570845"/>
+                <a:gd name="connsiteY5" fmla="*/ 750499 h 750499"/>
+                <a:gd name="connsiteX0" fmla="*/ 62168 w 1571791"/>
+                <a:gd name="connsiteY0" fmla="*/ 750499 h 750499"/>
+                <a:gd name="connsiteX1" fmla="*/ 1783 w 1571791"/>
+                <a:gd name="connsiteY1" fmla="*/ 638355 h 750499"/>
+                <a:gd name="connsiteX2" fmla="*/ 163529 w 1571791"/>
+                <a:gd name="connsiteY2" fmla="*/ 0 h 750499"/>
+                <a:gd name="connsiteX3" fmla="*/ 1384166 w 1571791"/>
+                <a:gd name="connsiteY3" fmla="*/ 0 h 750499"/>
+                <a:gd name="connsiteX4" fmla="*/ 1571791 w 1571791"/>
+                <a:gd name="connsiteY4" fmla="*/ 750499 h 750499"/>
+                <a:gd name="connsiteX5" fmla="*/ 62168 w 1571791"/>
+                <a:gd name="connsiteY5" fmla="*/ 750499 h 750499"/>
+                <a:gd name="connsiteX0" fmla="*/ 62168 w 1571791"/>
+                <a:gd name="connsiteY0" fmla="*/ 750499 h 750499"/>
+                <a:gd name="connsiteX1" fmla="*/ 1783 w 1571791"/>
+                <a:gd name="connsiteY1" fmla="*/ 638355 h 750499"/>
+                <a:gd name="connsiteX2" fmla="*/ 163529 w 1571791"/>
+                <a:gd name="connsiteY2" fmla="*/ 0 h 750499"/>
+                <a:gd name="connsiteX3" fmla="*/ 1384166 w 1571791"/>
+                <a:gd name="connsiteY3" fmla="*/ 0 h 750499"/>
+                <a:gd name="connsiteX4" fmla="*/ 1546810 w 1571791"/>
+                <a:gd name="connsiteY4" fmla="*/ 641650 h 750499"/>
+                <a:gd name="connsiteX5" fmla="*/ 1571791 w 1571791"/>
+                <a:gd name="connsiteY5" fmla="*/ 750499 h 750499"/>
+                <a:gd name="connsiteX6" fmla="*/ 62168 w 1571791"/>
+                <a:gd name="connsiteY6" fmla="*/ 750499 h 750499"/>
+                <a:gd name="connsiteX0" fmla="*/ 62168 w 1546810"/>
+                <a:gd name="connsiteY0" fmla="*/ 750499 h 753674"/>
+                <a:gd name="connsiteX1" fmla="*/ 1783 w 1546810"/>
+                <a:gd name="connsiteY1" fmla="*/ 638355 h 753674"/>
+                <a:gd name="connsiteX2" fmla="*/ 163529 w 1546810"/>
+                <a:gd name="connsiteY2" fmla="*/ 0 h 753674"/>
+                <a:gd name="connsiteX3" fmla="*/ 1384166 w 1546810"/>
+                <a:gd name="connsiteY3" fmla="*/ 0 h 753674"/>
+                <a:gd name="connsiteX4" fmla="*/ 1546810 w 1546810"/>
+                <a:gd name="connsiteY4" fmla="*/ 641650 h 753674"/>
+                <a:gd name="connsiteX5" fmla="*/ 1476541 w 1546810"/>
+                <a:gd name="connsiteY5" fmla="*/ 753674 h 753674"/>
+                <a:gd name="connsiteX6" fmla="*/ 62168 w 1546810"/>
+                <a:gd name="connsiteY6" fmla="*/ 750499 h 753674"/>
+                <a:gd name="connsiteX0" fmla="*/ 62168 w 1546810"/>
+                <a:gd name="connsiteY0" fmla="*/ 750499 h 753674"/>
+                <a:gd name="connsiteX1" fmla="*/ 1783 w 1546810"/>
+                <a:gd name="connsiteY1" fmla="*/ 638355 h 753674"/>
+                <a:gd name="connsiteX2" fmla="*/ 163529 w 1546810"/>
+                <a:gd name="connsiteY2" fmla="*/ 0 h 753674"/>
+                <a:gd name="connsiteX3" fmla="*/ 1384166 w 1546810"/>
+                <a:gd name="connsiteY3" fmla="*/ 0 h 753674"/>
+                <a:gd name="connsiteX4" fmla="*/ 1546810 w 1546810"/>
+                <a:gd name="connsiteY4" fmla="*/ 641650 h 753674"/>
+                <a:gd name="connsiteX5" fmla="*/ 1476541 w 1546810"/>
+                <a:gd name="connsiteY5" fmla="*/ 753674 h 753674"/>
+                <a:gd name="connsiteX6" fmla="*/ 62168 w 1546810"/>
+                <a:gd name="connsiteY6" fmla="*/ 750499 h 753674"/>
+                <a:gd name="connsiteX0" fmla="*/ 62168 w 1555154"/>
+                <a:gd name="connsiteY0" fmla="*/ 750499 h 753674"/>
+                <a:gd name="connsiteX1" fmla="*/ 1783 w 1555154"/>
+                <a:gd name="connsiteY1" fmla="*/ 638355 h 753674"/>
+                <a:gd name="connsiteX2" fmla="*/ 163529 w 1555154"/>
+                <a:gd name="connsiteY2" fmla="*/ 0 h 753674"/>
+                <a:gd name="connsiteX3" fmla="*/ 1384166 w 1555154"/>
+                <a:gd name="connsiteY3" fmla="*/ 0 h 753674"/>
+                <a:gd name="connsiteX4" fmla="*/ 1546810 w 1555154"/>
+                <a:gd name="connsiteY4" fmla="*/ 641650 h 753674"/>
+                <a:gd name="connsiteX5" fmla="*/ 1476541 w 1555154"/>
+                <a:gd name="connsiteY5" fmla="*/ 753674 h 753674"/>
+                <a:gd name="connsiteX6" fmla="*/ 62168 w 1555154"/>
+                <a:gd name="connsiteY6" fmla="*/ 750499 h 753674"/>
+                <a:gd name="connsiteX0" fmla="*/ 62168 w 1541154"/>
+                <a:gd name="connsiteY0" fmla="*/ 750499 h 753674"/>
+                <a:gd name="connsiteX1" fmla="*/ 1783 w 1541154"/>
+                <a:gd name="connsiteY1" fmla="*/ 638355 h 753674"/>
+                <a:gd name="connsiteX2" fmla="*/ 163529 w 1541154"/>
+                <a:gd name="connsiteY2" fmla="*/ 0 h 753674"/>
+                <a:gd name="connsiteX3" fmla="*/ 1384166 w 1541154"/>
+                <a:gd name="connsiteY3" fmla="*/ 0 h 753674"/>
+                <a:gd name="connsiteX4" fmla="*/ 1524585 w 1541154"/>
+                <a:gd name="connsiteY4" fmla="*/ 638475 h 753674"/>
+                <a:gd name="connsiteX5" fmla="*/ 1476541 w 1541154"/>
+                <a:gd name="connsiteY5" fmla="*/ 753674 h 753674"/>
+                <a:gd name="connsiteX6" fmla="*/ 62168 w 1541154"/>
+                <a:gd name="connsiteY6" fmla="*/ 750499 h 753674"/>
+                <a:gd name="connsiteX0" fmla="*/ 62168 w 1548650"/>
+                <a:gd name="connsiteY0" fmla="*/ 750499 h 753674"/>
+                <a:gd name="connsiteX1" fmla="*/ 1783 w 1548650"/>
+                <a:gd name="connsiteY1" fmla="*/ 638355 h 753674"/>
+                <a:gd name="connsiteX2" fmla="*/ 163529 w 1548650"/>
+                <a:gd name="connsiteY2" fmla="*/ 0 h 753674"/>
+                <a:gd name="connsiteX3" fmla="*/ 1384166 w 1548650"/>
+                <a:gd name="connsiteY3" fmla="*/ 0 h 753674"/>
+                <a:gd name="connsiteX4" fmla="*/ 1537285 w 1548650"/>
+                <a:gd name="connsiteY4" fmla="*/ 635300 h 753674"/>
+                <a:gd name="connsiteX5" fmla="*/ 1476541 w 1548650"/>
+                <a:gd name="connsiteY5" fmla="*/ 753674 h 753674"/>
+                <a:gd name="connsiteX6" fmla="*/ 62168 w 1548650"/>
+                <a:gd name="connsiteY6" fmla="*/ 750499 h 753674"/>
+                <a:gd name="connsiteX0" fmla="*/ 62168 w 1543265"/>
+                <a:gd name="connsiteY0" fmla="*/ 750499 h 753680"/>
+                <a:gd name="connsiteX1" fmla="*/ 1783 w 1543265"/>
+                <a:gd name="connsiteY1" fmla="*/ 638355 h 753680"/>
+                <a:gd name="connsiteX2" fmla="*/ 163529 w 1543265"/>
+                <a:gd name="connsiteY2" fmla="*/ 0 h 753680"/>
+                <a:gd name="connsiteX3" fmla="*/ 1384166 w 1543265"/>
+                <a:gd name="connsiteY3" fmla="*/ 0 h 753680"/>
+                <a:gd name="connsiteX4" fmla="*/ 1537285 w 1543265"/>
+                <a:gd name="connsiteY4" fmla="*/ 635300 h 753680"/>
+                <a:gd name="connsiteX5" fmla="*/ 1476541 w 1543265"/>
+                <a:gd name="connsiteY5" fmla="*/ 753674 h 753680"/>
+                <a:gd name="connsiteX6" fmla="*/ 62168 w 1543265"/>
+                <a:gd name="connsiteY6" fmla="*/ 750499 h 753680"/>
+                <a:gd name="connsiteX0" fmla="*/ 62168 w 1543265"/>
+                <a:gd name="connsiteY0" fmla="*/ 750499 h 753679"/>
+                <a:gd name="connsiteX1" fmla="*/ 1783 w 1543265"/>
+                <a:gd name="connsiteY1" fmla="*/ 638355 h 753679"/>
+                <a:gd name="connsiteX2" fmla="*/ 163529 w 1543265"/>
+                <a:gd name="connsiteY2" fmla="*/ 0 h 753679"/>
+                <a:gd name="connsiteX3" fmla="*/ 1384166 w 1543265"/>
+                <a:gd name="connsiteY3" fmla="*/ 0 h 753679"/>
+                <a:gd name="connsiteX4" fmla="*/ 1537285 w 1543265"/>
+                <a:gd name="connsiteY4" fmla="*/ 635300 h 753679"/>
+                <a:gd name="connsiteX5" fmla="*/ 1476541 w 1543265"/>
+                <a:gd name="connsiteY5" fmla="*/ 753674 h 753679"/>
+                <a:gd name="connsiteX6" fmla="*/ 62168 w 1543265"/>
+                <a:gd name="connsiteY6" fmla="*/ 750499 h 753679"/>
+                <a:gd name="connsiteX0" fmla="*/ 62168 w 1540994"/>
+                <a:gd name="connsiteY0" fmla="*/ 750499 h 753679"/>
+                <a:gd name="connsiteX1" fmla="*/ 1783 w 1540994"/>
+                <a:gd name="connsiteY1" fmla="*/ 638355 h 753679"/>
+                <a:gd name="connsiteX2" fmla="*/ 163529 w 1540994"/>
+                <a:gd name="connsiteY2" fmla="*/ 0 h 753679"/>
+                <a:gd name="connsiteX3" fmla="*/ 1384166 w 1540994"/>
+                <a:gd name="connsiteY3" fmla="*/ 0 h 753679"/>
+                <a:gd name="connsiteX4" fmla="*/ 1537285 w 1540994"/>
+                <a:gd name="connsiteY4" fmla="*/ 635300 h 753679"/>
+                <a:gd name="connsiteX5" fmla="*/ 1476541 w 1540994"/>
+                <a:gd name="connsiteY5" fmla="*/ 753674 h 753679"/>
+                <a:gd name="connsiteX6" fmla="*/ 62168 w 1540994"/>
+                <a:gd name="connsiteY6" fmla="*/ 750499 h 753679"/>
+                <a:gd name="connsiteX0" fmla="*/ 62168 w 1539415"/>
+                <a:gd name="connsiteY0" fmla="*/ 750499 h 753679"/>
+                <a:gd name="connsiteX1" fmla="*/ 1783 w 1539415"/>
+                <a:gd name="connsiteY1" fmla="*/ 638355 h 753679"/>
+                <a:gd name="connsiteX2" fmla="*/ 163529 w 1539415"/>
+                <a:gd name="connsiteY2" fmla="*/ 0 h 753679"/>
+                <a:gd name="connsiteX3" fmla="*/ 1384166 w 1539415"/>
+                <a:gd name="connsiteY3" fmla="*/ 0 h 753679"/>
+                <a:gd name="connsiteX4" fmla="*/ 1537285 w 1539415"/>
+                <a:gd name="connsiteY4" fmla="*/ 635300 h 753679"/>
+                <a:gd name="connsiteX5" fmla="*/ 1454316 w 1539415"/>
+                <a:gd name="connsiteY5" fmla="*/ 753674 h 753679"/>
+                <a:gd name="connsiteX6" fmla="*/ 62168 w 1539415"/>
+                <a:gd name="connsiteY6" fmla="*/ 750499 h 753679"/>
+                <a:gd name="connsiteX0" fmla="*/ 62168 w 1540126"/>
+                <a:gd name="connsiteY0" fmla="*/ 750499 h 756854"/>
+                <a:gd name="connsiteX1" fmla="*/ 1783 w 1540126"/>
+                <a:gd name="connsiteY1" fmla="*/ 638355 h 756854"/>
+                <a:gd name="connsiteX2" fmla="*/ 163529 w 1540126"/>
+                <a:gd name="connsiteY2" fmla="*/ 0 h 756854"/>
+                <a:gd name="connsiteX3" fmla="*/ 1384166 w 1540126"/>
+                <a:gd name="connsiteY3" fmla="*/ 0 h 756854"/>
+                <a:gd name="connsiteX4" fmla="*/ 1537285 w 1540126"/>
+                <a:gd name="connsiteY4" fmla="*/ 635300 h 756854"/>
+                <a:gd name="connsiteX5" fmla="*/ 1467016 w 1540126"/>
+                <a:gd name="connsiteY5" fmla="*/ 756849 h 756854"/>
+                <a:gd name="connsiteX6" fmla="*/ 62168 w 1540126"/>
+                <a:gd name="connsiteY6" fmla="*/ 750499 h 756854"/>
+                <a:gd name="connsiteX0" fmla="*/ 62168 w 1540126"/>
+                <a:gd name="connsiteY0" fmla="*/ 750499 h 750499"/>
+                <a:gd name="connsiteX1" fmla="*/ 1783 w 1540126"/>
+                <a:gd name="connsiteY1" fmla="*/ 638355 h 750499"/>
+                <a:gd name="connsiteX2" fmla="*/ 163529 w 1540126"/>
+                <a:gd name="connsiteY2" fmla="*/ 0 h 750499"/>
+                <a:gd name="connsiteX3" fmla="*/ 1384166 w 1540126"/>
+                <a:gd name="connsiteY3" fmla="*/ 0 h 750499"/>
+                <a:gd name="connsiteX4" fmla="*/ 1537285 w 1540126"/>
+                <a:gd name="connsiteY4" fmla="*/ 635300 h 750499"/>
+                <a:gd name="connsiteX5" fmla="*/ 1467016 w 1540126"/>
+                <a:gd name="connsiteY5" fmla="*/ 747324 h 750499"/>
+                <a:gd name="connsiteX6" fmla="*/ 62168 w 1540126"/>
+                <a:gd name="connsiteY6" fmla="*/ 750499 h 750499"/>
+                <a:gd name="connsiteX0" fmla="*/ 62168 w 1540126"/>
+                <a:gd name="connsiteY0" fmla="*/ 750499 h 750499"/>
+                <a:gd name="connsiteX1" fmla="*/ 1783 w 1540126"/>
+                <a:gd name="connsiteY1" fmla="*/ 638355 h 750499"/>
+                <a:gd name="connsiteX2" fmla="*/ 163529 w 1540126"/>
+                <a:gd name="connsiteY2" fmla="*/ 0 h 750499"/>
+                <a:gd name="connsiteX3" fmla="*/ 1308687 w 1540126"/>
+                <a:gd name="connsiteY3" fmla="*/ 3475 h 750499"/>
+                <a:gd name="connsiteX4" fmla="*/ 1384166 w 1540126"/>
+                <a:gd name="connsiteY4" fmla="*/ 0 h 750499"/>
+                <a:gd name="connsiteX5" fmla="*/ 1537285 w 1540126"/>
+                <a:gd name="connsiteY5" fmla="*/ 635300 h 750499"/>
+                <a:gd name="connsiteX6" fmla="*/ 1467016 w 1540126"/>
+                <a:gd name="connsiteY6" fmla="*/ 747324 h 750499"/>
+                <a:gd name="connsiteX7" fmla="*/ 62168 w 1540126"/>
+                <a:gd name="connsiteY7" fmla="*/ 750499 h 750499"/>
+                <a:gd name="connsiteX0" fmla="*/ 62168 w 1540126"/>
+                <a:gd name="connsiteY0" fmla="*/ 753374 h 753374"/>
+                <a:gd name="connsiteX1" fmla="*/ 1783 w 1540126"/>
+                <a:gd name="connsiteY1" fmla="*/ 641230 h 753374"/>
+                <a:gd name="connsiteX2" fmla="*/ 163529 w 1540126"/>
+                <a:gd name="connsiteY2" fmla="*/ 2875 h 753374"/>
+                <a:gd name="connsiteX3" fmla="*/ 1302337 w 1540126"/>
+                <a:gd name="connsiteY3" fmla="*/ 0 h 753374"/>
+                <a:gd name="connsiteX4" fmla="*/ 1384166 w 1540126"/>
+                <a:gd name="connsiteY4" fmla="*/ 2875 h 753374"/>
+                <a:gd name="connsiteX5" fmla="*/ 1537285 w 1540126"/>
+                <a:gd name="connsiteY5" fmla="*/ 638175 h 753374"/>
+                <a:gd name="connsiteX6" fmla="*/ 1467016 w 1540126"/>
+                <a:gd name="connsiteY6" fmla="*/ 750199 h 753374"/>
+                <a:gd name="connsiteX7" fmla="*/ 62168 w 1540126"/>
+                <a:gd name="connsiteY7" fmla="*/ 753374 h 753374"/>
+                <a:gd name="connsiteX0" fmla="*/ 62168 w 1540126"/>
+                <a:gd name="connsiteY0" fmla="*/ 753374 h 753374"/>
+                <a:gd name="connsiteX1" fmla="*/ 1783 w 1540126"/>
+                <a:gd name="connsiteY1" fmla="*/ 641230 h 753374"/>
+                <a:gd name="connsiteX2" fmla="*/ 163529 w 1540126"/>
+                <a:gd name="connsiteY2" fmla="*/ 2875 h 753374"/>
+                <a:gd name="connsiteX3" fmla="*/ 1302337 w 1540126"/>
+                <a:gd name="connsiteY3" fmla="*/ 0 h 753374"/>
+                <a:gd name="connsiteX4" fmla="*/ 1403216 w 1540126"/>
+                <a:gd name="connsiteY4" fmla="*/ 63200 h 753374"/>
+                <a:gd name="connsiteX5" fmla="*/ 1537285 w 1540126"/>
+                <a:gd name="connsiteY5" fmla="*/ 638175 h 753374"/>
+                <a:gd name="connsiteX6" fmla="*/ 1467016 w 1540126"/>
+                <a:gd name="connsiteY6" fmla="*/ 750199 h 753374"/>
+                <a:gd name="connsiteX7" fmla="*/ 62168 w 1540126"/>
+                <a:gd name="connsiteY7" fmla="*/ 753374 h 753374"/>
+                <a:gd name="connsiteX0" fmla="*/ 62168 w 1540126"/>
+                <a:gd name="connsiteY0" fmla="*/ 753374 h 753374"/>
+                <a:gd name="connsiteX1" fmla="*/ 1783 w 1540126"/>
+                <a:gd name="connsiteY1" fmla="*/ 641230 h 753374"/>
+                <a:gd name="connsiteX2" fmla="*/ 163529 w 1540126"/>
+                <a:gd name="connsiteY2" fmla="*/ 2875 h 753374"/>
+                <a:gd name="connsiteX3" fmla="*/ 1302337 w 1540126"/>
+                <a:gd name="connsiteY3" fmla="*/ 0 h 753374"/>
+                <a:gd name="connsiteX4" fmla="*/ 1403216 w 1540126"/>
+                <a:gd name="connsiteY4" fmla="*/ 63200 h 753374"/>
+                <a:gd name="connsiteX5" fmla="*/ 1537285 w 1540126"/>
+                <a:gd name="connsiteY5" fmla="*/ 638175 h 753374"/>
+                <a:gd name="connsiteX6" fmla="*/ 1467016 w 1540126"/>
+                <a:gd name="connsiteY6" fmla="*/ 750199 h 753374"/>
+                <a:gd name="connsiteX7" fmla="*/ 62168 w 1540126"/>
+                <a:gd name="connsiteY7" fmla="*/ 753374 h 753374"/>
+                <a:gd name="connsiteX0" fmla="*/ 62168 w 1540126"/>
+                <a:gd name="connsiteY0" fmla="*/ 753413 h 753413"/>
+                <a:gd name="connsiteX1" fmla="*/ 1783 w 1540126"/>
+                <a:gd name="connsiteY1" fmla="*/ 641269 h 753413"/>
+                <a:gd name="connsiteX2" fmla="*/ 163529 w 1540126"/>
+                <a:gd name="connsiteY2" fmla="*/ 2914 h 753413"/>
+                <a:gd name="connsiteX3" fmla="*/ 1302337 w 1540126"/>
+                <a:gd name="connsiteY3" fmla="*/ 39 h 753413"/>
+                <a:gd name="connsiteX4" fmla="*/ 1403216 w 1540126"/>
+                <a:gd name="connsiteY4" fmla="*/ 63239 h 753413"/>
+                <a:gd name="connsiteX5" fmla="*/ 1537285 w 1540126"/>
+                <a:gd name="connsiteY5" fmla="*/ 638214 h 753413"/>
+                <a:gd name="connsiteX6" fmla="*/ 1467016 w 1540126"/>
+                <a:gd name="connsiteY6" fmla="*/ 750238 h 753413"/>
+                <a:gd name="connsiteX7" fmla="*/ 62168 w 1540126"/>
+                <a:gd name="connsiteY7" fmla="*/ 753413 h 753413"/>
+                <a:gd name="connsiteX0" fmla="*/ 62168 w 1540126"/>
+                <a:gd name="connsiteY0" fmla="*/ 753413 h 753413"/>
+                <a:gd name="connsiteX1" fmla="*/ 1783 w 1540126"/>
+                <a:gd name="connsiteY1" fmla="*/ 641269 h 753413"/>
+                <a:gd name="connsiteX2" fmla="*/ 163529 w 1540126"/>
+                <a:gd name="connsiteY2" fmla="*/ 2914 h 753413"/>
+                <a:gd name="connsiteX3" fmla="*/ 222837 w 1540126"/>
+                <a:gd name="connsiteY3" fmla="*/ 40 h 753413"/>
+                <a:gd name="connsiteX4" fmla="*/ 1302337 w 1540126"/>
+                <a:gd name="connsiteY4" fmla="*/ 39 h 753413"/>
+                <a:gd name="connsiteX5" fmla="*/ 1403216 w 1540126"/>
+                <a:gd name="connsiteY5" fmla="*/ 63239 h 753413"/>
+                <a:gd name="connsiteX6" fmla="*/ 1537285 w 1540126"/>
+                <a:gd name="connsiteY6" fmla="*/ 638214 h 753413"/>
+                <a:gd name="connsiteX7" fmla="*/ 1467016 w 1540126"/>
+                <a:gd name="connsiteY7" fmla="*/ 750238 h 753413"/>
+                <a:gd name="connsiteX8" fmla="*/ 62168 w 1540126"/>
+                <a:gd name="connsiteY8" fmla="*/ 753413 h 753413"/>
+                <a:gd name="connsiteX0" fmla="*/ 62168 w 1540126"/>
+                <a:gd name="connsiteY0" fmla="*/ 753413 h 753413"/>
+                <a:gd name="connsiteX1" fmla="*/ 1783 w 1540126"/>
+                <a:gd name="connsiteY1" fmla="*/ 641269 h 753413"/>
+                <a:gd name="connsiteX2" fmla="*/ 141304 w 1540126"/>
+                <a:gd name="connsiteY2" fmla="*/ 53714 h 753413"/>
+                <a:gd name="connsiteX3" fmla="*/ 222837 w 1540126"/>
+                <a:gd name="connsiteY3" fmla="*/ 40 h 753413"/>
+                <a:gd name="connsiteX4" fmla="*/ 1302337 w 1540126"/>
+                <a:gd name="connsiteY4" fmla="*/ 39 h 753413"/>
+                <a:gd name="connsiteX5" fmla="*/ 1403216 w 1540126"/>
+                <a:gd name="connsiteY5" fmla="*/ 63239 h 753413"/>
+                <a:gd name="connsiteX6" fmla="*/ 1537285 w 1540126"/>
+                <a:gd name="connsiteY6" fmla="*/ 638214 h 753413"/>
+                <a:gd name="connsiteX7" fmla="*/ 1467016 w 1540126"/>
+                <a:gd name="connsiteY7" fmla="*/ 750238 h 753413"/>
+                <a:gd name="connsiteX8" fmla="*/ 62168 w 1540126"/>
+                <a:gd name="connsiteY8" fmla="*/ 753413 h 753413"/>
+                <a:gd name="connsiteX0" fmla="*/ 62168 w 1540126"/>
+                <a:gd name="connsiteY0" fmla="*/ 753413 h 753413"/>
+                <a:gd name="connsiteX1" fmla="*/ 1783 w 1540126"/>
+                <a:gd name="connsiteY1" fmla="*/ 641269 h 753413"/>
+                <a:gd name="connsiteX2" fmla="*/ 141304 w 1540126"/>
+                <a:gd name="connsiteY2" fmla="*/ 53714 h 753413"/>
+                <a:gd name="connsiteX3" fmla="*/ 222837 w 1540126"/>
+                <a:gd name="connsiteY3" fmla="*/ 40 h 753413"/>
+                <a:gd name="connsiteX4" fmla="*/ 1302337 w 1540126"/>
+                <a:gd name="connsiteY4" fmla="*/ 39 h 753413"/>
+                <a:gd name="connsiteX5" fmla="*/ 1403216 w 1540126"/>
+                <a:gd name="connsiteY5" fmla="*/ 63239 h 753413"/>
+                <a:gd name="connsiteX6" fmla="*/ 1537285 w 1540126"/>
+                <a:gd name="connsiteY6" fmla="*/ 638214 h 753413"/>
+                <a:gd name="connsiteX7" fmla="*/ 1467016 w 1540126"/>
+                <a:gd name="connsiteY7" fmla="*/ 750238 h 753413"/>
+                <a:gd name="connsiteX8" fmla="*/ 62168 w 1540126"/>
+                <a:gd name="connsiteY8" fmla="*/ 753413 h 753413"/>
+                <a:gd name="connsiteX0" fmla="*/ 62168 w 1540126"/>
+                <a:gd name="connsiteY0" fmla="*/ 753413 h 753413"/>
+                <a:gd name="connsiteX1" fmla="*/ 1783 w 1540126"/>
+                <a:gd name="connsiteY1" fmla="*/ 641269 h 753413"/>
+                <a:gd name="connsiteX2" fmla="*/ 141304 w 1540126"/>
+                <a:gd name="connsiteY2" fmla="*/ 53714 h 753413"/>
+                <a:gd name="connsiteX3" fmla="*/ 222837 w 1540126"/>
+                <a:gd name="connsiteY3" fmla="*/ 40 h 753413"/>
+                <a:gd name="connsiteX4" fmla="*/ 1302337 w 1540126"/>
+                <a:gd name="connsiteY4" fmla="*/ 39 h 753413"/>
+                <a:gd name="connsiteX5" fmla="*/ 1403216 w 1540126"/>
+                <a:gd name="connsiteY5" fmla="*/ 63239 h 753413"/>
+                <a:gd name="connsiteX6" fmla="*/ 1537285 w 1540126"/>
+                <a:gd name="connsiteY6" fmla="*/ 638214 h 753413"/>
+                <a:gd name="connsiteX7" fmla="*/ 1467016 w 1540126"/>
+                <a:gd name="connsiteY7" fmla="*/ 750238 h 753413"/>
+                <a:gd name="connsiteX8" fmla="*/ 62168 w 1540126"/>
+                <a:gd name="connsiteY8" fmla="*/ 753413 h 753413"/>
+                <a:gd name="connsiteX0" fmla="*/ 62168 w 1540126"/>
+                <a:gd name="connsiteY0" fmla="*/ 753413 h 753413"/>
+                <a:gd name="connsiteX1" fmla="*/ 1783 w 1540126"/>
+                <a:gd name="connsiteY1" fmla="*/ 641269 h 753413"/>
+                <a:gd name="connsiteX2" fmla="*/ 141304 w 1540126"/>
+                <a:gd name="connsiteY2" fmla="*/ 53714 h 753413"/>
+                <a:gd name="connsiteX3" fmla="*/ 222837 w 1540126"/>
+                <a:gd name="connsiteY3" fmla="*/ 40 h 753413"/>
+                <a:gd name="connsiteX4" fmla="*/ 1302337 w 1540126"/>
+                <a:gd name="connsiteY4" fmla="*/ 39 h 753413"/>
+                <a:gd name="connsiteX5" fmla="*/ 1403216 w 1540126"/>
+                <a:gd name="connsiteY5" fmla="*/ 63239 h 753413"/>
+                <a:gd name="connsiteX6" fmla="*/ 1537285 w 1540126"/>
+                <a:gd name="connsiteY6" fmla="*/ 638214 h 753413"/>
+                <a:gd name="connsiteX7" fmla="*/ 1467016 w 1540126"/>
+                <a:gd name="connsiteY7" fmla="*/ 750238 h 753413"/>
+                <a:gd name="connsiteX8" fmla="*/ 62168 w 1540126"/>
+                <a:gd name="connsiteY8" fmla="*/ 753413 h 753413"/>
+                <a:gd name="connsiteX0" fmla="*/ 62168 w 1540126"/>
+                <a:gd name="connsiteY0" fmla="*/ 756579 h 756579"/>
+                <a:gd name="connsiteX1" fmla="*/ 1783 w 1540126"/>
+                <a:gd name="connsiteY1" fmla="*/ 644435 h 756579"/>
+                <a:gd name="connsiteX2" fmla="*/ 141304 w 1540126"/>
+                <a:gd name="connsiteY2" fmla="*/ 56880 h 756579"/>
+                <a:gd name="connsiteX3" fmla="*/ 245062 w 1540126"/>
+                <a:gd name="connsiteY3" fmla="*/ 31 h 756579"/>
+                <a:gd name="connsiteX4" fmla="*/ 1302337 w 1540126"/>
+                <a:gd name="connsiteY4" fmla="*/ 3205 h 756579"/>
+                <a:gd name="connsiteX5" fmla="*/ 1403216 w 1540126"/>
+                <a:gd name="connsiteY5" fmla="*/ 66405 h 756579"/>
+                <a:gd name="connsiteX6" fmla="*/ 1537285 w 1540126"/>
+                <a:gd name="connsiteY6" fmla="*/ 641380 h 756579"/>
+                <a:gd name="connsiteX7" fmla="*/ 1467016 w 1540126"/>
+                <a:gd name="connsiteY7" fmla="*/ 753404 h 756579"/>
+                <a:gd name="connsiteX8" fmla="*/ 62168 w 1540126"/>
+                <a:gd name="connsiteY8" fmla="*/ 756579 h 756579"/>
+                <a:gd name="connsiteX0" fmla="*/ 62168 w 1540126"/>
+                <a:gd name="connsiteY0" fmla="*/ 753414 h 753414"/>
+                <a:gd name="connsiteX1" fmla="*/ 1783 w 1540126"/>
+                <a:gd name="connsiteY1" fmla="*/ 641270 h 753414"/>
+                <a:gd name="connsiteX2" fmla="*/ 141304 w 1540126"/>
+                <a:gd name="connsiteY2" fmla="*/ 53715 h 753414"/>
+                <a:gd name="connsiteX3" fmla="*/ 226012 w 1540126"/>
+                <a:gd name="connsiteY3" fmla="*/ 41 h 753414"/>
+                <a:gd name="connsiteX4" fmla="*/ 1302337 w 1540126"/>
+                <a:gd name="connsiteY4" fmla="*/ 40 h 753414"/>
+                <a:gd name="connsiteX5" fmla="*/ 1403216 w 1540126"/>
+                <a:gd name="connsiteY5" fmla="*/ 63240 h 753414"/>
+                <a:gd name="connsiteX6" fmla="*/ 1537285 w 1540126"/>
+                <a:gd name="connsiteY6" fmla="*/ 638215 h 753414"/>
+                <a:gd name="connsiteX7" fmla="*/ 1467016 w 1540126"/>
+                <a:gd name="connsiteY7" fmla="*/ 750239 h 753414"/>
+                <a:gd name="connsiteX8" fmla="*/ 62168 w 1540126"/>
+                <a:gd name="connsiteY8" fmla="*/ 753414 h 753414"/>
+                <a:gd name="connsiteX0" fmla="*/ 62168 w 1540126"/>
+                <a:gd name="connsiteY0" fmla="*/ 753414 h 753414"/>
+                <a:gd name="connsiteX1" fmla="*/ 1783 w 1540126"/>
+                <a:gd name="connsiteY1" fmla="*/ 641270 h 753414"/>
+                <a:gd name="connsiteX2" fmla="*/ 138129 w 1540126"/>
+                <a:gd name="connsiteY2" fmla="*/ 63240 h 753414"/>
+                <a:gd name="connsiteX3" fmla="*/ 226012 w 1540126"/>
+                <a:gd name="connsiteY3" fmla="*/ 41 h 753414"/>
+                <a:gd name="connsiteX4" fmla="*/ 1302337 w 1540126"/>
+                <a:gd name="connsiteY4" fmla="*/ 40 h 753414"/>
+                <a:gd name="connsiteX5" fmla="*/ 1403216 w 1540126"/>
+                <a:gd name="connsiteY5" fmla="*/ 63240 h 753414"/>
+                <a:gd name="connsiteX6" fmla="*/ 1537285 w 1540126"/>
+                <a:gd name="connsiteY6" fmla="*/ 638215 h 753414"/>
+                <a:gd name="connsiteX7" fmla="*/ 1467016 w 1540126"/>
+                <a:gd name="connsiteY7" fmla="*/ 750239 h 753414"/>
+                <a:gd name="connsiteX8" fmla="*/ 62168 w 1540126"/>
+                <a:gd name="connsiteY8" fmla="*/ 753414 h 753414"/>
+                <a:gd name="connsiteX0" fmla="*/ 62168 w 1540126"/>
+                <a:gd name="connsiteY0" fmla="*/ 753418 h 753418"/>
+                <a:gd name="connsiteX1" fmla="*/ 1783 w 1540126"/>
+                <a:gd name="connsiteY1" fmla="*/ 641274 h 753418"/>
+                <a:gd name="connsiteX2" fmla="*/ 138129 w 1540126"/>
+                <a:gd name="connsiteY2" fmla="*/ 63244 h 753418"/>
+                <a:gd name="connsiteX3" fmla="*/ 226012 w 1540126"/>
+                <a:gd name="connsiteY3" fmla="*/ 45 h 753418"/>
+                <a:gd name="connsiteX4" fmla="*/ 1302337 w 1540126"/>
+                <a:gd name="connsiteY4" fmla="*/ 44 h 753418"/>
+                <a:gd name="connsiteX5" fmla="*/ 1403216 w 1540126"/>
+                <a:gd name="connsiteY5" fmla="*/ 63244 h 753418"/>
+                <a:gd name="connsiteX6" fmla="*/ 1537285 w 1540126"/>
+                <a:gd name="connsiteY6" fmla="*/ 638219 h 753418"/>
+                <a:gd name="connsiteX7" fmla="*/ 1467016 w 1540126"/>
+                <a:gd name="connsiteY7" fmla="*/ 750243 h 753418"/>
+                <a:gd name="connsiteX8" fmla="*/ 62168 w 1540126"/>
+                <a:gd name="connsiteY8" fmla="*/ 753418 h 753418"/>
+                <a:gd name="connsiteX0" fmla="*/ 62168 w 1540126"/>
+                <a:gd name="connsiteY0" fmla="*/ 753414 h 753414"/>
+                <a:gd name="connsiteX1" fmla="*/ 1783 w 1540126"/>
+                <a:gd name="connsiteY1" fmla="*/ 641270 h 753414"/>
+                <a:gd name="connsiteX2" fmla="*/ 138129 w 1540126"/>
+                <a:gd name="connsiteY2" fmla="*/ 63240 h 753414"/>
+                <a:gd name="connsiteX3" fmla="*/ 226012 w 1540126"/>
+                <a:gd name="connsiteY3" fmla="*/ 41 h 753414"/>
+                <a:gd name="connsiteX4" fmla="*/ 1302337 w 1540126"/>
+                <a:gd name="connsiteY4" fmla="*/ 40 h 753414"/>
+                <a:gd name="connsiteX5" fmla="*/ 1403216 w 1540126"/>
+                <a:gd name="connsiteY5" fmla="*/ 63240 h 753414"/>
+                <a:gd name="connsiteX6" fmla="*/ 1537285 w 1540126"/>
+                <a:gd name="connsiteY6" fmla="*/ 638215 h 753414"/>
+                <a:gd name="connsiteX7" fmla="*/ 1467016 w 1540126"/>
+                <a:gd name="connsiteY7" fmla="*/ 750239 h 753414"/>
+                <a:gd name="connsiteX8" fmla="*/ 62168 w 1540126"/>
+                <a:gd name="connsiteY8" fmla="*/ 753414 h 753414"/>
+                <a:gd name="connsiteX0" fmla="*/ 62168 w 1540126"/>
+                <a:gd name="connsiteY0" fmla="*/ 753418 h 753418"/>
+                <a:gd name="connsiteX1" fmla="*/ 1783 w 1540126"/>
+                <a:gd name="connsiteY1" fmla="*/ 641274 h 753418"/>
+                <a:gd name="connsiteX2" fmla="*/ 138129 w 1540126"/>
+                <a:gd name="connsiteY2" fmla="*/ 63244 h 753418"/>
+                <a:gd name="connsiteX3" fmla="*/ 226012 w 1540126"/>
+                <a:gd name="connsiteY3" fmla="*/ 45 h 753418"/>
+                <a:gd name="connsiteX4" fmla="*/ 1302337 w 1540126"/>
+                <a:gd name="connsiteY4" fmla="*/ 44 h 753418"/>
+                <a:gd name="connsiteX5" fmla="*/ 1403216 w 1540126"/>
+                <a:gd name="connsiteY5" fmla="*/ 63244 h 753418"/>
+                <a:gd name="connsiteX6" fmla="*/ 1537285 w 1540126"/>
+                <a:gd name="connsiteY6" fmla="*/ 638219 h 753418"/>
+                <a:gd name="connsiteX7" fmla="*/ 1467016 w 1540126"/>
+                <a:gd name="connsiteY7" fmla="*/ 750243 h 753418"/>
+                <a:gd name="connsiteX8" fmla="*/ 62168 w 1540126"/>
+                <a:gd name="connsiteY8" fmla="*/ 753418 h 753418"/>
+              </a:gdLst>
+              <a:ahLst/>
+              <a:cxnLst>
+                <a:cxn ang="0">
+                  <a:pos x="connsiteX0" y="connsiteY0"/>
+                </a:cxn>
+                <a:cxn ang="0">
+                  <a:pos x="connsiteX1" y="connsiteY1"/>
+                </a:cxn>
+                <a:cxn ang="0">
+                  <a:pos x="connsiteX2" y="connsiteY2"/>
+                </a:cxn>
+                <a:cxn ang="0">
+                  <a:pos x="connsiteX3" y="connsiteY3"/>
+                </a:cxn>
+                <a:cxn ang="0">
+                  <a:pos x="connsiteX4" y="connsiteY4"/>
+                </a:cxn>
+                <a:cxn ang="0">
+                  <a:pos x="connsiteX5" y="connsiteY5"/>
+                </a:cxn>
+                <a:cxn ang="0">
+                  <a:pos x="connsiteX6" y="connsiteY6"/>
+                </a:cxn>
+                <a:cxn ang="0">
+                  <a:pos x="connsiteX7" y="connsiteY7"/>
+                </a:cxn>
+                <a:cxn ang="0">
+                  <a:pos x="connsiteX8" y="connsiteY8"/>
+                </a:cxn>
+              </a:cxnLst>
+              <a:rect l="l" t="t" r="r" b="b"/>
+              <a:pathLst>
+                <a:path w="1540126" h="753418">
+                  <a:moveTo>
+                    <a:pt x="62168" y="753418"/>
+                  </a:moveTo>
+                  <a:cubicBezTo>
+                    <a:pt x="1244" y="747787"/>
+                    <a:pt x="-3968" y="678655"/>
+                    <a:pt x="1783" y="641274"/>
+                  </a:cubicBezTo>
+                  <a:lnTo>
+                    <a:pt x="138129" y="63244"/>
+                  </a:lnTo>
+                  <a:cubicBezTo>
+                    <a:pt x="149432" y="19953"/>
+                    <a:pt x="192484" y="-1114"/>
+                    <a:pt x="226012" y="45"/>
+                  </a:cubicBezTo>
+                  <a:lnTo>
+                    <a:pt x="1302337" y="44"/>
+                  </a:lnTo>
+                  <a:cubicBezTo>
+                    <a:pt x="1339138" y="-1114"/>
+                    <a:pt x="1394990" y="23127"/>
+                    <a:pt x="1403216" y="63244"/>
+                  </a:cubicBezTo>
+                  <a:cubicBezTo>
+                    <a:pt x="1458489" y="277127"/>
+                    <a:pt x="1482012" y="424336"/>
+                    <a:pt x="1537285" y="638219"/>
+                  </a:cubicBezTo>
+                  <a:cubicBezTo>
+                    <a:pt x="1548787" y="678735"/>
+                    <a:pt x="1525364" y="751002"/>
+                    <a:pt x="1467016" y="750243"/>
+                  </a:cubicBezTo>
+                  <a:lnTo>
+                    <a:pt x="62168" y="753418"/>
+                  </a:lnTo>
+                  <a:close/>
+                </a:path>
+              </a:pathLst>
+            </a:custGeom>
+            <a:solidFill>
+              <a:schemeClr val="bg1">
+                <a:lumMod val="65000"/>
+              </a:schemeClr>
+            </a:solidFill>
+            <a:ln w="76200">
+              <a:solidFill>
+                <a:schemeClr val="tx1"/>
+              </a:solidFill>
+            </a:ln>
+          </p:spPr>
+          <p:style>
+            <a:lnRef idx="2">
+              <a:schemeClr val="accent1">
+                <a:shade val="15000"/>
+              </a:schemeClr>
+            </a:lnRef>
+            <a:fillRef idx="1">
+              <a:schemeClr val="accent1"/>
+            </a:fillRef>
+            <a:effectRef idx="0">
+              <a:schemeClr val="accent1"/>
+            </a:effectRef>
+            <a:fontRef idx="minor">
+              <a:schemeClr val="lt1"/>
+            </a:fontRef>
+          </p:style>
+          <p:txBody>
+            <a:bodyPr rtlCol="0" anchor="ctr"/>
+            <a:lstStyle/>
+            <a:p>
+              <a:pPr algn="ctr"/>
+              <a:endParaRPr lang="en-US" dirty="0"/>
+            </a:p>
+          </p:txBody>
+        </p:sp>
+        <p:grpSp>
+          <p:nvGrpSpPr>
+            <p:cNvPr id="17" name="Group 16">
+              <a:extLst>
+                <a:ext uri="{FF2B5EF4-FFF2-40B4-BE49-F238E27FC236}">
+                  <a16:creationId xmlns:a16="http://schemas.microsoft.com/office/drawing/2014/main" id="{C5A857D1-B394-6E7A-8DE1-0EA9C1D23A03}"/>
+                </a:ext>
+              </a:extLst>
+            </p:cNvPr>
+            <p:cNvGrpSpPr/>
+            <p:nvPr/>
+          </p:nvGrpSpPr>
+          <p:grpSpPr>
+            <a:xfrm>
+              <a:off x="4553381" y="2818811"/>
+              <a:ext cx="3062380" cy="457200"/>
+              <a:chOff x="4684144" y="1837427"/>
+              <a:chExt cx="3062380" cy="457200"/>
+            </a:xfrm>
+          </p:grpSpPr>
+          <p:sp>
+            <p:nvSpPr>
+              <p:cNvPr id="6" name="Oval 5">
+                <a:extLst>
+                  <a:ext uri="{FF2B5EF4-FFF2-40B4-BE49-F238E27FC236}">
+                    <a16:creationId xmlns:a16="http://schemas.microsoft.com/office/drawing/2014/main" id="{D9CF2B3D-818D-61BA-5AB2-66104C6AF2A8}"/>
+                  </a:ext>
+                </a:extLst>
+              </p:cNvPr>
+              <p:cNvSpPr/>
+              <p:nvPr/>
+            </p:nvSpPr>
+            <p:spPr>
+              <a:xfrm>
+                <a:off x="4684144" y="1837427"/>
+                <a:ext cx="457200" cy="457200"/>
+              </a:xfrm>
+              <a:prstGeom prst="ellipse">
+                <a:avLst/>
+              </a:prstGeom>
+              <a:solidFill>
+                <a:schemeClr val="tx1"/>
+              </a:solidFill>
+              <a:ln>
+                <a:noFill/>
+              </a:ln>
+            </p:spPr>
+            <p:style>
+              <a:lnRef idx="2">
+                <a:schemeClr val="accent1">
+                  <a:shade val="15000"/>
+                </a:schemeClr>
+              </a:lnRef>
+              <a:fillRef idx="1">
+                <a:schemeClr val="accent1"/>
+              </a:fillRef>
+              <a:effectRef idx="0">
+                <a:schemeClr val="accent1"/>
+              </a:effectRef>
+              <a:fontRef idx="minor">
+                <a:schemeClr val="lt1"/>
+              </a:fontRef>
+            </p:style>
+            <p:txBody>
+              <a:bodyPr rtlCol="0" anchor="ctr"/>
+              <a:lstStyle/>
+              <a:p>
+                <a:pPr algn="ctr"/>
+                <a:endParaRPr lang="en-US"/>
+              </a:p>
+            </p:txBody>
+          </p:sp>
+          <p:sp>
+            <p:nvSpPr>
+              <p:cNvPr id="7" name="Oval 6">
+                <a:extLst>
+                  <a:ext uri="{FF2B5EF4-FFF2-40B4-BE49-F238E27FC236}">
+                    <a16:creationId xmlns:a16="http://schemas.microsoft.com/office/drawing/2014/main" id="{8DC5D3D4-29AE-4A18-B447-EE2DC6878DAF}"/>
+                  </a:ext>
+                </a:extLst>
+              </p:cNvPr>
+              <p:cNvSpPr/>
+              <p:nvPr/>
+            </p:nvSpPr>
+            <p:spPr>
+              <a:xfrm>
+                <a:off x="5335439" y="1837427"/>
+                <a:ext cx="457200" cy="457200"/>
+              </a:xfrm>
+              <a:prstGeom prst="ellipse">
+                <a:avLst/>
+              </a:prstGeom>
+              <a:solidFill>
+                <a:schemeClr val="tx1"/>
+              </a:solidFill>
+              <a:ln>
+                <a:noFill/>
+              </a:ln>
+            </p:spPr>
+            <p:style>
+              <a:lnRef idx="2">
+                <a:schemeClr val="accent1">
+                  <a:shade val="15000"/>
+                </a:schemeClr>
+              </a:lnRef>
+              <a:fillRef idx="1">
+                <a:schemeClr val="accent1"/>
+              </a:fillRef>
+              <a:effectRef idx="0">
+                <a:schemeClr val="accent1"/>
+              </a:effectRef>
+              <a:fontRef idx="minor">
+                <a:schemeClr val="lt1"/>
+              </a:fontRef>
+            </p:style>
+            <p:txBody>
+              <a:bodyPr rtlCol="0" anchor="ctr"/>
+              <a:lstStyle/>
+              <a:p>
+                <a:pPr algn="ctr"/>
+                <a:endParaRPr lang="en-US"/>
+              </a:p>
+            </p:txBody>
+          </p:sp>
+          <p:sp>
+            <p:nvSpPr>
+              <p:cNvPr id="8" name="Oval 7">
+                <a:extLst>
+                  <a:ext uri="{FF2B5EF4-FFF2-40B4-BE49-F238E27FC236}">
+                    <a16:creationId xmlns:a16="http://schemas.microsoft.com/office/drawing/2014/main" id="{B4F7625B-A264-D479-5AE5-B470F922CF03}"/>
+                  </a:ext>
+                </a:extLst>
+              </p:cNvPr>
+              <p:cNvSpPr/>
+              <p:nvPr/>
+            </p:nvSpPr>
+            <p:spPr>
+              <a:xfrm>
+                <a:off x="5986734" y="1837427"/>
+                <a:ext cx="457200" cy="457200"/>
+              </a:xfrm>
+              <a:prstGeom prst="ellipse">
+                <a:avLst/>
+              </a:prstGeom>
+              <a:solidFill>
+                <a:schemeClr val="tx1"/>
+              </a:solidFill>
+              <a:ln>
+                <a:noFill/>
+              </a:ln>
+            </p:spPr>
+            <p:style>
+              <a:lnRef idx="2">
+                <a:schemeClr val="accent1">
+                  <a:shade val="15000"/>
+                </a:schemeClr>
+              </a:lnRef>
+              <a:fillRef idx="1">
+                <a:schemeClr val="accent1"/>
+              </a:fillRef>
+              <a:effectRef idx="0">
+                <a:schemeClr val="accent1"/>
+              </a:effectRef>
+              <a:fontRef idx="minor">
+                <a:schemeClr val="lt1"/>
+              </a:fontRef>
+            </p:style>
+            <p:txBody>
+              <a:bodyPr rtlCol="0" anchor="ctr"/>
+              <a:lstStyle/>
+              <a:p>
+                <a:pPr algn="ctr"/>
+                <a:endParaRPr lang="en-US"/>
+              </a:p>
+            </p:txBody>
+          </p:sp>
+          <p:sp>
+            <p:nvSpPr>
+              <p:cNvPr id="9" name="Oval 8">
+                <a:extLst>
+                  <a:ext uri="{FF2B5EF4-FFF2-40B4-BE49-F238E27FC236}">
+                    <a16:creationId xmlns:a16="http://schemas.microsoft.com/office/drawing/2014/main" id="{DBA09F17-F8D7-1A52-5138-70F34C92FF1C}"/>
+                  </a:ext>
+                </a:extLst>
+              </p:cNvPr>
+              <p:cNvSpPr/>
+              <p:nvPr/>
+            </p:nvSpPr>
+            <p:spPr>
+              <a:xfrm>
+                <a:off x="6638029" y="1837427"/>
+                <a:ext cx="457200" cy="457200"/>
+              </a:xfrm>
+              <a:prstGeom prst="ellipse">
+                <a:avLst/>
+              </a:prstGeom>
+              <a:solidFill>
+                <a:schemeClr val="tx1"/>
+              </a:solidFill>
+              <a:ln>
+                <a:noFill/>
+              </a:ln>
+            </p:spPr>
+            <p:style>
+              <a:lnRef idx="2">
+                <a:schemeClr val="accent1">
+                  <a:shade val="15000"/>
+                </a:schemeClr>
+              </a:lnRef>
+              <a:fillRef idx="1">
+                <a:schemeClr val="accent1"/>
+              </a:fillRef>
+              <a:effectRef idx="0">
+                <a:schemeClr val="accent1"/>
+              </a:effectRef>
+              <a:fontRef idx="minor">
+                <a:schemeClr val="lt1"/>
+              </a:fontRef>
+            </p:style>
+            <p:txBody>
+              <a:bodyPr rtlCol="0" anchor="ctr"/>
+              <a:lstStyle/>
+              <a:p>
+                <a:pPr algn="ctr"/>
+                <a:endParaRPr lang="en-US"/>
+              </a:p>
+            </p:txBody>
+          </p:sp>
+          <p:sp>
+            <p:nvSpPr>
+              <p:cNvPr id="10" name="Oval 9">
+                <a:extLst>
+                  <a:ext uri="{FF2B5EF4-FFF2-40B4-BE49-F238E27FC236}">
+                    <a16:creationId xmlns:a16="http://schemas.microsoft.com/office/drawing/2014/main" id="{D29F0889-AA6C-CDE5-0278-7BA9BAC04DA6}"/>
+                  </a:ext>
+                </a:extLst>
+              </p:cNvPr>
+              <p:cNvSpPr/>
+              <p:nvPr/>
+            </p:nvSpPr>
+            <p:spPr>
+              <a:xfrm>
+                <a:off x="7289324" y="1837427"/>
+                <a:ext cx="457200" cy="457200"/>
+              </a:xfrm>
+              <a:prstGeom prst="ellipse">
+                <a:avLst/>
+              </a:prstGeom>
+              <a:solidFill>
+                <a:schemeClr val="tx1"/>
+              </a:solidFill>
+              <a:ln>
+                <a:noFill/>
+              </a:ln>
+            </p:spPr>
+            <p:style>
+              <a:lnRef idx="2">
+                <a:schemeClr val="accent1">
+                  <a:shade val="15000"/>
+                </a:schemeClr>
+              </a:lnRef>
+              <a:fillRef idx="1">
+                <a:schemeClr val="accent1"/>
+              </a:fillRef>
+              <a:effectRef idx="0">
+                <a:schemeClr val="accent1"/>
+              </a:effectRef>
+              <a:fontRef idx="minor">
+                <a:schemeClr val="lt1"/>
+              </a:fontRef>
+            </p:style>
+            <p:txBody>
+              <a:bodyPr rtlCol="0" anchor="ctr"/>
+              <a:lstStyle/>
+              <a:p>
+                <a:pPr algn="ctr"/>
+                <a:endParaRPr lang="en-US"/>
+              </a:p>
+            </p:txBody>
+          </p:sp>
+        </p:grpSp>
+        <p:grpSp>
+          <p:nvGrpSpPr>
+            <p:cNvPr id="16" name="Group 15">
+              <a:extLst>
+                <a:ext uri="{FF2B5EF4-FFF2-40B4-BE49-F238E27FC236}">
+                  <a16:creationId xmlns:a16="http://schemas.microsoft.com/office/drawing/2014/main" id="{D19825D2-F5D4-C0A2-A2B2-FB8C302ED8DA}"/>
+                </a:ext>
+              </a:extLst>
+            </p:cNvPr>
+            <p:cNvGrpSpPr/>
+            <p:nvPr/>
+          </p:nvGrpSpPr>
+          <p:grpSpPr>
+            <a:xfrm>
+              <a:off x="4886217" y="3569310"/>
+              <a:ext cx="2411085" cy="457200"/>
+              <a:chOff x="4949403" y="2587925"/>
+              <a:chExt cx="2411085" cy="457200"/>
+            </a:xfrm>
+          </p:grpSpPr>
+          <p:sp>
+            <p:nvSpPr>
+              <p:cNvPr id="11" name="Oval 10">
+                <a:extLst>
+                  <a:ext uri="{FF2B5EF4-FFF2-40B4-BE49-F238E27FC236}">
+                    <a16:creationId xmlns:a16="http://schemas.microsoft.com/office/drawing/2014/main" id="{7E5D5CA7-ACF2-B0F4-AB2F-3C65C4BFEDDF}"/>
+                  </a:ext>
+                </a:extLst>
+              </p:cNvPr>
+              <p:cNvSpPr/>
+              <p:nvPr/>
+            </p:nvSpPr>
+            <p:spPr>
+              <a:xfrm>
+                <a:off x="4949403" y="2587925"/>
+                <a:ext cx="457200" cy="457200"/>
+              </a:xfrm>
+              <a:prstGeom prst="ellipse">
+                <a:avLst/>
+              </a:prstGeom>
+              <a:solidFill>
+                <a:schemeClr val="tx1"/>
+              </a:solidFill>
+              <a:ln>
+                <a:noFill/>
+              </a:ln>
+            </p:spPr>
+            <p:style>
+              <a:lnRef idx="2">
+                <a:schemeClr val="accent1">
+                  <a:shade val="15000"/>
+                </a:schemeClr>
+              </a:lnRef>
+              <a:fillRef idx="1">
+                <a:schemeClr val="accent1"/>
+              </a:fillRef>
+              <a:effectRef idx="0">
+                <a:schemeClr val="accent1"/>
+              </a:effectRef>
+              <a:fontRef idx="minor">
+                <a:schemeClr val="lt1"/>
+              </a:fontRef>
+            </p:style>
+            <p:txBody>
+              <a:bodyPr rtlCol="0" anchor="ctr"/>
+              <a:lstStyle/>
+              <a:p>
+                <a:pPr algn="ctr"/>
+                <a:endParaRPr lang="en-US"/>
+              </a:p>
+            </p:txBody>
+          </p:sp>
+          <p:sp>
+            <p:nvSpPr>
+              <p:cNvPr id="12" name="Oval 11">
+                <a:extLst>
+                  <a:ext uri="{FF2B5EF4-FFF2-40B4-BE49-F238E27FC236}">
+                    <a16:creationId xmlns:a16="http://schemas.microsoft.com/office/drawing/2014/main" id="{5282600F-4E4C-4390-69B6-3CD451B7820C}"/>
+                  </a:ext>
+                </a:extLst>
+              </p:cNvPr>
+              <p:cNvSpPr/>
+              <p:nvPr/>
+            </p:nvSpPr>
+            <p:spPr>
+              <a:xfrm>
+                <a:off x="5600698" y="2587925"/>
+                <a:ext cx="457200" cy="457200"/>
+              </a:xfrm>
+              <a:prstGeom prst="ellipse">
+                <a:avLst/>
+              </a:prstGeom>
+              <a:solidFill>
+                <a:schemeClr val="tx1"/>
+              </a:solidFill>
+              <a:ln>
+                <a:noFill/>
+              </a:ln>
+            </p:spPr>
+            <p:style>
+              <a:lnRef idx="2">
+                <a:schemeClr val="accent1">
+                  <a:shade val="15000"/>
+                </a:schemeClr>
+              </a:lnRef>
+              <a:fillRef idx="1">
+                <a:schemeClr val="accent1"/>
+              </a:fillRef>
+              <a:effectRef idx="0">
+                <a:schemeClr val="accent1"/>
+              </a:effectRef>
+              <a:fontRef idx="minor">
+                <a:schemeClr val="lt1"/>
+              </a:fontRef>
+            </p:style>
+            <p:txBody>
+              <a:bodyPr rtlCol="0" anchor="ctr"/>
+              <a:lstStyle/>
+              <a:p>
+                <a:pPr algn="ctr"/>
+                <a:endParaRPr lang="en-US"/>
+              </a:p>
+            </p:txBody>
+          </p:sp>
+          <p:sp>
+            <p:nvSpPr>
+              <p:cNvPr id="13" name="Oval 12">
+                <a:extLst>
+                  <a:ext uri="{FF2B5EF4-FFF2-40B4-BE49-F238E27FC236}">
+                    <a16:creationId xmlns:a16="http://schemas.microsoft.com/office/drawing/2014/main" id="{EB21DC38-E02D-4711-1A44-9C81018A23ED}"/>
+                  </a:ext>
+                </a:extLst>
+              </p:cNvPr>
+              <p:cNvSpPr/>
+              <p:nvPr/>
+            </p:nvSpPr>
+            <p:spPr>
+              <a:xfrm>
+                <a:off x="6251993" y="2587925"/>
+                <a:ext cx="457200" cy="457200"/>
+              </a:xfrm>
+              <a:prstGeom prst="ellipse">
+                <a:avLst/>
+              </a:prstGeom>
+              <a:solidFill>
+                <a:schemeClr val="tx1"/>
+              </a:solidFill>
+              <a:ln>
+                <a:noFill/>
+              </a:ln>
+            </p:spPr>
+            <p:style>
+              <a:lnRef idx="2">
+                <a:schemeClr val="accent1">
+                  <a:shade val="15000"/>
+                </a:schemeClr>
+              </a:lnRef>
+              <a:fillRef idx="1">
+                <a:schemeClr val="accent1"/>
+              </a:fillRef>
+              <a:effectRef idx="0">
+                <a:schemeClr val="accent1"/>
+              </a:effectRef>
+              <a:fontRef idx="minor">
+                <a:schemeClr val="lt1"/>
+              </a:fontRef>
+            </p:style>
+            <p:txBody>
+              <a:bodyPr rtlCol="0" anchor="ctr"/>
+              <a:lstStyle/>
+              <a:p>
+                <a:pPr algn="ctr"/>
+                <a:endParaRPr lang="en-US"/>
+              </a:p>
+            </p:txBody>
+          </p:sp>
+          <p:sp>
+            <p:nvSpPr>
+              <p:cNvPr id="14" name="Oval 13">
+                <a:extLst>
+                  <a:ext uri="{FF2B5EF4-FFF2-40B4-BE49-F238E27FC236}">
+                    <a16:creationId xmlns:a16="http://schemas.microsoft.com/office/drawing/2014/main" id="{AF46777C-44B6-1471-8B25-B3F5AE5F4760}"/>
+                  </a:ext>
+                </a:extLst>
+              </p:cNvPr>
+              <p:cNvSpPr/>
+              <p:nvPr/>
+            </p:nvSpPr>
+            <p:spPr>
+              <a:xfrm>
+                <a:off x="6903288" y="2587925"/>
+                <a:ext cx="457200" cy="457200"/>
+              </a:xfrm>
+              <a:prstGeom prst="ellipse">
+                <a:avLst/>
+              </a:prstGeom>
+              <a:solidFill>
+                <a:schemeClr val="tx1"/>
+              </a:solidFill>
+              <a:ln>
+                <a:noFill/>
+              </a:ln>
+            </p:spPr>
+            <p:style>
+              <a:lnRef idx="2">
+                <a:schemeClr val="accent1">
+                  <a:shade val="15000"/>
+                </a:schemeClr>
+              </a:lnRef>
+              <a:fillRef idx="1">
+                <a:schemeClr val="accent1"/>
+              </a:fillRef>
+              <a:effectRef idx="0">
+                <a:schemeClr val="accent1"/>
+              </a:effectRef>
+              <a:fontRef idx="minor">
+                <a:schemeClr val="lt1"/>
+              </a:fontRef>
+            </p:style>
+            <p:txBody>
+              <a:bodyPr rtlCol="0" anchor="ctr"/>
+              <a:lstStyle/>
+              <a:p>
+                <a:pPr algn="ctr"/>
+                <a:endParaRPr lang="en-US"/>
+              </a:p>
+            </p:txBody>
+          </p:sp>
+        </p:grpSp>
+        <p:sp>
+          <p:nvSpPr>
+            <p:cNvPr id="21" name="Rectangle 20">
+              <a:extLst>
+                <a:ext uri="{FF2B5EF4-FFF2-40B4-BE49-F238E27FC236}">
+                  <a16:creationId xmlns:a16="http://schemas.microsoft.com/office/drawing/2014/main" id="{B40DBDD5-8DDC-2899-9D4D-69D74719ADEB}"/>
+                </a:ext>
+              </a:extLst>
+            </p:cNvPr>
+            <p:cNvSpPr/>
+            <p:nvPr/>
+          </p:nvSpPr>
+          <p:spPr>
+            <a:xfrm>
+              <a:off x="3672840" y="1005840"/>
+              <a:ext cx="4838700" cy="4846320"/>
+            </a:xfrm>
+            <a:prstGeom prst="rect">
+              <a:avLst/>
+            </a:prstGeom>
+            <a:noFill/>
+            <a:ln>
+              <a:noFill/>
+            </a:ln>
+          </p:spPr>
+          <p:style>
+            <a:lnRef idx="2">
+              <a:schemeClr val="accent1">
+                <a:shade val="15000"/>
+              </a:schemeClr>
+            </a:lnRef>
+            <a:fillRef idx="1">
+              <a:schemeClr val="accent1"/>
+            </a:fillRef>
+            <a:effectRef idx="0">
+              <a:schemeClr val="accent1"/>
+            </a:effectRef>
+            <a:fontRef idx="minor">
+              <a:schemeClr val="lt1"/>
+            </a:fontRef>
+          </p:style>
+          <p:txBody>
+            <a:bodyPr rtlCol="0" anchor="ctr"/>
+            <a:lstStyle/>
+            <a:p>
+              <a:pPr algn="ctr"/>
+              <a:endParaRPr lang="en-US"/>
+            </a:p>
+          </p:txBody>
+        </p:sp>
+      </p:grpSp>
+    </p:spTree>
+    <p:extLst>
+      <p:ext uri="{BB962C8B-B14F-4D97-AF65-F5344CB8AC3E}">
+        <p14:creationId xmlns:p14="http://schemas.microsoft.com/office/powerpoint/2010/main" val="4147031482"/>
+      </p:ext>
+    </p:extLst>
+  </p:cSld>
+  <p:clrMapOvr>
+    <a:masterClrMapping/>
+  </p:clrMapOvr>
+</p:sld>
+</file>
+
+<file path=ppt/slides/slide6.xml><?xml version="1.0" encoding="utf-8"?>
+<p:sld xmlns:a="http://schemas.openxmlformats.org/drawingml/2006/main" xmlns:r="http://schemas.openxmlformats.org/officeDocument/2006/relationships" xmlns:p="http://schemas.openxmlformats.org/presentationml/2006/main">
+  <p:cSld>
+    <p:spTree>
+      <p:nvGrpSpPr>
+        <p:cNvPr id="1" name=""/>
+        <p:cNvGrpSpPr/>
+        <p:nvPr/>
+      </p:nvGrpSpPr>
+      <p:grpSpPr>
+        <a:xfrm>
+          <a:off x="0" y="0"/>
+          <a:ext cx="0" cy="0"/>
+          <a:chOff x="0" y="0"/>
+          <a:chExt cx="0" cy="0"/>
+        </a:xfrm>
+      </p:grpSpPr>
+      <p:sp>
+        <p:nvSpPr>
+          <p:cNvPr id="2" name="Title 5">
+            <a:extLst>
+              <a:ext uri="{FF2B5EF4-FFF2-40B4-BE49-F238E27FC236}">
+                <a16:creationId xmlns:a16="http://schemas.microsoft.com/office/drawing/2014/main" id="{85878678-B9C6-1AEF-1359-AC7715189738}"/>
+              </a:ext>
+            </a:extLst>
+          </p:cNvPr>
+          <p:cNvSpPr txBox="1">
+            <a:spLocks/>
+          </p:cNvSpPr>
+          <p:nvPr/>
+        </p:nvSpPr>
+        <p:spPr>
+          <a:xfrm>
+            <a:off x="101600" y="136526"/>
+            <a:ext cx="11988802" cy="639330"/>
+          </a:xfrm>
+          <a:prstGeom prst="rect">
+            <a:avLst/>
+          </a:prstGeom>
+        </p:spPr>
+        <p:txBody>
+          <a:bodyPr>
+            <a:normAutofit fontScale="90000" lnSpcReduction="10000"/>
+          </a:bodyPr>
+          <a:lstStyle>
+            <a:lvl1pPr algn="l" defTabSz="914400" rtl="0" eaLnBrk="1" latinLnBrk="0" hangingPunct="1">
+              <a:lnSpc>
+                <a:spcPct val="90000"/>
+              </a:lnSpc>
+              <a:spcBef>
+                <a:spcPct val="0"/>
+              </a:spcBef>
+              <a:buNone/>
+              <a:defRPr sz="4400" kern="1200">
+                <a:solidFill>
+                  <a:schemeClr val="tx1"/>
+                </a:solidFill>
+                <a:latin typeface="+mj-lt"/>
+                <a:ea typeface="+mj-ea"/>
+                <a:cs typeface="+mj-cs"/>
+              </a:defRPr>
+            </a:lvl1pPr>
+          </a:lstStyle>
+          <a:p>
+            <a:r>
+              <a:rPr lang="en-US" dirty="0"/>
+              <a:t>Summer</a:t>
+            </a:r>
+          </a:p>
+        </p:txBody>
+      </p:sp>
+      <p:grpSp>
+        <p:nvGrpSpPr>
+          <p:cNvPr id="20" name="Group 19">
+            <a:extLst>
+              <a:ext uri="{FF2B5EF4-FFF2-40B4-BE49-F238E27FC236}">
+                <a16:creationId xmlns:a16="http://schemas.microsoft.com/office/drawing/2014/main" id="{000A517B-D28C-1989-395A-2936854DE314}"/>
+              </a:ext>
+            </a:extLst>
+          </p:cNvPr>
+          <p:cNvGrpSpPr/>
+          <p:nvPr/>
+        </p:nvGrpSpPr>
+        <p:grpSpPr>
+          <a:xfrm>
+            <a:off x="3672840" y="-358774"/>
+            <a:ext cx="4838700" cy="7017306"/>
+            <a:chOff x="3672840" y="-358774"/>
+            <a:chExt cx="4838700" cy="7017306"/>
+          </a:xfrm>
+        </p:grpSpPr>
+        <p:sp>
+          <p:nvSpPr>
+            <p:cNvPr id="21" name="Rectangle 20">
+              <a:extLst>
+                <a:ext uri="{FF2B5EF4-FFF2-40B4-BE49-F238E27FC236}">
+                  <a16:creationId xmlns:a16="http://schemas.microsoft.com/office/drawing/2014/main" id="{B40DBDD5-8DDC-2899-9D4D-69D74719ADEB}"/>
+                </a:ext>
+              </a:extLst>
+            </p:cNvPr>
+            <p:cNvSpPr/>
+            <p:nvPr/>
+          </p:nvSpPr>
+          <p:spPr>
+            <a:xfrm>
+              <a:off x="3672840" y="1005840"/>
+              <a:ext cx="4838700" cy="4846320"/>
+            </a:xfrm>
+            <a:prstGeom prst="rect">
+              <a:avLst/>
+            </a:prstGeom>
+            <a:noFill/>
+            <a:ln>
+              <a:noFill/>
+            </a:ln>
+          </p:spPr>
+          <p:style>
+            <a:lnRef idx="2">
+              <a:schemeClr val="accent1">
+                <a:shade val="15000"/>
+              </a:schemeClr>
+            </a:lnRef>
+            <a:fillRef idx="1">
+              <a:schemeClr val="accent1"/>
+            </a:fillRef>
+            <a:effectRef idx="0">
+              <a:schemeClr val="accent1"/>
+            </a:effectRef>
+            <a:fontRef idx="minor">
+              <a:schemeClr val="lt1"/>
+            </a:fontRef>
+          </p:style>
+          <p:txBody>
+            <a:bodyPr rtlCol="0" anchor="ctr"/>
+            <a:lstStyle/>
+            <a:p>
+              <a:pPr algn="ctr"/>
+              <a:endParaRPr lang="en-US"/>
+            </a:p>
+          </p:txBody>
+        </p:sp>
+        <p:sp>
+          <p:nvSpPr>
+            <p:cNvPr id="3" name="TextBox 2">
+              <a:extLst>
+                <a:ext uri="{FF2B5EF4-FFF2-40B4-BE49-F238E27FC236}">
+                  <a16:creationId xmlns:a16="http://schemas.microsoft.com/office/drawing/2014/main" id="{AB3B2FAB-DB89-5AF8-7E4F-700901CA4A3E}"/>
+                </a:ext>
+              </a:extLst>
+            </p:cNvPr>
+            <p:cNvSpPr txBox="1"/>
+            <p:nvPr/>
+          </p:nvSpPr>
+          <p:spPr>
+            <a:xfrm>
+              <a:off x="3705919" y="-358774"/>
+              <a:ext cx="3599062" cy="7017306"/>
+            </a:xfrm>
+            <a:prstGeom prst="rect">
+              <a:avLst/>
+            </a:prstGeom>
+            <a:noFill/>
+          </p:spPr>
+          <p:txBody>
+            <a:bodyPr wrap="none" rtlCol="0">
+              <a:spAutoFit/>
+            </a:bodyPr>
+            <a:lstStyle/>
+            <a:p>
+              <a:r>
+                <a:rPr lang="en-US" sz="45000" b="1" dirty="0">
+                  <a:latin typeface="Symbol" panose="05050102010706020507" pitchFamily="18" charset="2"/>
+                </a:rPr>
+                <a:t>S</a:t>
+              </a:r>
+            </a:p>
+          </p:txBody>
+        </p:sp>
+        <p:sp>
+          <p:nvSpPr>
+            <p:cNvPr id="5" name="Oval 4">
+              <a:extLst>
+                <a:ext uri="{FF2B5EF4-FFF2-40B4-BE49-F238E27FC236}">
+                  <a16:creationId xmlns:a16="http://schemas.microsoft.com/office/drawing/2014/main" id="{84376C9E-6FE0-75DD-1198-1C254BA76DAC}"/>
+                </a:ext>
+              </a:extLst>
+            </p:cNvPr>
+            <p:cNvSpPr/>
+            <p:nvPr/>
+          </p:nvSpPr>
+          <p:spPr>
+            <a:xfrm>
+              <a:off x="6587921" y="3200400"/>
+              <a:ext cx="457200" cy="457200"/>
+            </a:xfrm>
+            <a:prstGeom prst="ellipse">
+              <a:avLst/>
+            </a:prstGeom>
+            <a:solidFill>
+              <a:schemeClr val="tx1"/>
+            </a:solidFill>
+            <a:ln>
+              <a:noFill/>
+            </a:ln>
+          </p:spPr>
+          <p:style>
+            <a:lnRef idx="2">
+              <a:schemeClr val="accent1">
+                <a:shade val="15000"/>
+              </a:schemeClr>
+            </a:lnRef>
+            <a:fillRef idx="1">
+              <a:schemeClr val="accent1"/>
+            </a:fillRef>
+            <a:effectRef idx="0">
+              <a:schemeClr val="accent1"/>
+            </a:effectRef>
+            <a:fontRef idx="minor">
+              <a:schemeClr val="lt1"/>
+            </a:fontRef>
+          </p:style>
+          <p:txBody>
+            <a:bodyPr rtlCol="0" anchor="ctr"/>
+            <a:lstStyle/>
+            <a:p>
+              <a:pPr algn="ctr"/>
+              <a:endParaRPr lang="en-US"/>
+            </a:p>
+          </p:txBody>
+        </p:sp>
+        <p:sp>
+          <p:nvSpPr>
+            <p:cNvPr id="15" name="Oval 14">
+              <a:extLst>
+                <a:ext uri="{FF2B5EF4-FFF2-40B4-BE49-F238E27FC236}">
+                  <a16:creationId xmlns:a16="http://schemas.microsoft.com/office/drawing/2014/main" id="{294012B5-0938-EF1A-B2ED-BC12EC864C57}"/>
+                </a:ext>
+              </a:extLst>
+            </p:cNvPr>
+            <p:cNvSpPr/>
+            <p:nvPr/>
+          </p:nvSpPr>
+          <p:spPr>
+            <a:xfrm>
+              <a:off x="7189860" y="3200400"/>
+              <a:ext cx="457200" cy="457200"/>
+            </a:xfrm>
+            <a:prstGeom prst="ellipse">
+              <a:avLst/>
+            </a:prstGeom>
+            <a:solidFill>
+              <a:schemeClr val="tx1"/>
+            </a:solidFill>
+            <a:ln>
+              <a:noFill/>
+            </a:ln>
+          </p:spPr>
+          <p:style>
+            <a:lnRef idx="2">
+              <a:schemeClr val="accent1">
+                <a:shade val="15000"/>
+              </a:schemeClr>
+            </a:lnRef>
+            <a:fillRef idx="1">
+              <a:schemeClr val="accent1"/>
+            </a:fillRef>
+            <a:effectRef idx="0">
+              <a:schemeClr val="accent1"/>
+            </a:effectRef>
+            <a:fontRef idx="minor">
+              <a:schemeClr val="lt1"/>
+            </a:fontRef>
+          </p:style>
+          <p:txBody>
+            <a:bodyPr rtlCol="0" anchor="ctr"/>
+            <a:lstStyle/>
+            <a:p>
+              <a:pPr algn="ctr"/>
+              <a:endParaRPr lang="en-US"/>
+            </a:p>
+          </p:txBody>
+        </p:sp>
+        <p:sp>
+          <p:nvSpPr>
+            <p:cNvPr id="19" name="Oval 18">
+              <a:extLst>
+                <a:ext uri="{FF2B5EF4-FFF2-40B4-BE49-F238E27FC236}">
+                  <a16:creationId xmlns:a16="http://schemas.microsoft.com/office/drawing/2014/main" id="{238004D7-A97B-FE94-F2B3-583FD9201DAF}"/>
+                </a:ext>
+              </a:extLst>
+            </p:cNvPr>
+            <p:cNvSpPr/>
+            <p:nvPr/>
+          </p:nvSpPr>
+          <p:spPr>
+            <a:xfrm>
+              <a:off x="7791799" y="3200400"/>
+              <a:ext cx="457200" cy="457200"/>
+            </a:xfrm>
+            <a:prstGeom prst="ellipse">
+              <a:avLst/>
+            </a:prstGeom>
+            <a:solidFill>
+              <a:schemeClr val="tx1"/>
+            </a:solidFill>
+            <a:ln>
+              <a:noFill/>
+            </a:ln>
+          </p:spPr>
+          <p:style>
+            <a:lnRef idx="2">
+              <a:schemeClr val="accent1">
+                <a:shade val="15000"/>
+              </a:schemeClr>
+            </a:lnRef>
+            <a:fillRef idx="1">
+              <a:schemeClr val="accent1"/>
+            </a:fillRef>
+            <a:effectRef idx="0">
+              <a:schemeClr val="accent1"/>
+            </a:effectRef>
+            <a:fontRef idx="minor">
+              <a:schemeClr val="lt1"/>
+            </a:fontRef>
+          </p:style>
+          <p:txBody>
+            <a:bodyPr rtlCol="0" anchor="ctr"/>
+            <a:lstStyle/>
+            <a:p>
+              <a:pPr algn="ctr"/>
+              <a:endParaRPr lang="en-US"/>
+            </a:p>
+          </p:txBody>
+        </p:sp>
+      </p:grpSp>
+    </p:spTree>
+    <p:extLst>
+      <p:ext uri="{BB962C8B-B14F-4D97-AF65-F5344CB8AC3E}">
+        <p14:creationId xmlns:p14="http://schemas.microsoft.com/office/powerpoint/2010/main" val="1133531451"/>
+      </p:ext>
+    </p:extLst>
+  </p:cSld>
+  <p:clrMapOvr>
+    <a:masterClrMapping/>
+  </p:clrMapOvr>
+</p:sld>
+</file>
+
 <file path=ppt/theme/theme1.xml><?xml version="1.0" encoding="utf-8"?>
 <a:theme xmlns:a="http://schemas.openxmlformats.org/drawingml/2006/main" name="Office Theme">
   <a:themeElements>

</xml_diff>

<commit_message>
Renamed Hexinator to Hexulator and added as a tool.
</commit_message>
<xml_diff>
--- a/icons/JUtilsIcons.pptx
+++ b/icons/JUtilsIcons.pptx
@@ -7,10 +7,12 @@
   <p:sldIdLst>
     <p:sldId id="257" r:id="rId2"/>
     <p:sldId id="256" r:id="rId3"/>
-    <p:sldId id="258" r:id="rId4"/>
-    <p:sldId id="259" r:id="rId5"/>
-    <p:sldId id="260" r:id="rId6"/>
-    <p:sldId id="261" r:id="rId7"/>
+    <p:sldId id="262" r:id="rId4"/>
+    <p:sldId id="258" r:id="rId5"/>
+    <p:sldId id="259" r:id="rId6"/>
+    <p:sldId id="260" r:id="rId7"/>
+    <p:sldId id="263" r:id="rId8"/>
+    <p:sldId id="261" r:id="rId9"/>
   </p:sldIdLst>
   <p:sldSz cx="12192000" cy="6858000"/>
   <p:notesSz cx="6858000" cy="9144000"/>
@@ -264,7 +266,7 @@
           <a:p>
             <a:fld id="{4B23F753-79FB-41FF-B056-5F6BF77DE748}" type="datetimeFigureOut">
               <a:rPr lang="en-US" smtClean="0"/>
-              <a:t>1/24/2024</a:t>
+              <a:t>1/25/2024</a:t>
             </a:fld>
             <a:endParaRPr lang="en-US"/>
           </a:p>
@@ -575,7 +577,7 @@
           <a:p>
             <a:fld id="{4B23F753-79FB-41FF-B056-5F6BF77DE748}" type="datetimeFigureOut">
               <a:rPr lang="en-US" smtClean="0"/>
-              <a:t>1/24/2024</a:t>
+              <a:t>1/25/2024</a:t>
             </a:fld>
             <a:endParaRPr lang="en-US"/>
           </a:p>
@@ -863,7 +865,7 @@
           <a:p>
             <a:fld id="{4B23F753-79FB-41FF-B056-5F6BF77DE748}" type="datetimeFigureOut">
               <a:rPr lang="en-US" smtClean="0"/>
-              <a:t>1/24/2024</a:t>
+              <a:t>1/25/2024</a:t>
             </a:fld>
             <a:endParaRPr lang="en-US"/>
           </a:p>
@@ -1061,7 +1063,7 @@
           <a:p>
             <a:fld id="{4B23F753-79FB-41FF-B056-5F6BF77DE748}" type="datetimeFigureOut">
               <a:rPr lang="en-US" smtClean="0"/>
-              <a:t>1/24/2024</a:t>
+              <a:t>1/25/2024</a:t>
             </a:fld>
             <a:endParaRPr lang="en-US"/>
           </a:p>
@@ -1269,7 +1271,7 @@
           <a:p>
             <a:fld id="{4B23F753-79FB-41FF-B056-5F6BF77DE748}" type="datetimeFigureOut">
               <a:rPr lang="en-US" smtClean="0"/>
-              <a:t>1/24/2024</a:t>
+              <a:t>1/25/2024</a:t>
             </a:fld>
             <a:endParaRPr lang="en-US"/>
           </a:p>
@@ -1467,7 +1469,7 @@
           <a:p>
             <a:fld id="{4B23F753-79FB-41FF-B056-5F6BF77DE748}" type="datetimeFigureOut">
               <a:rPr lang="en-US" smtClean="0"/>
-              <a:t>1/24/2024</a:t>
+              <a:t>1/25/2024</a:t>
             </a:fld>
             <a:endParaRPr lang="en-US"/>
           </a:p>
@@ -1742,7 +1744,7 @@
           <a:p>
             <a:fld id="{4B23F753-79FB-41FF-B056-5F6BF77DE748}" type="datetimeFigureOut">
               <a:rPr lang="en-US" smtClean="0"/>
-              <a:t>1/24/2024</a:t>
+              <a:t>1/25/2024</a:t>
             </a:fld>
             <a:endParaRPr lang="en-US"/>
           </a:p>
@@ -2007,7 +2009,7 @@
           <a:p>
             <a:fld id="{4B23F753-79FB-41FF-B056-5F6BF77DE748}" type="datetimeFigureOut">
               <a:rPr lang="en-US" smtClean="0"/>
-              <a:t>1/24/2024</a:t>
+              <a:t>1/25/2024</a:t>
             </a:fld>
             <a:endParaRPr lang="en-US"/>
           </a:p>
@@ -2419,7 +2421,7 @@
           <a:p>
             <a:fld id="{4B23F753-79FB-41FF-B056-5F6BF77DE748}" type="datetimeFigureOut">
               <a:rPr lang="en-US" smtClean="0"/>
-              <a:t>1/24/2024</a:t>
+              <a:t>1/25/2024</a:t>
             </a:fld>
             <a:endParaRPr lang="en-US"/>
           </a:p>
@@ -2560,7 +2562,7 @@
           <a:p>
             <a:fld id="{4B23F753-79FB-41FF-B056-5F6BF77DE748}" type="datetimeFigureOut">
               <a:rPr lang="en-US" smtClean="0"/>
-              <a:t>1/24/2024</a:t>
+              <a:t>1/25/2024</a:t>
             </a:fld>
             <a:endParaRPr lang="en-US"/>
           </a:p>
@@ -2673,7 +2675,7 @@
           <a:p>
             <a:fld id="{4B23F753-79FB-41FF-B056-5F6BF77DE748}" type="datetimeFigureOut">
               <a:rPr lang="en-US" smtClean="0"/>
-              <a:t>1/24/2024</a:t>
+              <a:t>1/25/2024</a:t>
             </a:fld>
             <a:endParaRPr lang="en-US"/>
           </a:p>
@@ -2786,7 +2788,7 @@
           <a:p>
             <a:fld id="{4B23F753-79FB-41FF-B056-5F6BF77DE748}" type="datetimeFigureOut">
               <a:rPr lang="en-US" smtClean="0"/>
-              <a:t>1/24/2024</a:t>
+              <a:t>1/25/2024</a:t>
             </a:fld>
             <a:endParaRPr lang="en-US"/>
           </a:p>
@@ -2965,7 +2967,7 @@
           <a:p>
             <a:fld id="{4B23F753-79FB-41FF-B056-5F6BF77DE748}" type="datetimeFigureOut">
               <a:rPr lang="en-US" smtClean="0"/>
-              <a:t>1/24/2024</a:t>
+              <a:t>1/25/2024</a:t>
             </a:fld>
             <a:endParaRPr lang="en-US"/>
           </a:p>
@@ -4598,7 +4600,7 @@
           <a:p>
             <a:fld id="{4B23F753-79FB-41FF-B056-5F6BF77DE748}" type="datetimeFigureOut">
               <a:rPr lang="en-US" smtClean="0"/>
-              <a:t>1/24/2024</a:t>
+              <a:t>1/25/2024</a:t>
             </a:fld>
             <a:endParaRPr lang="en-US"/>
           </a:p>
@@ -5459,6 +5461,293 @@
           <a:chExt cx="0" cy="0"/>
         </a:xfrm>
       </p:grpSpPr>
+      <p:sp>
+        <p:nvSpPr>
+          <p:cNvPr id="10" name="Freeform: Shape 9">
+            <a:extLst>
+              <a:ext uri="{FF2B5EF4-FFF2-40B4-BE49-F238E27FC236}">
+                <a16:creationId xmlns:a16="http://schemas.microsoft.com/office/drawing/2014/main" id="{205E614E-5F28-B842-5D35-062176DF69BD}"/>
+              </a:ext>
+            </a:extLst>
+          </p:cNvPr>
+          <p:cNvSpPr/>
+          <p:nvPr/>
+        </p:nvSpPr>
+        <p:spPr>
+          <a:xfrm>
+            <a:off x="3936368" y="1604280"/>
+            <a:ext cx="4319263" cy="3649440"/>
+          </a:xfrm>
+          <a:custGeom>
+            <a:avLst/>
+            <a:gdLst>
+              <a:gd name="connsiteX0" fmla="*/ 8092 w 4997724"/>
+              <a:gd name="connsiteY0" fmla="*/ 2146974 h 4331964"/>
+              <a:gd name="connsiteX1" fmla="*/ 13167 w 4997724"/>
+              <a:gd name="connsiteY1" fmla="*/ 2146982 h 4331964"/>
+              <a:gd name="connsiteX2" fmla="*/ 1241590 w 4997724"/>
+              <a:gd name="connsiteY2" fmla="*/ 19291 h 4331964"/>
+              <a:gd name="connsiteX3" fmla="*/ 1239046 w 4997724"/>
+              <a:gd name="connsiteY3" fmla="*/ 14900 h 4331964"/>
+              <a:gd name="connsiteX4" fmla="*/ 1244125 w 4997724"/>
+              <a:gd name="connsiteY4" fmla="*/ 14900 h 4331964"/>
+              <a:gd name="connsiteX5" fmla="*/ 1252728 w 4997724"/>
+              <a:gd name="connsiteY5" fmla="*/ 0 h 4331964"/>
+              <a:gd name="connsiteX6" fmla="*/ 1261300 w 4997724"/>
+              <a:gd name="connsiteY6" fmla="*/ 14900 h 4331964"/>
+              <a:gd name="connsiteX7" fmla="*/ 3732011 w 4997724"/>
+              <a:gd name="connsiteY7" fmla="*/ 14900 h 4331964"/>
+              <a:gd name="connsiteX8" fmla="*/ 3735818 w 4997724"/>
+              <a:gd name="connsiteY8" fmla="*/ 8283 h 4331964"/>
+              <a:gd name="connsiteX9" fmla="*/ 3739638 w 4997724"/>
+              <a:gd name="connsiteY9" fmla="*/ 14901 h 4331964"/>
+              <a:gd name="connsiteX10" fmla="*/ 3744502 w 4997724"/>
+              <a:gd name="connsiteY10" fmla="*/ 14900 h 4331964"/>
+              <a:gd name="connsiteX11" fmla="*/ 3742066 w 4997724"/>
+              <a:gd name="connsiteY11" fmla="*/ 19104 h 4331964"/>
+              <a:gd name="connsiteX12" fmla="*/ 4979385 w 4997724"/>
+              <a:gd name="connsiteY12" fmla="*/ 2162204 h 4331964"/>
+              <a:gd name="connsiteX13" fmla="*/ 4997724 w 4997724"/>
+              <a:gd name="connsiteY13" fmla="*/ 2162176 h 4331964"/>
+              <a:gd name="connsiteX14" fmla="*/ 3744996 w 4997724"/>
+              <a:gd name="connsiteY14" fmla="*/ 4331964 h 4331964"/>
+              <a:gd name="connsiteX15" fmla="*/ 3731678 w 4997724"/>
+              <a:gd name="connsiteY15" fmla="*/ 4308815 h 4331964"/>
+              <a:gd name="connsiteX16" fmla="*/ 1265393 w 4997724"/>
+              <a:gd name="connsiteY16" fmla="*/ 4308815 h 4331964"/>
+              <a:gd name="connsiteX17" fmla="*/ 1260820 w 4997724"/>
+              <a:gd name="connsiteY17" fmla="*/ 4316763 h 4331964"/>
+              <a:gd name="connsiteX18" fmla="*/ 1256231 w 4997724"/>
+              <a:gd name="connsiteY18" fmla="*/ 4308815 h 4331964"/>
+              <a:gd name="connsiteX19" fmla="*/ 1247056 w 4997724"/>
+              <a:gd name="connsiteY19" fmla="*/ 4308815 h 4331964"/>
+              <a:gd name="connsiteX20" fmla="*/ 1251652 w 4997724"/>
+              <a:gd name="connsiteY20" fmla="*/ 4300883 h 4331964"/>
+              <a:gd name="connsiteX21" fmla="*/ 21245 w 4997724"/>
+              <a:gd name="connsiteY21" fmla="*/ 2169756 h 4331964"/>
+              <a:gd name="connsiteX22" fmla="*/ 0 w 4997724"/>
+              <a:gd name="connsiteY22" fmla="*/ 2169788 h 4331964"/>
+              <a:gd name="connsiteX23" fmla="*/ 10632 w 4997724"/>
+              <a:gd name="connsiteY23" fmla="*/ 2151373 h 4331964"/>
+            </a:gdLst>
+            <a:ahLst/>
+            <a:cxnLst>
+              <a:cxn ang="0">
+                <a:pos x="connsiteX0" y="connsiteY0"/>
+              </a:cxn>
+              <a:cxn ang="0">
+                <a:pos x="connsiteX1" y="connsiteY1"/>
+              </a:cxn>
+              <a:cxn ang="0">
+                <a:pos x="connsiteX2" y="connsiteY2"/>
+              </a:cxn>
+              <a:cxn ang="0">
+                <a:pos x="connsiteX3" y="connsiteY3"/>
+              </a:cxn>
+              <a:cxn ang="0">
+                <a:pos x="connsiteX4" y="connsiteY4"/>
+              </a:cxn>
+              <a:cxn ang="0">
+                <a:pos x="connsiteX5" y="connsiteY5"/>
+              </a:cxn>
+              <a:cxn ang="0">
+                <a:pos x="connsiteX6" y="connsiteY6"/>
+              </a:cxn>
+              <a:cxn ang="0">
+                <a:pos x="connsiteX7" y="connsiteY7"/>
+              </a:cxn>
+              <a:cxn ang="0">
+                <a:pos x="connsiteX8" y="connsiteY8"/>
+              </a:cxn>
+              <a:cxn ang="0">
+                <a:pos x="connsiteX9" y="connsiteY9"/>
+              </a:cxn>
+              <a:cxn ang="0">
+                <a:pos x="connsiteX10" y="connsiteY10"/>
+              </a:cxn>
+              <a:cxn ang="0">
+                <a:pos x="connsiteX11" y="connsiteY11"/>
+              </a:cxn>
+              <a:cxn ang="0">
+                <a:pos x="connsiteX12" y="connsiteY12"/>
+              </a:cxn>
+              <a:cxn ang="0">
+                <a:pos x="connsiteX13" y="connsiteY13"/>
+              </a:cxn>
+              <a:cxn ang="0">
+                <a:pos x="connsiteX14" y="connsiteY14"/>
+              </a:cxn>
+              <a:cxn ang="0">
+                <a:pos x="connsiteX15" y="connsiteY15"/>
+              </a:cxn>
+              <a:cxn ang="0">
+                <a:pos x="connsiteX16" y="connsiteY16"/>
+              </a:cxn>
+              <a:cxn ang="0">
+                <a:pos x="connsiteX17" y="connsiteY17"/>
+              </a:cxn>
+              <a:cxn ang="0">
+                <a:pos x="connsiteX18" y="connsiteY18"/>
+              </a:cxn>
+              <a:cxn ang="0">
+                <a:pos x="connsiteX19" y="connsiteY19"/>
+              </a:cxn>
+              <a:cxn ang="0">
+                <a:pos x="connsiteX20" y="connsiteY20"/>
+              </a:cxn>
+              <a:cxn ang="0">
+                <a:pos x="connsiteX21" y="connsiteY21"/>
+              </a:cxn>
+              <a:cxn ang="0">
+                <a:pos x="connsiteX22" y="connsiteY22"/>
+              </a:cxn>
+              <a:cxn ang="0">
+                <a:pos x="connsiteX23" y="connsiteY23"/>
+              </a:cxn>
+            </a:cxnLst>
+            <a:rect l="l" t="t" r="r" b="b"/>
+            <a:pathLst>
+              <a:path w="4997724" h="4331964">
+                <a:moveTo>
+                  <a:pt x="8092" y="2146974"/>
+                </a:moveTo>
+                <a:lnTo>
+                  <a:pt x="13167" y="2146982"/>
+                </a:lnTo>
+                <a:lnTo>
+                  <a:pt x="1241590" y="19291"/>
+                </a:lnTo>
+                <a:lnTo>
+                  <a:pt x="1239046" y="14900"/>
+                </a:lnTo>
+                <a:lnTo>
+                  <a:pt x="1244125" y="14900"/>
+                </a:lnTo>
+                <a:lnTo>
+                  <a:pt x="1252728" y="0"/>
+                </a:lnTo>
+                <a:lnTo>
+                  <a:pt x="1261300" y="14900"/>
+                </a:lnTo>
+                <a:lnTo>
+                  <a:pt x="3732011" y="14900"/>
+                </a:lnTo>
+                <a:lnTo>
+                  <a:pt x="3735818" y="8283"/>
+                </a:lnTo>
+                <a:lnTo>
+                  <a:pt x="3739638" y="14901"/>
+                </a:lnTo>
+                <a:lnTo>
+                  <a:pt x="3744502" y="14900"/>
+                </a:lnTo>
+                <a:lnTo>
+                  <a:pt x="3742066" y="19104"/>
+                </a:lnTo>
+                <a:lnTo>
+                  <a:pt x="4979385" y="2162204"/>
+                </a:lnTo>
+                <a:lnTo>
+                  <a:pt x="4997724" y="2162176"/>
+                </a:lnTo>
+                <a:lnTo>
+                  <a:pt x="3744996" y="4331964"/>
+                </a:lnTo>
+                <a:lnTo>
+                  <a:pt x="3731678" y="4308815"/>
+                </a:lnTo>
+                <a:lnTo>
+                  <a:pt x="1265393" y="4308815"/>
+                </a:lnTo>
+                <a:lnTo>
+                  <a:pt x="1260820" y="4316763"/>
+                </a:lnTo>
+                <a:lnTo>
+                  <a:pt x="1256231" y="4308815"/>
+                </a:lnTo>
+                <a:lnTo>
+                  <a:pt x="1247056" y="4308815"/>
+                </a:lnTo>
+                <a:lnTo>
+                  <a:pt x="1251652" y="4300883"/>
+                </a:lnTo>
+                <a:lnTo>
+                  <a:pt x="21245" y="2169756"/>
+                </a:lnTo>
+                <a:lnTo>
+                  <a:pt x="0" y="2169788"/>
+                </a:lnTo>
+                <a:lnTo>
+                  <a:pt x="10632" y="2151373"/>
+                </a:lnTo>
+                <a:close/>
+              </a:path>
+            </a:pathLst>
+          </a:custGeom>
+          <a:ln>
+            <a:noFill/>
+          </a:ln>
+        </p:spPr>
+        <p:style>
+          <a:lnRef idx="2">
+            <a:schemeClr val="accent1">
+              <a:shade val="15000"/>
+            </a:schemeClr>
+          </a:lnRef>
+          <a:fillRef idx="1">
+            <a:schemeClr val="accent1"/>
+          </a:fillRef>
+          <a:effectRef idx="0">
+            <a:schemeClr val="accent1"/>
+          </a:effectRef>
+          <a:fontRef idx="minor">
+            <a:schemeClr val="lt1"/>
+          </a:fontRef>
+        </p:style>
+        <p:txBody>
+          <a:bodyPr wrap="square" rtlCol="0" anchor="ctr">
+            <a:noAutofit/>
+          </a:bodyPr>
+          <a:lstStyle/>
+          <a:p>
+            <a:pPr algn="ctr"/>
+            <a:r>
+              <a:rPr lang="en-US" sz="34000" b="1" dirty="0"/>
+              <a:t>H</a:t>
+            </a:r>
+          </a:p>
+        </p:txBody>
+      </p:sp>
+    </p:spTree>
+    <p:extLst>
+      <p:ext uri="{BB962C8B-B14F-4D97-AF65-F5344CB8AC3E}">
+        <p14:creationId xmlns:p14="http://schemas.microsoft.com/office/powerpoint/2010/main" val="1627985002"/>
+      </p:ext>
+    </p:extLst>
+  </p:cSld>
+  <p:clrMapOvr>
+    <a:masterClrMapping/>
+  </p:clrMapOvr>
+</p:sld>
+</file>
+
+<file path=ppt/slides/slide4.xml><?xml version="1.0" encoding="utf-8"?>
+<p:sld xmlns:a="http://schemas.openxmlformats.org/drawingml/2006/main" xmlns:r="http://schemas.openxmlformats.org/officeDocument/2006/relationships" xmlns:p="http://schemas.openxmlformats.org/presentationml/2006/main">
+  <p:cSld>
+    <p:spTree>
+      <p:nvGrpSpPr>
+        <p:cNvPr id="1" name=""/>
+        <p:cNvGrpSpPr/>
+        <p:nvPr/>
+      </p:nvGrpSpPr>
+      <p:grpSpPr>
+        <a:xfrm>
+          <a:off x="0" y="0"/>
+          <a:ext cx="0" cy="0"/>
+          <a:chOff x="0" y="0"/>
+          <a:chExt cx="0" cy="0"/>
+        </a:xfrm>
+      </p:grpSpPr>
       <p:grpSp>
         <p:nvGrpSpPr>
           <p:cNvPr id="6" name="Group 5">
@@ -5777,7 +6066,7 @@
 </p:sld>
 </file>
 
-<file path=ppt/slides/slide4.xml><?xml version="1.0" encoding="utf-8"?>
+<file path=ppt/slides/slide5.xml><?xml version="1.0" encoding="utf-8"?>
 <p:sld xmlns:a="http://schemas.openxmlformats.org/drawingml/2006/main" xmlns:r="http://schemas.openxmlformats.org/officeDocument/2006/relationships" xmlns:p="http://schemas.openxmlformats.org/presentationml/2006/main">
   <p:cSld>
     <p:spTree>
@@ -6038,7 +6327,7 @@
 </p:sld>
 </file>
 
-<file path=ppt/slides/slide5.xml><?xml version="1.0" encoding="utf-8"?>
+<file path=ppt/slides/slide6.xml><?xml version="1.0" encoding="utf-8"?>
 <p:sld xmlns:a="http://schemas.openxmlformats.org/drawingml/2006/main" xmlns:r="http://schemas.openxmlformats.org/officeDocument/2006/relationships" xmlns:p="http://schemas.openxmlformats.org/presentationml/2006/main">
   <p:cSld>
     <p:spTree>
@@ -6152,8 +6441,8 @@
               </a:avLst>
             </a:prstGeom>
             <a:solidFill>
-              <a:schemeClr val="accent1">
-                <a:lumMod val="50000"/>
+              <a:schemeClr val="bg1">
+                <a:lumMod val="65000"/>
               </a:schemeClr>
             </a:solidFill>
             <a:ln w="76200">
@@ -7396,7 +7685,1127 @@
 </p:sld>
 </file>
 
-<file path=ppt/slides/slide6.xml><?xml version="1.0" encoding="utf-8"?>
+<file path=ppt/slides/slide7.xml><?xml version="1.0" encoding="utf-8"?>
+<p:sld xmlns:a="http://schemas.openxmlformats.org/drawingml/2006/main" xmlns:r="http://schemas.openxmlformats.org/officeDocument/2006/relationships" xmlns:p="http://schemas.openxmlformats.org/presentationml/2006/main">
+  <p:cSld>
+    <p:spTree>
+      <p:nvGrpSpPr>
+        <p:cNvPr id="1" name=""/>
+        <p:cNvGrpSpPr/>
+        <p:nvPr/>
+      </p:nvGrpSpPr>
+      <p:grpSpPr>
+        <a:xfrm>
+          <a:off x="0" y="0"/>
+          <a:ext cx="0" cy="0"/>
+          <a:chOff x="0" y="0"/>
+          <a:chExt cx="0" cy="0"/>
+        </a:xfrm>
+      </p:grpSpPr>
+      <p:sp>
+        <p:nvSpPr>
+          <p:cNvPr id="12" name="Rectangle: Rounded Corners 11">
+            <a:extLst>
+              <a:ext uri="{FF2B5EF4-FFF2-40B4-BE49-F238E27FC236}">
+                <a16:creationId xmlns:a16="http://schemas.microsoft.com/office/drawing/2014/main" id="{57395BA1-8342-7339-17FC-17D0EFBAFABB}"/>
+              </a:ext>
+            </a:extLst>
+          </p:cNvPr>
+          <p:cNvSpPr/>
+          <p:nvPr/>
+        </p:nvSpPr>
+        <p:spPr>
+          <a:xfrm>
+            <a:off x="5207793" y="2543175"/>
+            <a:ext cx="307181" cy="566738"/>
+          </a:xfrm>
+          <a:prstGeom prst="roundRect">
+            <a:avLst/>
+          </a:prstGeom>
+          <a:solidFill>
+            <a:schemeClr val="tx1"/>
+          </a:solidFill>
+          <a:ln>
+            <a:noFill/>
+          </a:ln>
+        </p:spPr>
+        <p:style>
+          <a:lnRef idx="2">
+            <a:schemeClr val="accent1">
+              <a:shade val="15000"/>
+            </a:schemeClr>
+          </a:lnRef>
+          <a:fillRef idx="1">
+            <a:schemeClr val="accent1"/>
+          </a:fillRef>
+          <a:effectRef idx="0">
+            <a:schemeClr val="accent1"/>
+          </a:effectRef>
+          <a:fontRef idx="minor">
+            <a:schemeClr val="lt1"/>
+          </a:fontRef>
+        </p:style>
+        <p:txBody>
+          <a:bodyPr rtlCol="0" anchor="ctr"/>
+          <a:lstStyle/>
+          <a:p>
+            <a:pPr algn="ctr"/>
+            <a:endParaRPr lang="en-US"/>
+          </a:p>
+        </p:txBody>
+      </p:sp>
+      <p:sp>
+        <p:nvSpPr>
+          <p:cNvPr id="13" name="Rectangle: Rounded Corners 12">
+            <a:extLst>
+              <a:ext uri="{FF2B5EF4-FFF2-40B4-BE49-F238E27FC236}">
+                <a16:creationId xmlns:a16="http://schemas.microsoft.com/office/drawing/2014/main" id="{A67FE8C9-7226-F19E-919D-521E17CC6CC1}"/>
+              </a:ext>
+            </a:extLst>
+          </p:cNvPr>
+          <p:cNvSpPr/>
+          <p:nvPr/>
+        </p:nvSpPr>
+        <p:spPr>
+          <a:xfrm>
+            <a:off x="5684043" y="2543175"/>
+            <a:ext cx="307181" cy="566738"/>
+          </a:xfrm>
+          <a:prstGeom prst="roundRect">
+            <a:avLst/>
+          </a:prstGeom>
+          <a:solidFill>
+            <a:schemeClr val="tx1"/>
+          </a:solidFill>
+          <a:ln>
+            <a:noFill/>
+          </a:ln>
+        </p:spPr>
+        <p:style>
+          <a:lnRef idx="2">
+            <a:schemeClr val="accent1">
+              <a:shade val="15000"/>
+            </a:schemeClr>
+          </a:lnRef>
+          <a:fillRef idx="1">
+            <a:schemeClr val="accent1"/>
+          </a:fillRef>
+          <a:effectRef idx="0">
+            <a:schemeClr val="accent1"/>
+          </a:effectRef>
+          <a:fontRef idx="minor">
+            <a:schemeClr val="lt1"/>
+          </a:fontRef>
+        </p:style>
+        <p:txBody>
+          <a:bodyPr rtlCol="0" anchor="ctr"/>
+          <a:lstStyle/>
+          <a:p>
+            <a:pPr algn="ctr"/>
+            <a:endParaRPr lang="en-US"/>
+          </a:p>
+        </p:txBody>
+      </p:sp>
+      <p:sp>
+        <p:nvSpPr>
+          <p:cNvPr id="14" name="Rectangle: Rounded Corners 13">
+            <a:extLst>
+              <a:ext uri="{FF2B5EF4-FFF2-40B4-BE49-F238E27FC236}">
+                <a16:creationId xmlns:a16="http://schemas.microsoft.com/office/drawing/2014/main" id="{73613A4F-897A-AC30-AA4F-0809DC6D606B}"/>
+              </a:ext>
+            </a:extLst>
+          </p:cNvPr>
+          <p:cNvSpPr/>
+          <p:nvPr/>
+        </p:nvSpPr>
+        <p:spPr>
+          <a:xfrm>
+            <a:off x="6217449" y="2543175"/>
+            <a:ext cx="307181" cy="566738"/>
+          </a:xfrm>
+          <a:prstGeom prst="roundRect">
+            <a:avLst/>
+          </a:prstGeom>
+          <a:solidFill>
+            <a:schemeClr val="tx1"/>
+          </a:solidFill>
+          <a:ln>
+            <a:noFill/>
+          </a:ln>
+        </p:spPr>
+        <p:style>
+          <a:lnRef idx="2">
+            <a:schemeClr val="accent1">
+              <a:shade val="15000"/>
+            </a:schemeClr>
+          </a:lnRef>
+          <a:fillRef idx="1">
+            <a:schemeClr val="accent1"/>
+          </a:fillRef>
+          <a:effectRef idx="0">
+            <a:schemeClr val="accent1"/>
+          </a:effectRef>
+          <a:fontRef idx="minor">
+            <a:schemeClr val="lt1"/>
+          </a:fontRef>
+        </p:style>
+        <p:txBody>
+          <a:bodyPr rtlCol="0" anchor="ctr"/>
+          <a:lstStyle/>
+          <a:p>
+            <a:pPr algn="ctr"/>
+            <a:endParaRPr lang="en-US"/>
+          </a:p>
+        </p:txBody>
+      </p:sp>
+      <p:sp>
+        <p:nvSpPr>
+          <p:cNvPr id="15" name="Rectangle: Rounded Corners 14">
+            <a:extLst>
+              <a:ext uri="{FF2B5EF4-FFF2-40B4-BE49-F238E27FC236}">
+                <a16:creationId xmlns:a16="http://schemas.microsoft.com/office/drawing/2014/main" id="{CDB3A7C8-C767-357E-CD35-7B0B807B0828}"/>
+              </a:ext>
+            </a:extLst>
+          </p:cNvPr>
+          <p:cNvSpPr/>
+          <p:nvPr/>
+        </p:nvSpPr>
+        <p:spPr>
+          <a:xfrm>
+            <a:off x="6735384" y="2543175"/>
+            <a:ext cx="307181" cy="566738"/>
+          </a:xfrm>
+          <a:prstGeom prst="roundRect">
+            <a:avLst/>
+          </a:prstGeom>
+          <a:solidFill>
+            <a:schemeClr val="tx1"/>
+          </a:solidFill>
+          <a:ln>
+            <a:noFill/>
+          </a:ln>
+        </p:spPr>
+        <p:style>
+          <a:lnRef idx="2">
+            <a:schemeClr val="accent1">
+              <a:shade val="15000"/>
+            </a:schemeClr>
+          </a:lnRef>
+          <a:fillRef idx="1">
+            <a:schemeClr val="accent1"/>
+          </a:fillRef>
+          <a:effectRef idx="0">
+            <a:schemeClr val="accent1"/>
+          </a:effectRef>
+          <a:fontRef idx="minor">
+            <a:schemeClr val="lt1"/>
+          </a:fontRef>
+        </p:style>
+        <p:txBody>
+          <a:bodyPr rtlCol="0" anchor="ctr"/>
+          <a:lstStyle/>
+          <a:p>
+            <a:pPr algn="ctr"/>
+            <a:endParaRPr lang="en-US"/>
+          </a:p>
+        </p:txBody>
+      </p:sp>
+      <p:sp>
+        <p:nvSpPr>
+          <p:cNvPr id="16" name="Rectangle 15">
+            <a:extLst>
+              <a:ext uri="{FF2B5EF4-FFF2-40B4-BE49-F238E27FC236}">
+                <a16:creationId xmlns:a16="http://schemas.microsoft.com/office/drawing/2014/main" id="{8B0EAF0E-BFCF-22AF-5229-83BC1A8D0FE1}"/>
+              </a:ext>
+            </a:extLst>
+          </p:cNvPr>
+          <p:cNvSpPr/>
+          <p:nvPr/>
+        </p:nvSpPr>
+        <p:spPr>
+          <a:xfrm>
+            <a:off x="3685592" y="1007706"/>
+            <a:ext cx="4814596" cy="4833257"/>
+          </a:xfrm>
+          <a:prstGeom prst="rect">
+            <a:avLst/>
+          </a:prstGeom>
+          <a:noFill/>
+          <a:ln>
+            <a:noFill/>
+          </a:ln>
+        </p:spPr>
+        <p:style>
+          <a:lnRef idx="2">
+            <a:schemeClr val="accent1">
+              <a:shade val="15000"/>
+            </a:schemeClr>
+          </a:lnRef>
+          <a:fillRef idx="1">
+            <a:schemeClr val="accent1"/>
+          </a:fillRef>
+          <a:effectRef idx="0">
+            <a:schemeClr val="accent1"/>
+          </a:effectRef>
+          <a:fontRef idx="minor">
+            <a:schemeClr val="lt1"/>
+          </a:fontRef>
+        </p:style>
+        <p:txBody>
+          <a:bodyPr rtlCol="0" anchor="ctr"/>
+          <a:lstStyle/>
+          <a:p>
+            <a:pPr algn="ctr"/>
+            <a:endParaRPr lang="en-US"/>
+          </a:p>
+        </p:txBody>
+      </p:sp>
+      <p:sp>
+        <p:nvSpPr>
+          <p:cNvPr id="29" name="Rectangle: Rounded Corners 28">
+            <a:extLst>
+              <a:ext uri="{FF2B5EF4-FFF2-40B4-BE49-F238E27FC236}">
+                <a16:creationId xmlns:a16="http://schemas.microsoft.com/office/drawing/2014/main" id="{41B890A1-028A-E1CA-D9A6-D20C3192E05F}"/>
+              </a:ext>
+            </a:extLst>
+          </p:cNvPr>
+          <p:cNvSpPr/>
+          <p:nvPr/>
+        </p:nvSpPr>
+        <p:spPr>
+          <a:xfrm>
+            <a:off x="3951270" y="1277321"/>
+            <a:ext cx="307181" cy="4321045"/>
+          </a:xfrm>
+          <a:prstGeom prst="roundRect">
+            <a:avLst/>
+          </a:prstGeom>
+          <a:solidFill>
+            <a:schemeClr val="tx1"/>
+          </a:solidFill>
+          <a:ln>
+            <a:noFill/>
+          </a:ln>
+        </p:spPr>
+        <p:style>
+          <a:lnRef idx="2">
+            <a:schemeClr val="accent1">
+              <a:shade val="15000"/>
+            </a:schemeClr>
+          </a:lnRef>
+          <a:fillRef idx="1">
+            <a:schemeClr val="accent1"/>
+          </a:fillRef>
+          <a:effectRef idx="0">
+            <a:schemeClr val="accent1"/>
+          </a:effectRef>
+          <a:fontRef idx="minor">
+            <a:schemeClr val="lt1"/>
+          </a:fontRef>
+        </p:style>
+        <p:txBody>
+          <a:bodyPr rtlCol="0" anchor="ctr"/>
+          <a:lstStyle/>
+          <a:p>
+            <a:pPr algn="ctr"/>
+            <a:endParaRPr lang="en-US"/>
+          </a:p>
+        </p:txBody>
+      </p:sp>
+      <p:sp>
+        <p:nvSpPr>
+          <p:cNvPr id="30" name="Rectangle: Rounded Corners 29">
+            <a:extLst>
+              <a:ext uri="{FF2B5EF4-FFF2-40B4-BE49-F238E27FC236}">
+                <a16:creationId xmlns:a16="http://schemas.microsoft.com/office/drawing/2014/main" id="{3D6E9D8A-B4F0-78EC-E345-E2FB05EC0E76}"/>
+              </a:ext>
+            </a:extLst>
+          </p:cNvPr>
+          <p:cNvSpPr/>
+          <p:nvPr/>
+        </p:nvSpPr>
+        <p:spPr>
+          <a:xfrm>
+            <a:off x="3951270" y="1259634"/>
+            <a:ext cx="4306322" cy="317239"/>
+          </a:xfrm>
+          <a:prstGeom prst="roundRect">
+            <a:avLst/>
+          </a:prstGeom>
+          <a:solidFill>
+            <a:schemeClr val="tx1"/>
+          </a:solidFill>
+          <a:ln>
+            <a:noFill/>
+          </a:ln>
+        </p:spPr>
+        <p:style>
+          <a:lnRef idx="2">
+            <a:schemeClr val="accent1">
+              <a:shade val="15000"/>
+            </a:schemeClr>
+          </a:lnRef>
+          <a:fillRef idx="1">
+            <a:schemeClr val="accent1"/>
+          </a:fillRef>
+          <a:effectRef idx="0">
+            <a:schemeClr val="accent1"/>
+          </a:effectRef>
+          <a:fontRef idx="minor">
+            <a:schemeClr val="lt1"/>
+          </a:fontRef>
+        </p:style>
+        <p:txBody>
+          <a:bodyPr rtlCol="0" anchor="ctr"/>
+          <a:lstStyle/>
+          <a:p>
+            <a:pPr algn="ctr"/>
+            <a:endParaRPr lang="en-US"/>
+          </a:p>
+        </p:txBody>
+      </p:sp>
+      <p:sp>
+        <p:nvSpPr>
+          <p:cNvPr id="31" name="Rectangle: Rounded Corners 30">
+            <a:extLst>
+              <a:ext uri="{FF2B5EF4-FFF2-40B4-BE49-F238E27FC236}">
+                <a16:creationId xmlns:a16="http://schemas.microsoft.com/office/drawing/2014/main" id="{F4B2A3F7-03A6-2133-C078-92F63F4DB8CB}"/>
+              </a:ext>
+            </a:extLst>
+          </p:cNvPr>
+          <p:cNvSpPr/>
+          <p:nvPr/>
+        </p:nvSpPr>
+        <p:spPr>
+          <a:xfrm>
+            <a:off x="7970554" y="1259634"/>
+            <a:ext cx="307182" cy="4321045"/>
+          </a:xfrm>
+          <a:prstGeom prst="roundRect">
+            <a:avLst/>
+          </a:prstGeom>
+          <a:solidFill>
+            <a:schemeClr val="tx1"/>
+          </a:solidFill>
+          <a:ln>
+            <a:noFill/>
+          </a:ln>
+        </p:spPr>
+        <p:style>
+          <a:lnRef idx="2">
+            <a:schemeClr val="accent1">
+              <a:shade val="15000"/>
+            </a:schemeClr>
+          </a:lnRef>
+          <a:fillRef idx="1">
+            <a:schemeClr val="accent1"/>
+          </a:fillRef>
+          <a:effectRef idx="0">
+            <a:schemeClr val="accent1"/>
+          </a:effectRef>
+          <a:fontRef idx="minor">
+            <a:schemeClr val="lt1"/>
+          </a:fontRef>
+        </p:style>
+        <p:txBody>
+          <a:bodyPr rtlCol="0" anchor="ctr"/>
+          <a:lstStyle/>
+          <a:p>
+            <a:pPr algn="ctr"/>
+            <a:endParaRPr lang="en-US"/>
+          </a:p>
+        </p:txBody>
+      </p:sp>
+      <p:sp>
+        <p:nvSpPr>
+          <p:cNvPr id="32" name="Rectangle: Rounded Corners 31">
+            <a:extLst>
+              <a:ext uri="{FF2B5EF4-FFF2-40B4-BE49-F238E27FC236}">
+                <a16:creationId xmlns:a16="http://schemas.microsoft.com/office/drawing/2014/main" id="{3A490DD3-0142-6BE0-B18C-CA3740CAEE85}"/>
+              </a:ext>
+            </a:extLst>
+          </p:cNvPr>
+          <p:cNvSpPr/>
+          <p:nvPr/>
+        </p:nvSpPr>
+        <p:spPr>
+          <a:xfrm>
+            <a:off x="3970223" y="5293225"/>
+            <a:ext cx="4306322" cy="308883"/>
+          </a:xfrm>
+          <a:prstGeom prst="roundRect">
+            <a:avLst/>
+          </a:prstGeom>
+          <a:solidFill>
+            <a:schemeClr val="tx1"/>
+          </a:solidFill>
+          <a:ln>
+            <a:noFill/>
+          </a:ln>
+        </p:spPr>
+        <p:style>
+          <a:lnRef idx="2">
+            <a:schemeClr val="accent1">
+              <a:shade val="15000"/>
+            </a:schemeClr>
+          </a:lnRef>
+          <a:fillRef idx="1">
+            <a:schemeClr val="accent1"/>
+          </a:fillRef>
+          <a:effectRef idx="0">
+            <a:schemeClr val="accent1"/>
+          </a:effectRef>
+          <a:fontRef idx="minor">
+            <a:schemeClr val="lt1"/>
+          </a:fontRef>
+        </p:style>
+        <p:txBody>
+          <a:bodyPr rtlCol="0" anchor="ctr"/>
+          <a:lstStyle/>
+          <a:p>
+            <a:pPr algn="ctr"/>
+            <a:endParaRPr lang="en-US"/>
+          </a:p>
+        </p:txBody>
+      </p:sp>
+      <p:sp>
+        <p:nvSpPr>
+          <p:cNvPr id="33" name="Rectangle: Rounded Corners 32">
+            <a:extLst>
+              <a:ext uri="{FF2B5EF4-FFF2-40B4-BE49-F238E27FC236}">
+                <a16:creationId xmlns:a16="http://schemas.microsoft.com/office/drawing/2014/main" id="{B7B827C3-6B27-251D-139B-61CCE30A7C38}"/>
+              </a:ext>
+            </a:extLst>
+          </p:cNvPr>
+          <p:cNvSpPr/>
+          <p:nvPr/>
+        </p:nvSpPr>
+        <p:spPr>
+          <a:xfrm>
+            <a:off x="4576745" y="1888235"/>
+            <a:ext cx="3086118" cy="317239"/>
+          </a:xfrm>
+          <a:prstGeom prst="roundRect">
+            <a:avLst/>
+          </a:prstGeom>
+          <a:solidFill>
+            <a:schemeClr val="tx1"/>
+          </a:solidFill>
+          <a:ln>
+            <a:noFill/>
+          </a:ln>
+        </p:spPr>
+        <p:style>
+          <a:lnRef idx="2">
+            <a:schemeClr val="accent1">
+              <a:shade val="15000"/>
+            </a:schemeClr>
+          </a:lnRef>
+          <a:fillRef idx="1">
+            <a:schemeClr val="accent1"/>
+          </a:fillRef>
+          <a:effectRef idx="0">
+            <a:schemeClr val="accent1"/>
+          </a:effectRef>
+          <a:fontRef idx="minor">
+            <a:schemeClr val="lt1"/>
+          </a:fontRef>
+        </p:style>
+        <p:txBody>
+          <a:bodyPr rtlCol="0" anchor="ctr"/>
+          <a:lstStyle/>
+          <a:p>
+            <a:pPr algn="ctr"/>
+            <a:endParaRPr lang="en-US"/>
+          </a:p>
+        </p:txBody>
+      </p:sp>
+      <p:sp>
+        <p:nvSpPr>
+          <p:cNvPr id="34" name="Rectangle: Rounded Corners 33">
+            <a:extLst>
+              <a:ext uri="{FF2B5EF4-FFF2-40B4-BE49-F238E27FC236}">
+                <a16:creationId xmlns:a16="http://schemas.microsoft.com/office/drawing/2014/main" id="{9A2DE0E8-A0DA-7A44-0E8B-D214466F9888}"/>
+              </a:ext>
+            </a:extLst>
+          </p:cNvPr>
+          <p:cNvSpPr/>
+          <p:nvPr/>
+        </p:nvSpPr>
+        <p:spPr>
+          <a:xfrm>
+            <a:off x="4576745" y="1887215"/>
+            <a:ext cx="307181" cy="2179960"/>
+          </a:xfrm>
+          <a:prstGeom prst="roundRect">
+            <a:avLst/>
+          </a:prstGeom>
+          <a:solidFill>
+            <a:schemeClr val="tx1"/>
+          </a:solidFill>
+          <a:ln>
+            <a:noFill/>
+          </a:ln>
+        </p:spPr>
+        <p:style>
+          <a:lnRef idx="2">
+            <a:schemeClr val="accent1">
+              <a:shade val="15000"/>
+            </a:schemeClr>
+          </a:lnRef>
+          <a:fillRef idx="1">
+            <a:schemeClr val="accent1"/>
+          </a:fillRef>
+          <a:effectRef idx="0">
+            <a:schemeClr val="accent1"/>
+          </a:effectRef>
+          <a:fontRef idx="minor">
+            <a:schemeClr val="lt1"/>
+          </a:fontRef>
+        </p:style>
+        <p:txBody>
+          <a:bodyPr rtlCol="0" anchor="ctr"/>
+          <a:lstStyle/>
+          <a:p>
+            <a:pPr algn="ctr"/>
+            <a:endParaRPr lang="en-US"/>
+          </a:p>
+        </p:txBody>
+      </p:sp>
+      <p:sp>
+        <p:nvSpPr>
+          <p:cNvPr id="35" name="Rectangle: Rounded Corners 34">
+            <a:extLst>
+              <a:ext uri="{FF2B5EF4-FFF2-40B4-BE49-F238E27FC236}">
+                <a16:creationId xmlns:a16="http://schemas.microsoft.com/office/drawing/2014/main" id="{8689D290-966B-DB0B-F009-563FFCAF1A03}"/>
+              </a:ext>
+            </a:extLst>
+          </p:cNvPr>
+          <p:cNvSpPr/>
+          <p:nvPr/>
+        </p:nvSpPr>
+        <p:spPr>
+          <a:xfrm>
+            <a:off x="4585088" y="3727846"/>
+            <a:ext cx="622705" cy="337968"/>
+          </a:xfrm>
+          <a:prstGeom prst="roundRect">
+            <a:avLst/>
+          </a:prstGeom>
+          <a:solidFill>
+            <a:schemeClr val="tx1"/>
+          </a:solidFill>
+          <a:ln>
+            <a:noFill/>
+          </a:ln>
+        </p:spPr>
+        <p:style>
+          <a:lnRef idx="2">
+            <a:schemeClr val="accent1">
+              <a:shade val="15000"/>
+            </a:schemeClr>
+          </a:lnRef>
+          <a:fillRef idx="1">
+            <a:schemeClr val="accent1"/>
+          </a:fillRef>
+          <a:effectRef idx="0">
+            <a:schemeClr val="accent1"/>
+          </a:effectRef>
+          <a:fontRef idx="minor">
+            <a:schemeClr val="lt1"/>
+          </a:fontRef>
+        </p:style>
+        <p:txBody>
+          <a:bodyPr rtlCol="0" anchor="ctr"/>
+          <a:lstStyle/>
+          <a:p>
+            <a:pPr algn="ctr"/>
+            <a:endParaRPr lang="en-US"/>
+          </a:p>
+        </p:txBody>
+      </p:sp>
+      <p:sp>
+        <p:nvSpPr>
+          <p:cNvPr id="36" name="Rectangle: Rounded Corners 35">
+            <a:extLst>
+              <a:ext uri="{FF2B5EF4-FFF2-40B4-BE49-F238E27FC236}">
+                <a16:creationId xmlns:a16="http://schemas.microsoft.com/office/drawing/2014/main" id="{81625F13-69DB-6725-3833-BB86B62F6E4A}"/>
+              </a:ext>
+            </a:extLst>
+          </p:cNvPr>
+          <p:cNvSpPr/>
+          <p:nvPr/>
+        </p:nvSpPr>
+        <p:spPr>
+          <a:xfrm>
+            <a:off x="4892269" y="3727846"/>
+            <a:ext cx="318294" cy="951310"/>
+          </a:xfrm>
+          <a:prstGeom prst="roundRect">
+            <a:avLst/>
+          </a:prstGeom>
+          <a:solidFill>
+            <a:schemeClr val="tx1"/>
+          </a:solidFill>
+          <a:ln>
+            <a:noFill/>
+          </a:ln>
+        </p:spPr>
+        <p:style>
+          <a:lnRef idx="2">
+            <a:schemeClr val="accent1">
+              <a:shade val="15000"/>
+            </a:schemeClr>
+          </a:lnRef>
+          <a:fillRef idx="1">
+            <a:schemeClr val="accent1"/>
+          </a:fillRef>
+          <a:effectRef idx="0">
+            <a:schemeClr val="accent1"/>
+          </a:effectRef>
+          <a:fontRef idx="minor">
+            <a:schemeClr val="lt1"/>
+          </a:fontRef>
+        </p:style>
+        <p:txBody>
+          <a:bodyPr rtlCol="0" anchor="ctr"/>
+          <a:lstStyle/>
+          <a:p>
+            <a:pPr algn="ctr"/>
+            <a:endParaRPr lang="en-US"/>
+          </a:p>
+        </p:txBody>
+      </p:sp>
+      <p:sp>
+        <p:nvSpPr>
+          <p:cNvPr id="37" name="Rectangle: Rounded Corners 36">
+            <a:extLst>
+              <a:ext uri="{FF2B5EF4-FFF2-40B4-BE49-F238E27FC236}">
+                <a16:creationId xmlns:a16="http://schemas.microsoft.com/office/drawing/2014/main" id="{6232D815-1AAB-31F0-C4A3-B64F776BF25A}"/>
+              </a:ext>
+            </a:extLst>
+          </p:cNvPr>
+          <p:cNvSpPr/>
+          <p:nvPr/>
+        </p:nvSpPr>
+        <p:spPr>
+          <a:xfrm>
+            <a:off x="4892268" y="4374356"/>
+            <a:ext cx="910838" cy="305844"/>
+          </a:xfrm>
+          <a:prstGeom prst="roundRect">
+            <a:avLst/>
+          </a:prstGeom>
+          <a:solidFill>
+            <a:schemeClr val="tx1"/>
+          </a:solidFill>
+          <a:ln>
+            <a:noFill/>
+          </a:ln>
+        </p:spPr>
+        <p:style>
+          <a:lnRef idx="2">
+            <a:schemeClr val="accent1">
+              <a:shade val="15000"/>
+            </a:schemeClr>
+          </a:lnRef>
+          <a:fillRef idx="1">
+            <a:schemeClr val="accent1"/>
+          </a:fillRef>
+          <a:effectRef idx="0">
+            <a:schemeClr val="accent1"/>
+          </a:effectRef>
+          <a:fontRef idx="minor">
+            <a:schemeClr val="lt1"/>
+          </a:fontRef>
+        </p:style>
+        <p:txBody>
+          <a:bodyPr rtlCol="0" anchor="ctr"/>
+          <a:lstStyle/>
+          <a:p>
+            <a:pPr algn="ctr"/>
+            <a:endParaRPr lang="en-US"/>
+          </a:p>
+        </p:txBody>
+      </p:sp>
+      <p:sp>
+        <p:nvSpPr>
+          <p:cNvPr id="38" name="Rectangle: Rounded Corners 37">
+            <a:extLst>
+              <a:ext uri="{FF2B5EF4-FFF2-40B4-BE49-F238E27FC236}">
+                <a16:creationId xmlns:a16="http://schemas.microsoft.com/office/drawing/2014/main" id="{E8D2800A-C9FC-E74F-0C87-0C7E92E779C5}"/>
+              </a:ext>
+            </a:extLst>
+          </p:cNvPr>
+          <p:cNvSpPr/>
+          <p:nvPr/>
+        </p:nvSpPr>
+        <p:spPr>
+          <a:xfrm>
+            <a:off x="6434241" y="4370918"/>
+            <a:ext cx="910838" cy="305844"/>
+          </a:xfrm>
+          <a:prstGeom prst="roundRect">
+            <a:avLst/>
+          </a:prstGeom>
+          <a:solidFill>
+            <a:schemeClr val="tx1"/>
+          </a:solidFill>
+          <a:ln>
+            <a:noFill/>
+          </a:ln>
+        </p:spPr>
+        <p:style>
+          <a:lnRef idx="2">
+            <a:schemeClr val="accent1">
+              <a:shade val="15000"/>
+            </a:schemeClr>
+          </a:lnRef>
+          <a:fillRef idx="1">
+            <a:schemeClr val="accent1"/>
+          </a:fillRef>
+          <a:effectRef idx="0">
+            <a:schemeClr val="accent1"/>
+          </a:effectRef>
+          <a:fontRef idx="minor">
+            <a:schemeClr val="lt1"/>
+          </a:fontRef>
+        </p:style>
+        <p:txBody>
+          <a:bodyPr rtlCol="0" anchor="ctr"/>
+          <a:lstStyle/>
+          <a:p>
+            <a:pPr algn="ctr"/>
+            <a:endParaRPr lang="en-US"/>
+          </a:p>
+        </p:txBody>
+      </p:sp>
+      <p:sp>
+        <p:nvSpPr>
+          <p:cNvPr id="39" name="Rectangle: Rounded Corners 38">
+            <a:extLst>
+              <a:ext uri="{FF2B5EF4-FFF2-40B4-BE49-F238E27FC236}">
+                <a16:creationId xmlns:a16="http://schemas.microsoft.com/office/drawing/2014/main" id="{A104C214-817D-36AF-C372-4BA22FC01955}"/>
+              </a:ext>
+            </a:extLst>
+          </p:cNvPr>
+          <p:cNvSpPr/>
+          <p:nvPr/>
+        </p:nvSpPr>
+        <p:spPr>
+          <a:xfrm>
+            <a:off x="5514974" y="4694875"/>
+            <a:ext cx="1226346" cy="305844"/>
+          </a:xfrm>
+          <a:prstGeom prst="roundRect">
+            <a:avLst/>
+          </a:prstGeom>
+          <a:solidFill>
+            <a:schemeClr val="tx1"/>
+          </a:solidFill>
+          <a:ln>
+            <a:noFill/>
+          </a:ln>
+        </p:spPr>
+        <p:style>
+          <a:lnRef idx="2">
+            <a:schemeClr val="accent1">
+              <a:shade val="15000"/>
+            </a:schemeClr>
+          </a:lnRef>
+          <a:fillRef idx="1">
+            <a:schemeClr val="accent1"/>
+          </a:fillRef>
+          <a:effectRef idx="0">
+            <a:schemeClr val="accent1"/>
+          </a:effectRef>
+          <a:fontRef idx="minor">
+            <a:schemeClr val="lt1"/>
+          </a:fontRef>
+        </p:style>
+        <p:txBody>
+          <a:bodyPr rtlCol="0" anchor="ctr"/>
+          <a:lstStyle/>
+          <a:p>
+            <a:pPr algn="ctr"/>
+            <a:endParaRPr lang="en-US"/>
+          </a:p>
+        </p:txBody>
+      </p:sp>
+      <p:sp>
+        <p:nvSpPr>
+          <p:cNvPr id="40" name="Rectangle: Rounded Corners 39">
+            <a:extLst>
+              <a:ext uri="{FF2B5EF4-FFF2-40B4-BE49-F238E27FC236}">
+                <a16:creationId xmlns:a16="http://schemas.microsoft.com/office/drawing/2014/main" id="{CE6664F5-933D-CAD8-DA60-ACEA6ADDD2AE}"/>
+              </a:ext>
+            </a:extLst>
+          </p:cNvPr>
+          <p:cNvSpPr/>
+          <p:nvPr/>
+        </p:nvSpPr>
+        <p:spPr>
+          <a:xfrm>
+            <a:off x="5506632" y="4374356"/>
+            <a:ext cx="318294" cy="625139"/>
+          </a:xfrm>
+          <a:prstGeom prst="roundRect">
+            <a:avLst/>
+          </a:prstGeom>
+          <a:solidFill>
+            <a:schemeClr val="tx1"/>
+          </a:solidFill>
+          <a:ln>
+            <a:noFill/>
+          </a:ln>
+        </p:spPr>
+        <p:style>
+          <a:lnRef idx="2">
+            <a:schemeClr val="accent1">
+              <a:shade val="15000"/>
+            </a:schemeClr>
+          </a:lnRef>
+          <a:fillRef idx="1">
+            <a:schemeClr val="accent1"/>
+          </a:fillRef>
+          <a:effectRef idx="0">
+            <a:schemeClr val="accent1"/>
+          </a:effectRef>
+          <a:fontRef idx="minor">
+            <a:schemeClr val="lt1"/>
+          </a:fontRef>
+        </p:style>
+        <p:txBody>
+          <a:bodyPr rtlCol="0" anchor="ctr"/>
+          <a:lstStyle/>
+          <a:p>
+            <a:pPr algn="ctr"/>
+            <a:endParaRPr lang="en-US"/>
+          </a:p>
+        </p:txBody>
+      </p:sp>
+      <p:sp>
+        <p:nvSpPr>
+          <p:cNvPr id="41" name="Rectangle: Rounded Corners 40">
+            <a:extLst>
+              <a:ext uri="{FF2B5EF4-FFF2-40B4-BE49-F238E27FC236}">
+                <a16:creationId xmlns:a16="http://schemas.microsoft.com/office/drawing/2014/main" id="{7849E99D-A6D4-DB4F-A55F-FEF1B710775D}"/>
+              </a:ext>
+            </a:extLst>
+          </p:cNvPr>
+          <p:cNvSpPr/>
+          <p:nvPr/>
+        </p:nvSpPr>
+        <p:spPr>
+          <a:xfrm>
+            <a:off x="6422231" y="4371975"/>
+            <a:ext cx="318294" cy="627520"/>
+          </a:xfrm>
+          <a:prstGeom prst="roundRect">
+            <a:avLst/>
+          </a:prstGeom>
+          <a:solidFill>
+            <a:schemeClr val="tx1"/>
+          </a:solidFill>
+          <a:ln>
+            <a:noFill/>
+          </a:ln>
+        </p:spPr>
+        <p:style>
+          <a:lnRef idx="2">
+            <a:schemeClr val="accent1">
+              <a:shade val="15000"/>
+            </a:schemeClr>
+          </a:lnRef>
+          <a:fillRef idx="1">
+            <a:schemeClr val="accent1"/>
+          </a:fillRef>
+          <a:effectRef idx="0">
+            <a:schemeClr val="accent1"/>
+          </a:effectRef>
+          <a:fontRef idx="minor">
+            <a:schemeClr val="lt1"/>
+          </a:fontRef>
+        </p:style>
+        <p:txBody>
+          <a:bodyPr rtlCol="0" anchor="ctr"/>
+          <a:lstStyle/>
+          <a:p>
+            <a:pPr algn="ctr"/>
+            <a:endParaRPr lang="en-US"/>
+          </a:p>
+        </p:txBody>
+      </p:sp>
+      <p:sp>
+        <p:nvSpPr>
+          <p:cNvPr id="42" name="Rectangle: Rounded Corners 41">
+            <a:extLst>
+              <a:ext uri="{FF2B5EF4-FFF2-40B4-BE49-F238E27FC236}">
+                <a16:creationId xmlns:a16="http://schemas.microsoft.com/office/drawing/2014/main" id="{7B678C93-3AE0-E075-EFA9-13DBA99BD71D}"/>
+              </a:ext>
+            </a:extLst>
+          </p:cNvPr>
+          <p:cNvSpPr/>
+          <p:nvPr/>
+        </p:nvSpPr>
+        <p:spPr>
+          <a:xfrm>
+            <a:off x="7035127" y="3725032"/>
+            <a:ext cx="318294" cy="951310"/>
+          </a:xfrm>
+          <a:prstGeom prst="roundRect">
+            <a:avLst/>
+          </a:prstGeom>
+          <a:solidFill>
+            <a:schemeClr val="tx1"/>
+          </a:solidFill>
+          <a:ln>
+            <a:noFill/>
+          </a:ln>
+        </p:spPr>
+        <p:style>
+          <a:lnRef idx="2">
+            <a:schemeClr val="accent1">
+              <a:shade val="15000"/>
+            </a:schemeClr>
+          </a:lnRef>
+          <a:fillRef idx="1">
+            <a:schemeClr val="accent1"/>
+          </a:fillRef>
+          <a:effectRef idx="0">
+            <a:schemeClr val="accent1"/>
+          </a:effectRef>
+          <a:fontRef idx="minor">
+            <a:schemeClr val="lt1"/>
+          </a:fontRef>
+        </p:style>
+        <p:txBody>
+          <a:bodyPr rtlCol="0" anchor="ctr"/>
+          <a:lstStyle/>
+          <a:p>
+            <a:pPr algn="ctr"/>
+            <a:endParaRPr lang="en-US"/>
+          </a:p>
+        </p:txBody>
+      </p:sp>
+      <p:sp>
+        <p:nvSpPr>
+          <p:cNvPr id="43" name="Rectangle: Rounded Corners 42">
+            <a:extLst>
+              <a:ext uri="{FF2B5EF4-FFF2-40B4-BE49-F238E27FC236}">
+                <a16:creationId xmlns:a16="http://schemas.microsoft.com/office/drawing/2014/main" id="{B5876592-4E68-79C5-0A7E-64383A601A8A}"/>
+              </a:ext>
+            </a:extLst>
+          </p:cNvPr>
+          <p:cNvSpPr/>
+          <p:nvPr/>
+        </p:nvSpPr>
+        <p:spPr>
+          <a:xfrm>
+            <a:off x="7050411" y="3724719"/>
+            <a:ext cx="622705" cy="337968"/>
+          </a:xfrm>
+          <a:prstGeom prst="roundRect">
+            <a:avLst/>
+          </a:prstGeom>
+          <a:solidFill>
+            <a:schemeClr val="tx1"/>
+          </a:solidFill>
+          <a:ln>
+            <a:noFill/>
+          </a:ln>
+        </p:spPr>
+        <p:style>
+          <a:lnRef idx="2">
+            <a:schemeClr val="accent1">
+              <a:shade val="15000"/>
+            </a:schemeClr>
+          </a:lnRef>
+          <a:fillRef idx="1">
+            <a:schemeClr val="accent1"/>
+          </a:fillRef>
+          <a:effectRef idx="0">
+            <a:schemeClr val="accent1"/>
+          </a:effectRef>
+          <a:fontRef idx="minor">
+            <a:schemeClr val="lt1"/>
+          </a:fontRef>
+        </p:style>
+        <p:txBody>
+          <a:bodyPr rtlCol="0" anchor="ctr"/>
+          <a:lstStyle/>
+          <a:p>
+            <a:pPr algn="ctr"/>
+            <a:endParaRPr lang="en-US"/>
+          </a:p>
+        </p:txBody>
+      </p:sp>
+      <p:sp>
+        <p:nvSpPr>
+          <p:cNvPr id="44" name="Rectangle: Rounded Corners 43">
+            <a:extLst>
+              <a:ext uri="{FF2B5EF4-FFF2-40B4-BE49-F238E27FC236}">
+                <a16:creationId xmlns:a16="http://schemas.microsoft.com/office/drawing/2014/main" id="{F6A297C6-EDF4-2DCE-5802-BD77F6B66402}"/>
+              </a:ext>
+            </a:extLst>
+          </p:cNvPr>
+          <p:cNvSpPr/>
+          <p:nvPr/>
+        </p:nvSpPr>
+        <p:spPr>
+          <a:xfrm>
+            <a:off x="7358076" y="1888235"/>
+            <a:ext cx="307181" cy="2179960"/>
+          </a:xfrm>
+          <a:prstGeom prst="roundRect">
+            <a:avLst/>
+          </a:prstGeom>
+          <a:solidFill>
+            <a:schemeClr val="tx1"/>
+          </a:solidFill>
+          <a:ln>
+            <a:noFill/>
+          </a:ln>
+        </p:spPr>
+        <p:style>
+          <a:lnRef idx="2">
+            <a:schemeClr val="accent1">
+              <a:shade val="15000"/>
+            </a:schemeClr>
+          </a:lnRef>
+          <a:fillRef idx="1">
+            <a:schemeClr val="accent1"/>
+          </a:fillRef>
+          <a:effectRef idx="0">
+            <a:schemeClr val="accent1"/>
+          </a:effectRef>
+          <a:fontRef idx="minor">
+            <a:schemeClr val="lt1"/>
+          </a:fontRef>
+        </p:style>
+        <p:txBody>
+          <a:bodyPr rtlCol="0" anchor="ctr"/>
+          <a:lstStyle/>
+          <a:p>
+            <a:pPr algn="ctr"/>
+            <a:endParaRPr lang="en-US"/>
+          </a:p>
+        </p:txBody>
+      </p:sp>
+    </p:spTree>
+    <p:extLst>
+      <p:ext uri="{BB962C8B-B14F-4D97-AF65-F5344CB8AC3E}">
+        <p14:creationId xmlns:p14="http://schemas.microsoft.com/office/powerpoint/2010/main" val="2835326207"/>
+      </p:ext>
+    </p:extLst>
+  </p:cSld>
+  <p:clrMapOvr>
+    <a:masterClrMapping/>
+  </p:clrMapOvr>
+</p:sld>
+</file>
+
+<file path=ppt/slides/slide8.xml><?xml version="1.0" encoding="utf-8"?>
 <p:sld xmlns:a="http://schemas.openxmlformats.org/drawingml/2006/main" xmlns:r="http://schemas.openxmlformats.org/officeDocument/2006/relationships" xmlns:p="http://schemas.openxmlformats.org/presentationml/2006/main">
   <p:cSld>
     <p:spTree>

</xml_diff>

<commit_message>
Added more telemetry data and UI.
</commit_message>
<xml_diff>
--- a/icons/JUtilsIcons.pptx
+++ b/icons/JUtilsIcons.pptx
@@ -7,12 +7,14 @@
   <p:sldIdLst>
     <p:sldId id="257" r:id="rId2"/>
     <p:sldId id="256" r:id="rId3"/>
-    <p:sldId id="262" r:id="rId4"/>
-    <p:sldId id="258" r:id="rId5"/>
-    <p:sldId id="259" r:id="rId6"/>
-    <p:sldId id="260" r:id="rId7"/>
-    <p:sldId id="263" r:id="rId8"/>
-    <p:sldId id="261" r:id="rId9"/>
+    <p:sldId id="264" r:id="rId4"/>
+    <p:sldId id="262" r:id="rId5"/>
+    <p:sldId id="258" r:id="rId6"/>
+    <p:sldId id="259" r:id="rId7"/>
+    <p:sldId id="260" r:id="rId8"/>
+    <p:sldId id="263" r:id="rId9"/>
+    <p:sldId id="261" r:id="rId10"/>
+    <p:sldId id="265" r:id="rId11"/>
   </p:sldIdLst>
   <p:sldSz cx="12192000" cy="6858000"/>
   <p:notesSz cx="6858000" cy="9144000"/>
@@ -266,7 +268,7 @@
           <a:p>
             <a:fld id="{4B23F753-79FB-41FF-B056-5F6BF77DE748}" type="datetimeFigureOut">
               <a:rPr lang="en-US" smtClean="0"/>
-              <a:t>1/25/2024</a:t>
+              <a:t>7/26/2024</a:t>
             </a:fld>
             <a:endParaRPr lang="en-US"/>
           </a:p>
@@ -577,7 +579,7 @@
           <a:p>
             <a:fld id="{4B23F753-79FB-41FF-B056-5F6BF77DE748}" type="datetimeFigureOut">
               <a:rPr lang="en-US" smtClean="0"/>
-              <a:t>1/25/2024</a:t>
+              <a:t>7/26/2024</a:t>
             </a:fld>
             <a:endParaRPr lang="en-US"/>
           </a:p>
@@ -865,7 +867,7 @@
           <a:p>
             <a:fld id="{4B23F753-79FB-41FF-B056-5F6BF77DE748}" type="datetimeFigureOut">
               <a:rPr lang="en-US" smtClean="0"/>
-              <a:t>1/25/2024</a:t>
+              <a:t>7/26/2024</a:t>
             </a:fld>
             <a:endParaRPr lang="en-US"/>
           </a:p>
@@ -1063,7 +1065,7 @@
           <a:p>
             <a:fld id="{4B23F753-79FB-41FF-B056-5F6BF77DE748}" type="datetimeFigureOut">
               <a:rPr lang="en-US" smtClean="0"/>
-              <a:t>1/25/2024</a:t>
+              <a:t>7/26/2024</a:t>
             </a:fld>
             <a:endParaRPr lang="en-US"/>
           </a:p>
@@ -1271,7 +1273,7 @@
           <a:p>
             <a:fld id="{4B23F753-79FB-41FF-B056-5F6BF77DE748}" type="datetimeFigureOut">
               <a:rPr lang="en-US" smtClean="0"/>
-              <a:t>1/25/2024</a:t>
+              <a:t>7/26/2024</a:t>
             </a:fld>
             <a:endParaRPr lang="en-US"/>
           </a:p>
@@ -1469,7 +1471,7 @@
           <a:p>
             <a:fld id="{4B23F753-79FB-41FF-B056-5F6BF77DE748}" type="datetimeFigureOut">
               <a:rPr lang="en-US" smtClean="0"/>
-              <a:t>1/25/2024</a:t>
+              <a:t>7/26/2024</a:t>
             </a:fld>
             <a:endParaRPr lang="en-US"/>
           </a:p>
@@ -1744,7 +1746,7 @@
           <a:p>
             <a:fld id="{4B23F753-79FB-41FF-B056-5F6BF77DE748}" type="datetimeFigureOut">
               <a:rPr lang="en-US" smtClean="0"/>
-              <a:t>1/25/2024</a:t>
+              <a:t>7/26/2024</a:t>
             </a:fld>
             <a:endParaRPr lang="en-US"/>
           </a:p>
@@ -2009,7 +2011,7 @@
           <a:p>
             <a:fld id="{4B23F753-79FB-41FF-B056-5F6BF77DE748}" type="datetimeFigureOut">
               <a:rPr lang="en-US" smtClean="0"/>
-              <a:t>1/25/2024</a:t>
+              <a:t>7/26/2024</a:t>
             </a:fld>
             <a:endParaRPr lang="en-US"/>
           </a:p>
@@ -2421,7 +2423,7 @@
           <a:p>
             <a:fld id="{4B23F753-79FB-41FF-B056-5F6BF77DE748}" type="datetimeFigureOut">
               <a:rPr lang="en-US" smtClean="0"/>
-              <a:t>1/25/2024</a:t>
+              <a:t>7/26/2024</a:t>
             </a:fld>
             <a:endParaRPr lang="en-US"/>
           </a:p>
@@ -2562,7 +2564,7 @@
           <a:p>
             <a:fld id="{4B23F753-79FB-41FF-B056-5F6BF77DE748}" type="datetimeFigureOut">
               <a:rPr lang="en-US" smtClean="0"/>
-              <a:t>1/25/2024</a:t>
+              <a:t>7/26/2024</a:t>
             </a:fld>
             <a:endParaRPr lang="en-US"/>
           </a:p>
@@ -2675,7 +2677,7 @@
           <a:p>
             <a:fld id="{4B23F753-79FB-41FF-B056-5F6BF77DE748}" type="datetimeFigureOut">
               <a:rPr lang="en-US" smtClean="0"/>
-              <a:t>1/25/2024</a:t>
+              <a:t>7/26/2024</a:t>
             </a:fld>
             <a:endParaRPr lang="en-US"/>
           </a:p>
@@ -2788,7 +2790,7 @@
           <a:p>
             <a:fld id="{4B23F753-79FB-41FF-B056-5F6BF77DE748}" type="datetimeFigureOut">
               <a:rPr lang="en-US" smtClean="0"/>
-              <a:t>1/25/2024</a:t>
+              <a:t>7/26/2024</a:t>
             </a:fld>
             <a:endParaRPr lang="en-US"/>
           </a:p>
@@ -2967,7 +2969,7 @@
           <a:p>
             <a:fld id="{4B23F753-79FB-41FF-B056-5F6BF77DE748}" type="datetimeFigureOut">
               <a:rPr lang="en-US" smtClean="0"/>
-              <a:t>1/25/2024</a:t>
+              <a:t>7/26/2024</a:t>
             </a:fld>
             <a:endParaRPr lang="en-US"/>
           </a:p>
@@ -4600,7 +4602,7 @@
           <a:p>
             <a:fld id="{4B23F753-79FB-41FF-B056-5F6BF77DE748}" type="datetimeFigureOut">
               <a:rPr lang="en-US" smtClean="0"/>
-              <a:t>1/25/2024</a:t>
+              <a:t>7/26/2024</a:t>
             </a:fld>
             <a:endParaRPr lang="en-US"/>
           </a:p>
@@ -5225,6 +5227,827 @@
 </p:sld>
 </file>
 
+<file path=ppt/slides/slide10.xml><?xml version="1.0" encoding="utf-8"?>
+<p:sld xmlns:a="http://schemas.openxmlformats.org/drawingml/2006/main" xmlns:r="http://schemas.openxmlformats.org/officeDocument/2006/relationships" xmlns:p="http://schemas.openxmlformats.org/presentationml/2006/main">
+  <p:cSld>
+    <p:spTree>
+      <p:nvGrpSpPr>
+        <p:cNvPr id="1" name=""/>
+        <p:cNvGrpSpPr/>
+        <p:nvPr/>
+      </p:nvGrpSpPr>
+      <p:grpSpPr>
+        <a:xfrm>
+          <a:off x="0" y="0"/>
+          <a:ext cx="0" cy="0"/>
+          <a:chOff x="0" y="0"/>
+          <a:chExt cx="0" cy="0"/>
+        </a:xfrm>
+      </p:grpSpPr>
+      <p:sp>
+        <p:nvSpPr>
+          <p:cNvPr id="5" name="Title 5">
+            <a:extLst>
+              <a:ext uri="{FF2B5EF4-FFF2-40B4-BE49-F238E27FC236}">
+                <a16:creationId xmlns:a16="http://schemas.microsoft.com/office/drawing/2014/main" id="{3A3B9CBE-C5F1-552D-444D-A87ABCB8E24C}"/>
+              </a:ext>
+            </a:extLst>
+          </p:cNvPr>
+          <p:cNvSpPr txBox="1">
+            <a:spLocks/>
+          </p:cNvSpPr>
+          <p:nvPr/>
+        </p:nvSpPr>
+        <p:spPr>
+          <a:xfrm>
+            <a:off x="101600" y="136526"/>
+            <a:ext cx="11988802" cy="639330"/>
+          </a:xfrm>
+          <a:prstGeom prst="rect">
+            <a:avLst/>
+          </a:prstGeom>
+        </p:spPr>
+        <p:txBody>
+          <a:bodyPr>
+            <a:normAutofit fontScale="90000" lnSpcReduction="10000"/>
+          </a:bodyPr>
+          <a:lstStyle>
+            <a:lvl1pPr algn="l" defTabSz="914400" rtl="0" eaLnBrk="1" latinLnBrk="0" hangingPunct="1">
+              <a:lnSpc>
+                <a:spcPct val="90000"/>
+              </a:lnSpc>
+              <a:spcBef>
+                <a:spcPct val="0"/>
+              </a:spcBef>
+              <a:buNone/>
+              <a:defRPr sz="4400" kern="1200">
+                <a:solidFill>
+                  <a:schemeClr val="tx1"/>
+                </a:solidFill>
+                <a:latin typeface="+mj-lt"/>
+                <a:ea typeface="+mj-ea"/>
+                <a:cs typeface="+mj-cs"/>
+              </a:defRPr>
+            </a:lvl1pPr>
+          </a:lstStyle>
+          <a:p>
+            <a:r>
+              <a:rPr lang="en-US" dirty="0"/>
+              <a:t>Clock</a:t>
+            </a:r>
+          </a:p>
+        </p:txBody>
+      </p:sp>
+      <p:sp>
+        <p:nvSpPr>
+          <p:cNvPr id="16" name="Oval 15">
+            <a:extLst>
+              <a:ext uri="{FF2B5EF4-FFF2-40B4-BE49-F238E27FC236}">
+                <a16:creationId xmlns:a16="http://schemas.microsoft.com/office/drawing/2014/main" id="{71D82658-BC65-9C4A-DA44-8D923618BDCB}"/>
+              </a:ext>
+            </a:extLst>
+          </p:cNvPr>
+          <p:cNvSpPr/>
+          <p:nvPr/>
+        </p:nvSpPr>
+        <p:spPr>
+          <a:xfrm>
+            <a:off x="3968961" y="1311731"/>
+            <a:ext cx="4256955" cy="4261104"/>
+          </a:xfrm>
+          <a:prstGeom prst="ellipse">
+            <a:avLst/>
+          </a:prstGeom>
+          <a:gradFill flip="none" rotWithShape="1">
+            <a:gsLst>
+              <a:gs pos="0">
+                <a:schemeClr val="bg1">
+                  <a:lumMod val="85000"/>
+                </a:schemeClr>
+              </a:gs>
+              <a:gs pos="100000">
+                <a:schemeClr val="bg1">
+                  <a:lumMod val="95000"/>
+                </a:schemeClr>
+              </a:gs>
+            </a:gsLst>
+            <a:lin ang="16200000" scaled="1"/>
+            <a:tileRect/>
+          </a:gradFill>
+          <a:ln w="114300">
+            <a:solidFill>
+              <a:schemeClr val="tx1"/>
+            </a:solidFill>
+          </a:ln>
+          <a:effectLst>
+            <a:outerShdw blurRad="50800" dist="38100" dir="5400000" algn="t" rotWithShape="0">
+              <a:prstClr val="black">
+                <a:alpha val="40000"/>
+              </a:prstClr>
+            </a:outerShdw>
+          </a:effectLst>
+          <a:scene3d>
+            <a:camera prst="orthographicFront"/>
+            <a:lightRig rig="threePt" dir="t"/>
+          </a:scene3d>
+          <a:sp3d>
+            <a:bevelT/>
+          </a:sp3d>
+        </p:spPr>
+        <p:style>
+          <a:lnRef idx="2">
+            <a:schemeClr val="accent1">
+              <a:shade val="50000"/>
+            </a:schemeClr>
+          </a:lnRef>
+          <a:fillRef idx="1">
+            <a:schemeClr val="accent1"/>
+          </a:fillRef>
+          <a:effectRef idx="0">
+            <a:schemeClr val="accent1"/>
+          </a:effectRef>
+          <a:fontRef idx="minor">
+            <a:schemeClr val="lt1"/>
+          </a:fontRef>
+        </p:style>
+        <p:txBody>
+          <a:bodyPr rtlCol="0" anchor="ctr"/>
+          <a:lstStyle/>
+          <a:p>
+            <a:pPr algn="ctr"/>
+            <a:endParaRPr lang="en-US" dirty="0"/>
+          </a:p>
+        </p:txBody>
+      </p:sp>
+      <p:cxnSp>
+        <p:nvCxnSpPr>
+          <p:cNvPr id="21" name="Straight Connector 20">
+            <a:extLst>
+              <a:ext uri="{FF2B5EF4-FFF2-40B4-BE49-F238E27FC236}">
+                <a16:creationId xmlns:a16="http://schemas.microsoft.com/office/drawing/2014/main" id="{4E211373-211A-6555-328E-6D27FD15B506}"/>
+              </a:ext>
+            </a:extLst>
+          </p:cNvPr>
+          <p:cNvCxnSpPr>
+            <a:cxnSpLocks/>
+          </p:cNvCxnSpPr>
+          <p:nvPr/>
+        </p:nvCxnSpPr>
+        <p:spPr>
+          <a:xfrm rot="1800000" flipV="1">
+            <a:off x="7067103" y="1583688"/>
+            <a:ext cx="0" cy="502920"/>
+          </a:xfrm>
+          <a:prstGeom prst="line">
+            <a:avLst/>
+          </a:prstGeom>
+          <a:ln w="101600">
+            <a:solidFill>
+              <a:schemeClr val="tx1"/>
+            </a:solidFill>
+          </a:ln>
+        </p:spPr>
+        <p:style>
+          <a:lnRef idx="1">
+            <a:schemeClr val="accent1"/>
+          </a:lnRef>
+          <a:fillRef idx="0">
+            <a:schemeClr val="accent1"/>
+          </a:fillRef>
+          <a:effectRef idx="0">
+            <a:schemeClr val="accent1"/>
+          </a:effectRef>
+          <a:fontRef idx="minor">
+            <a:schemeClr val="tx1"/>
+          </a:fontRef>
+        </p:style>
+      </p:cxnSp>
+      <p:cxnSp>
+        <p:nvCxnSpPr>
+          <p:cNvPr id="24" name="Straight Connector 23">
+            <a:extLst>
+              <a:ext uri="{FF2B5EF4-FFF2-40B4-BE49-F238E27FC236}">
+                <a16:creationId xmlns:a16="http://schemas.microsoft.com/office/drawing/2014/main" id="{0BAD01AC-BED8-4510-DE0A-DED1EEF4EE7A}"/>
+              </a:ext>
+            </a:extLst>
+          </p:cNvPr>
+          <p:cNvCxnSpPr>
+            <a:cxnSpLocks/>
+          </p:cNvCxnSpPr>
+          <p:nvPr/>
+        </p:nvCxnSpPr>
+        <p:spPr>
+          <a:xfrm flipV="1">
+            <a:off x="6124124" y="1312249"/>
+            <a:ext cx="0" cy="502920"/>
+          </a:xfrm>
+          <a:prstGeom prst="line">
+            <a:avLst/>
+          </a:prstGeom>
+          <a:ln w="101600">
+            <a:solidFill>
+              <a:schemeClr val="tx1"/>
+            </a:solidFill>
+          </a:ln>
+        </p:spPr>
+        <p:style>
+          <a:lnRef idx="1">
+            <a:schemeClr val="accent1"/>
+          </a:lnRef>
+          <a:fillRef idx="0">
+            <a:schemeClr val="accent1"/>
+          </a:fillRef>
+          <a:effectRef idx="0">
+            <a:schemeClr val="accent1"/>
+          </a:effectRef>
+          <a:fontRef idx="minor">
+            <a:schemeClr val="tx1"/>
+          </a:fontRef>
+        </p:style>
+      </p:cxnSp>
+      <p:cxnSp>
+        <p:nvCxnSpPr>
+          <p:cNvPr id="25" name="Straight Connector 24">
+            <a:extLst>
+              <a:ext uri="{FF2B5EF4-FFF2-40B4-BE49-F238E27FC236}">
+                <a16:creationId xmlns:a16="http://schemas.microsoft.com/office/drawing/2014/main" id="{A2AD1340-43ED-87BE-A46E-227B1492E0F0}"/>
+              </a:ext>
+            </a:extLst>
+          </p:cNvPr>
+          <p:cNvCxnSpPr>
+            <a:cxnSpLocks/>
+          </p:cNvCxnSpPr>
+          <p:nvPr/>
+        </p:nvCxnSpPr>
+        <p:spPr>
+          <a:xfrm flipV="1">
+            <a:off x="6092493" y="5044525"/>
+            <a:ext cx="0" cy="502920"/>
+          </a:xfrm>
+          <a:prstGeom prst="line">
+            <a:avLst/>
+          </a:prstGeom>
+          <a:ln w="101600">
+            <a:solidFill>
+              <a:schemeClr val="tx1"/>
+            </a:solidFill>
+          </a:ln>
+        </p:spPr>
+        <p:style>
+          <a:lnRef idx="1">
+            <a:schemeClr val="accent1"/>
+          </a:lnRef>
+          <a:fillRef idx="0">
+            <a:schemeClr val="accent1"/>
+          </a:fillRef>
+          <a:effectRef idx="0">
+            <a:schemeClr val="accent1"/>
+          </a:effectRef>
+          <a:fontRef idx="minor">
+            <a:schemeClr val="tx1"/>
+          </a:fontRef>
+        </p:style>
+      </p:cxnSp>
+      <p:cxnSp>
+        <p:nvCxnSpPr>
+          <p:cNvPr id="26" name="Straight Connector 25">
+            <a:extLst>
+              <a:ext uri="{FF2B5EF4-FFF2-40B4-BE49-F238E27FC236}">
+                <a16:creationId xmlns:a16="http://schemas.microsoft.com/office/drawing/2014/main" id="{8B1D784B-DD01-0413-163F-83A55E831E46}"/>
+              </a:ext>
+            </a:extLst>
+          </p:cNvPr>
+          <p:cNvCxnSpPr>
+            <a:cxnSpLocks/>
+          </p:cNvCxnSpPr>
+          <p:nvPr/>
+        </p:nvCxnSpPr>
+        <p:spPr>
+          <a:xfrm rot="5400000" flipV="1">
+            <a:off x="7956286" y="3173053"/>
+            <a:ext cx="0" cy="502920"/>
+          </a:xfrm>
+          <a:prstGeom prst="line">
+            <a:avLst/>
+          </a:prstGeom>
+          <a:ln w="101600">
+            <a:solidFill>
+              <a:schemeClr val="tx1"/>
+            </a:solidFill>
+          </a:ln>
+        </p:spPr>
+        <p:style>
+          <a:lnRef idx="1">
+            <a:schemeClr val="accent1"/>
+          </a:lnRef>
+          <a:fillRef idx="0">
+            <a:schemeClr val="accent1"/>
+          </a:fillRef>
+          <a:effectRef idx="0">
+            <a:schemeClr val="accent1"/>
+          </a:effectRef>
+          <a:fontRef idx="minor">
+            <a:schemeClr val="tx1"/>
+          </a:fontRef>
+        </p:style>
+      </p:cxnSp>
+      <p:cxnSp>
+        <p:nvCxnSpPr>
+          <p:cNvPr id="27" name="Straight Connector 26">
+            <a:extLst>
+              <a:ext uri="{FF2B5EF4-FFF2-40B4-BE49-F238E27FC236}">
+                <a16:creationId xmlns:a16="http://schemas.microsoft.com/office/drawing/2014/main" id="{79192513-398C-4DD6-2DED-AD9A11608776}"/>
+              </a:ext>
+            </a:extLst>
+          </p:cNvPr>
+          <p:cNvCxnSpPr>
+            <a:cxnSpLocks/>
+          </p:cNvCxnSpPr>
+          <p:nvPr/>
+        </p:nvCxnSpPr>
+        <p:spPr>
+          <a:xfrm rot="5400000" flipV="1">
+            <a:off x="4235713" y="3207385"/>
+            <a:ext cx="0" cy="502920"/>
+          </a:xfrm>
+          <a:prstGeom prst="line">
+            <a:avLst/>
+          </a:prstGeom>
+          <a:ln w="101600">
+            <a:solidFill>
+              <a:schemeClr val="tx1"/>
+            </a:solidFill>
+          </a:ln>
+        </p:spPr>
+        <p:style>
+          <a:lnRef idx="1">
+            <a:schemeClr val="accent1"/>
+          </a:lnRef>
+          <a:fillRef idx="0">
+            <a:schemeClr val="accent1"/>
+          </a:fillRef>
+          <a:effectRef idx="0">
+            <a:schemeClr val="accent1"/>
+          </a:effectRef>
+          <a:fontRef idx="minor">
+            <a:schemeClr val="tx1"/>
+          </a:fontRef>
+        </p:style>
+      </p:cxnSp>
+      <p:cxnSp>
+        <p:nvCxnSpPr>
+          <p:cNvPr id="28" name="Straight Connector 27">
+            <a:extLst>
+              <a:ext uri="{FF2B5EF4-FFF2-40B4-BE49-F238E27FC236}">
+                <a16:creationId xmlns:a16="http://schemas.microsoft.com/office/drawing/2014/main" id="{E7D105C5-C64C-59D2-5905-9CBE9A96C478}"/>
+              </a:ext>
+            </a:extLst>
+          </p:cNvPr>
+          <p:cNvCxnSpPr>
+            <a:cxnSpLocks/>
+          </p:cNvCxnSpPr>
+          <p:nvPr/>
+        </p:nvCxnSpPr>
+        <p:spPr>
+          <a:xfrm rot="1800000" flipV="1">
+            <a:off x="5194401" y="4800167"/>
+            <a:ext cx="0" cy="502920"/>
+          </a:xfrm>
+          <a:prstGeom prst="line">
+            <a:avLst/>
+          </a:prstGeom>
+          <a:ln w="101600">
+            <a:solidFill>
+              <a:schemeClr val="tx1"/>
+            </a:solidFill>
+          </a:ln>
+        </p:spPr>
+        <p:style>
+          <a:lnRef idx="1">
+            <a:schemeClr val="accent1"/>
+          </a:lnRef>
+          <a:fillRef idx="0">
+            <a:schemeClr val="accent1"/>
+          </a:fillRef>
+          <a:effectRef idx="0">
+            <a:schemeClr val="accent1"/>
+          </a:effectRef>
+          <a:fontRef idx="minor">
+            <a:schemeClr val="tx1"/>
+          </a:fontRef>
+        </p:style>
+      </p:cxnSp>
+      <p:cxnSp>
+        <p:nvCxnSpPr>
+          <p:cNvPr id="52" name="Straight Connector 51">
+            <a:extLst>
+              <a:ext uri="{FF2B5EF4-FFF2-40B4-BE49-F238E27FC236}">
+                <a16:creationId xmlns:a16="http://schemas.microsoft.com/office/drawing/2014/main" id="{89A94283-5FDC-5348-728C-045477BFE556}"/>
+              </a:ext>
+            </a:extLst>
+          </p:cNvPr>
+          <p:cNvCxnSpPr>
+            <a:cxnSpLocks/>
+          </p:cNvCxnSpPr>
+          <p:nvPr/>
+        </p:nvCxnSpPr>
+        <p:spPr>
+          <a:xfrm rot="3600000" flipV="1">
+            <a:off x="4487173" y="4088173"/>
+            <a:ext cx="0" cy="502920"/>
+          </a:xfrm>
+          <a:prstGeom prst="line">
+            <a:avLst/>
+          </a:prstGeom>
+          <a:ln w="101600">
+            <a:solidFill>
+              <a:schemeClr val="tx1"/>
+            </a:solidFill>
+          </a:ln>
+        </p:spPr>
+        <p:style>
+          <a:lnRef idx="1">
+            <a:schemeClr val="accent1"/>
+          </a:lnRef>
+          <a:fillRef idx="0">
+            <a:schemeClr val="accent1"/>
+          </a:fillRef>
+          <a:effectRef idx="0">
+            <a:schemeClr val="accent1"/>
+          </a:effectRef>
+          <a:fontRef idx="minor">
+            <a:schemeClr val="tx1"/>
+          </a:fontRef>
+        </p:style>
+      </p:cxnSp>
+      <p:cxnSp>
+        <p:nvCxnSpPr>
+          <p:cNvPr id="53" name="Straight Connector 52">
+            <a:extLst>
+              <a:ext uri="{FF2B5EF4-FFF2-40B4-BE49-F238E27FC236}">
+                <a16:creationId xmlns:a16="http://schemas.microsoft.com/office/drawing/2014/main" id="{00E2CCAA-A099-A5D7-90F6-7DAD7E6E3E6E}"/>
+              </a:ext>
+            </a:extLst>
+          </p:cNvPr>
+          <p:cNvCxnSpPr>
+            <a:cxnSpLocks/>
+          </p:cNvCxnSpPr>
+          <p:nvPr/>
+        </p:nvCxnSpPr>
+        <p:spPr>
+          <a:xfrm rot="7200000" flipV="1">
+            <a:off x="7712451" y="4107573"/>
+            <a:ext cx="0" cy="502920"/>
+          </a:xfrm>
+          <a:prstGeom prst="line">
+            <a:avLst/>
+          </a:prstGeom>
+          <a:ln w="101600">
+            <a:solidFill>
+              <a:schemeClr val="tx1"/>
+            </a:solidFill>
+          </a:ln>
+        </p:spPr>
+        <p:style>
+          <a:lnRef idx="1">
+            <a:schemeClr val="accent1"/>
+          </a:lnRef>
+          <a:fillRef idx="0">
+            <a:schemeClr val="accent1"/>
+          </a:fillRef>
+          <a:effectRef idx="0">
+            <a:schemeClr val="accent1"/>
+          </a:effectRef>
+          <a:fontRef idx="minor">
+            <a:schemeClr val="tx1"/>
+          </a:fontRef>
+        </p:style>
+      </p:cxnSp>
+      <p:cxnSp>
+        <p:nvCxnSpPr>
+          <p:cNvPr id="61" name="Straight Connector 60">
+            <a:extLst>
+              <a:ext uri="{FF2B5EF4-FFF2-40B4-BE49-F238E27FC236}">
+                <a16:creationId xmlns:a16="http://schemas.microsoft.com/office/drawing/2014/main" id="{1272F5F6-4F4F-4667-040E-6FB02A002768}"/>
+              </a:ext>
+            </a:extLst>
+          </p:cNvPr>
+          <p:cNvCxnSpPr>
+            <a:cxnSpLocks/>
+          </p:cNvCxnSpPr>
+          <p:nvPr/>
+        </p:nvCxnSpPr>
+        <p:spPr>
+          <a:xfrm rot="7200000" flipV="1">
+            <a:off x="4471642" y="2270077"/>
+            <a:ext cx="0" cy="502920"/>
+          </a:xfrm>
+          <a:prstGeom prst="line">
+            <a:avLst/>
+          </a:prstGeom>
+          <a:ln w="101600">
+            <a:solidFill>
+              <a:schemeClr val="tx1"/>
+            </a:solidFill>
+          </a:ln>
+        </p:spPr>
+        <p:style>
+          <a:lnRef idx="1">
+            <a:schemeClr val="accent1"/>
+          </a:lnRef>
+          <a:fillRef idx="0">
+            <a:schemeClr val="accent1"/>
+          </a:fillRef>
+          <a:effectRef idx="0">
+            <a:schemeClr val="accent1"/>
+          </a:effectRef>
+          <a:fontRef idx="minor">
+            <a:schemeClr val="tx1"/>
+          </a:fontRef>
+        </p:style>
+      </p:cxnSp>
+      <p:cxnSp>
+        <p:nvCxnSpPr>
+          <p:cNvPr id="62" name="Straight Connector 61">
+            <a:extLst>
+              <a:ext uri="{FF2B5EF4-FFF2-40B4-BE49-F238E27FC236}">
+                <a16:creationId xmlns:a16="http://schemas.microsoft.com/office/drawing/2014/main" id="{24938F39-092A-216F-8882-4677DADE66D5}"/>
+              </a:ext>
+            </a:extLst>
+          </p:cNvPr>
+          <p:cNvCxnSpPr>
+            <a:cxnSpLocks/>
+          </p:cNvCxnSpPr>
+          <p:nvPr/>
+        </p:nvCxnSpPr>
+        <p:spPr>
+          <a:xfrm rot="9000000" flipV="1">
+            <a:off x="5183660" y="1583688"/>
+            <a:ext cx="0" cy="502920"/>
+          </a:xfrm>
+          <a:prstGeom prst="line">
+            <a:avLst/>
+          </a:prstGeom>
+          <a:ln w="101600">
+            <a:solidFill>
+              <a:schemeClr val="tx1"/>
+            </a:solidFill>
+          </a:ln>
+        </p:spPr>
+        <p:style>
+          <a:lnRef idx="1">
+            <a:schemeClr val="accent1"/>
+          </a:lnRef>
+          <a:fillRef idx="0">
+            <a:schemeClr val="accent1"/>
+          </a:fillRef>
+          <a:effectRef idx="0">
+            <a:schemeClr val="accent1"/>
+          </a:effectRef>
+          <a:fontRef idx="minor">
+            <a:schemeClr val="tx1"/>
+          </a:fontRef>
+        </p:style>
+      </p:cxnSp>
+      <p:cxnSp>
+        <p:nvCxnSpPr>
+          <p:cNvPr id="63" name="Straight Connector 62">
+            <a:extLst>
+              <a:ext uri="{FF2B5EF4-FFF2-40B4-BE49-F238E27FC236}">
+                <a16:creationId xmlns:a16="http://schemas.microsoft.com/office/drawing/2014/main" id="{6D4A9C80-9CC3-DD47-26D9-657A63B12DDF}"/>
+              </a:ext>
+            </a:extLst>
+          </p:cNvPr>
+          <p:cNvCxnSpPr>
+            <a:cxnSpLocks/>
+          </p:cNvCxnSpPr>
+          <p:nvPr/>
+        </p:nvCxnSpPr>
+        <p:spPr>
+          <a:xfrm rot="9000000" flipV="1">
+            <a:off x="7049752" y="4784926"/>
+            <a:ext cx="0" cy="502920"/>
+          </a:xfrm>
+          <a:prstGeom prst="line">
+            <a:avLst/>
+          </a:prstGeom>
+          <a:ln w="101600">
+            <a:solidFill>
+              <a:schemeClr val="tx1"/>
+            </a:solidFill>
+          </a:ln>
+        </p:spPr>
+        <p:style>
+          <a:lnRef idx="1">
+            <a:schemeClr val="accent1"/>
+          </a:lnRef>
+          <a:fillRef idx="0">
+            <a:schemeClr val="accent1"/>
+          </a:fillRef>
+          <a:effectRef idx="0">
+            <a:schemeClr val="accent1"/>
+          </a:effectRef>
+          <a:fontRef idx="minor">
+            <a:schemeClr val="tx1"/>
+          </a:fontRef>
+        </p:style>
+      </p:cxnSp>
+      <p:cxnSp>
+        <p:nvCxnSpPr>
+          <p:cNvPr id="64" name="Straight Connector 63">
+            <a:extLst>
+              <a:ext uri="{FF2B5EF4-FFF2-40B4-BE49-F238E27FC236}">
+                <a16:creationId xmlns:a16="http://schemas.microsoft.com/office/drawing/2014/main" id="{66C4D386-D6EF-EDEE-45BB-8BF3273EB12B}"/>
+              </a:ext>
+            </a:extLst>
+          </p:cNvPr>
+          <p:cNvCxnSpPr>
+            <a:cxnSpLocks/>
+          </p:cNvCxnSpPr>
+          <p:nvPr/>
+        </p:nvCxnSpPr>
+        <p:spPr>
+          <a:xfrm rot="3600000" flipV="1">
+            <a:off x="7698094" y="2269786"/>
+            <a:ext cx="0" cy="502920"/>
+          </a:xfrm>
+          <a:prstGeom prst="line">
+            <a:avLst/>
+          </a:prstGeom>
+          <a:ln w="101600">
+            <a:solidFill>
+              <a:schemeClr val="tx1"/>
+            </a:solidFill>
+          </a:ln>
+        </p:spPr>
+        <p:style>
+          <a:lnRef idx="1">
+            <a:schemeClr val="accent1"/>
+          </a:lnRef>
+          <a:fillRef idx="0">
+            <a:schemeClr val="accent1"/>
+          </a:fillRef>
+          <a:effectRef idx="0">
+            <a:schemeClr val="accent1"/>
+          </a:effectRef>
+          <a:fontRef idx="minor">
+            <a:schemeClr val="tx1"/>
+          </a:fontRef>
+        </p:style>
+      </p:cxnSp>
+      <p:cxnSp>
+        <p:nvCxnSpPr>
+          <p:cNvPr id="66" name="Straight Connector 65">
+            <a:extLst>
+              <a:ext uri="{FF2B5EF4-FFF2-40B4-BE49-F238E27FC236}">
+                <a16:creationId xmlns:a16="http://schemas.microsoft.com/office/drawing/2014/main" id="{4B45D286-5854-5888-503B-A4093E51D7B2}"/>
+              </a:ext>
+            </a:extLst>
+          </p:cNvPr>
+          <p:cNvCxnSpPr>
+            <a:cxnSpLocks/>
+          </p:cNvCxnSpPr>
+          <p:nvPr/>
+        </p:nvCxnSpPr>
+        <p:spPr>
+          <a:xfrm flipV="1">
+            <a:off x="6124124" y="2331720"/>
+            <a:ext cx="261436" cy="1118183"/>
+          </a:xfrm>
+          <a:prstGeom prst="line">
+            <a:avLst/>
+          </a:prstGeom>
+          <a:ln w="101600">
+            <a:solidFill>
+              <a:schemeClr val="tx2"/>
+            </a:solidFill>
+          </a:ln>
+        </p:spPr>
+        <p:style>
+          <a:lnRef idx="1">
+            <a:schemeClr val="accent1"/>
+          </a:lnRef>
+          <a:fillRef idx="0">
+            <a:schemeClr val="accent1"/>
+          </a:fillRef>
+          <a:effectRef idx="0">
+            <a:schemeClr val="accent1"/>
+          </a:effectRef>
+          <a:fontRef idx="minor">
+            <a:schemeClr val="tx1"/>
+          </a:fontRef>
+        </p:style>
+      </p:cxnSp>
+      <p:cxnSp>
+        <p:nvCxnSpPr>
+          <p:cNvPr id="67" name="Straight Connector 66">
+            <a:extLst>
+              <a:ext uri="{FF2B5EF4-FFF2-40B4-BE49-F238E27FC236}">
+                <a16:creationId xmlns:a16="http://schemas.microsoft.com/office/drawing/2014/main" id="{E6D5D1CE-0EB6-0AFF-9470-38F8C438C048}"/>
+              </a:ext>
+            </a:extLst>
+          </p:cNvPr>
+          <p:cNvCxnSpPr>
+            <a:cxnSpLocks/>
+          </p:cNvCxnSpPr>
+          <p:nvPr/>
+        </p:nvCxnSpPr>
+        <p:spPr>
+          <a:xfrm>
+            <a:off x="6124124" y="3447373"/>
+            <a:ext cx="332425" cy="1409343"/>
+          </a:xfrm>
+          <a:prstGeom prst="line">
+            <a:avLst/>
+          </a:prstGeom>
+          <a:ln w="101600">
+            <a:solidFill>
+              <a:schemeClr val="tx2"/>
+            </a:solidFill>
+          </a:ln>
+        </p:spPr>
+        <p:style>
+          <a:lnRef idx="1">
+            <a:schemeClr val="accent1"/>
+          </a:lnRef>
+          <a:fillRef idx="0">
+            <a:schemeClr val="accent1"/>
+          </a:fillRef>
+          <a:effectRef idx="0">
+            <a:schemeClr val="accent1"/>
+          </a:effectRef>
+          <a:fontRef idx="minor">
+            <a:schemeClr val="tx1"/>
+          </a:fontRef>
+        </p:style>
+      </p:cxnSp>
+      <p:sp>
+        <p:nvSpPr>
+          <p:cNvPr id="71" name="Oval 70">
+            <a:extLst>
+              <a:ext uri="{FF2B5EF4-FFF2-40B4-BE49-F238E27FC236}">
+                <a16:creationId xmlns:a16="http://schemas.microsoft.com/office/drawing/2014/main" id="{95511EF3-6CD7-6C74-02E4-676A4AD16690}"/>
+              </a:ext>
+            </a:extLst>
+          </p:cNvPr>
+          <p:cNvSpPr/>
+          <p:nvPr/>
+        </p:nvSpPr>
+        <p:spPr>
+          <a:xfrm>
+            <a:off x="6102017" y="3424513"/>
+            <a:ext cx="45719" cy="45719"/>
+          </a:xfrm>
+          <a:prstGeom prst="ellipse">
+            <a:avLst/>
+          </a:prstGeom>
+          <a:solidFill>
+            <a:schemeClr val="tx2"/>
+          </a:solidFill>
+          <a:ln>
+            <a:solidFill>
+              <a:schemeClr val="tx2"/>
+            </a:solidFill>
+          </a:ln>
+        </p:spPr>
+        <p:style>
+          <a:lnRef idx="2">
+            <a:schemeClr val="accent1">
+              <a:shade val="15000"/>
+            </a:schemeClr>
+          </a:lnRef>
+          <a:fillRef idx="1">
+            <a:schemeClr val="accent1"/>
+          </a:fillRef>
+          <a:effectRef idx="0">
+            <a:schemeClr val="accent1"/>
+          </a:effectRef>
+          <a:fontRef idx="minor">
+            <a:schemeClr val="lt1"/>
+          </a:fontRef>
+        </p:style>
+        <p:txBody>
+          <a:bodyPr rtlCol="0" anchor="ctr"/>
+          <a:lstStyle/>
+          <a:p>
+            <a:pPr algn="ctr"/>
+            <a:endParaRPr lang="en-US"/>
+          </a:p>
+        </p:txBody>
+      </p:sp>
+    </p:spTree>
+    <p:extLst>
+      <p:ext uri="{BB962C8B-B14F-4D97-AF65-F5344CB8AC3E}">
+        <p14:creationId xmlns:p14="http://schemas.microsoft.com/office/powerpoint/2010/main" val="3890605768"/>
+      </p:ext>
+    </p:extLst>
+  </p:cSld>
+  <p:clrMapOvr>
+    <a:masterClrMapping/>
+  </p:clrMapOvr>
+</p:sld>
+</file>
+
 <file path=ppt/slides/slide2.xml><?xml version="1.0" encoding="utf-8"?>
 <p:sld xmlns:a="http://schemas.openxmlformats.org/drawingml/2006/main" xmlns:r="http://schemas.openxmlformats.org/officeDocument/2006/relationships" xmlns:p="http://schemas.openxmlformats.org/presentationml/2006/main">
   <p:cSld>
@@ -5445,6 +6268,234 @@
 </file>
 
 <file path=ppt/slides/slide3.xml><?xml version="1.0" encoding="utf-8"?>
+<p:sld xmlns:a="http://schemas.openxmlformats.org/drawingml/2006/main" xmlns:r="http://schemas.openxmlformats.org/officeDocument/2006/relationships" xmlns:p="http://schemas.openxmlformats.org/presentationml/2006/main">
+  <p:cSld>
+    <p:spTree>
+      <p:nvGrpSpPr>
+        <p:cNvPr id="1" name=""/>
+        <p:cNvGrpSpPr/>
+        <p:nvPr/>
+      </p:nvGrpSpPr>
+      <p:grpSpPr>
+        <a:xfrm>
+          <a:off x="0" y="0"/>
+          <a:ext cx="0" cy="0"/>
+          <a:chOff x="0" y="0"/>
+          <a:chExt cx="0" cy="0"/>
+        </a:xfrm>
+      </p:grpSpPr>
+      <p:sp>
+        <p:nvSpPr>
+          <p:cNvPr id="6" name="Rectangle: Rounded Corners 5">
+            <a:extLst>
+              <a:ext uri="{FF2B5EF4-FFF2-40B4-BE49-F238E27FC236}">
+                <a16:creationId xmlns:a16="http://schemas.microsoft.com/office/drawing/2014/main" id="{4653E63D-8F6A-E5DD-9D0A-C4F90447E7BE}"/>
+              </a:ext>
+            </a:extLst>
+          </p:cNvPr>
+          <p:cNvSpPr/>
+          <p:nvPr/>
+        </p:nvSpPr>
+        <p:spPr>
+          <a:xfrm>
+            <a:off x="6866000" y="606031"/>
+            <a:ext cx="2536699" cy="2459736"/>
+          </a:xfrm>
+          <a:prstGeom prst="roundRect">
+            <a:avLst/>
+          </a:prstGeom>
+          <a:gradFill flip="none" rotWithShape="1">
+            <a:gsLst>
+              <a:gs pos="0">
+                <a:srgbClr val="3379B9">
+                  <a:shade val="30000"/>
+                  <a:satMod val="115000"/>
+                </a:srgbClr>
+              </a:gs>
+              <a:gs pos="50000">
+                <a:srgbClr val="3379B9">
+                  <a:shade val="67500"/>
+                  <a:satMod val="115000"/>
+                </a:srgbClr>
+              </a:gs>
+              <a:gs pos="100000">
+                <a:srgbClr val="3379B9">
+                  <a:shade val="100000"/>
+                  <a:satMod val="115000"/>
+                </a:srgbClr>
+              </a:gs>
+            </a:gsLst>
+            <a:lin ang="16200000" scaled="1"/>
+            <a:tileRect/>
+          </a:gradFill>
+          <a:effectLst>
+            <a:outerShdw blurRad="50800" dist="38100" dir="5400000" algn="t" rotWithShape="0">
+              <a:prstClr val="black">
+                <a:alpha val="40000"/>
+              </a:prstClr>
+            </a:outerShdw>
+          </a:effectLst>
+          <a:scene3d>
+            <a:camera prst="orthographicFront"/>
+            <a:lightRig rig="threePt" dir="t"/>
+          </a:scene3d>
+          <a:sp3d>
+            <a:bevelT/>
+          </a:sp3d>
+        </p:spPr>
+        <p:style>
+          <a:lnRef idx="2">
+            <a:schemeClr val="accent1">
+              <a:shade val="50000"/>
+            </a:schemeClr>
+          </a:lnRef>
+          <a:fillRef idx="1">
+            <a:schemeClr val="accent1"/>
+          </a:fillRef>
+          <a:effectRef idx="0">
+            <a:schemeClr val="accent1"/>
+          </a:effectRef>
+          <a:fontRef idx="minor">
+            <a:schemeClr val="lt1"/>
+          </a:fontRef>
+        </p:style>
+        <p:txBody>
+          <a:bodyPr rtlCol="0" anchor="ctr"/>
+          <a:lstStyle/>
+          <a:p>
+            <a:pPr algn="ctr"/>
+            <a:endParaRPr lang="en-US">
+              <a:latin typeface="Aptos Mono" panose="020B0009020202020204" pitchFamily="49" charset="0"/>
+            </a:endParaRPr>
+          </a:p>
+        </p:txBody>
+      </p:sp>
+      <p:sp>
+        <p:nvSpPr>
+          <p:cNvPr id="4" name="TextBox 3">
+            <a:extLst>
+              <a:ext uri="{FF2B5EF4-FFF2-40B4-BE49-F238E27FC236}">
+                <a16:creationId xmlns:a16="http://schemas.microsoft.com/office/drawing/2014/main" id="{88097F01-4F86-360B-9719-AF6F3B2262A4}"/>
+              </a:ext>
+            </a:extLst>
+          </p:cNvPr>
+          <p:cNvSpPr txBox="1"/>
+          <p:nvPr/>
+        </p:nvSpPr>
+        <p:spPr>
+          <a:xfrm>
+            <a:off x="7154050" y="609973"/>
+            <a:ext cx="981038" cy="1923604"/>
+          </a:xfrm>
+          <a:prstGeom prst="rect">
+            <a:avLst/>
+          </a:prstGeom>
+          <a:noFill/>
+        </p:spPr>
+        <p:txBody>
+          <a:bodyPr wrap="none" lIns="0" tIns="0" rIns="0" bIns="0" rtlCol="0">
+            <a:spAutoFit/>
+            <a:scene3d>
+              <a:camera prst="orthographicFront"/>
+              <a:lightRig rig="threePt" dir="t"/>
+            </a:scene3d>
+            <a:sp3d extrusionH="57150">
+              <a:bevelT w="38100" h="38100"/>
+            </a:sp3d>
+          </a:bodyPr>
+          <a:lstStyle/>
+          <a:p>
+            <a:r>
+              <a:rPr lang="en-US" sz="12500" b="1" dirty="0">
+                <a:solidFill>
+                  <a:schemeClr val="bg1"/>
+                </a:solidFill>
+                <a:effectLst>
+                  <a:outerShdw blurRad="50800" dist="38100" dir="2700000" algn="tl" rotWithShape="0">
+                    <a:prstClr val="black">
+                      <a:alpha val="40000"/>
+                    </a:prstClr>
+                  </a:outerShdw>
+                </a:effectLst>
+                <a:latin typeface="Tahoma" panose="020B0604030504040204" pitchFamily="34" charset="0"/>
+                <a:ea typeface="Tahoma" panose="020B0604030504040204" pitchFamily="34" charset="0"/>
+                <a:cs typeface="Tahoma" panose="020B0604030504040204" pitchFamily="34" charset="0"/>
+              </a:rPr>
+              <a:t>T</a:t>
+            </a:r>
+          </a:p>
+        </p:txBody>
+      </p:sp>
+      <p:sp>
+        <p:nvSpPr>
+          <p:cNvPr id="5" name="TextBox 4">
+            <a:extLst>
+              <a:ext uri="{FF2B5EF4-FFF2-40B4-BE49-F238E27FC236}">
+                <a16:creationId xmlns:a16="http://schemas.microsoft.com/office/drawing/2014/main" id="{026AFBD9-EFB0-2768-1BD3-E7A9EB6D469D}"/>
+              </a:ext>
+            </a:extLst>
+          </p:cNvPr>
+          <p:cNvSpPr txBox="1"/>
+          <p:nvPr/>
+        </p:nvSpPr>
+        <p:spPr>
+          <a:xfrm>
+            <a:off x="7807893" y="1064529"/>
+            <a:ext cx="1431482" cy="1923604"/>
+          </a:xfrm>
+          <a:prstGeom prst="rect">
+            <a:avLst/>
+          </a:prstGeom>
+          <a:noFill/>
+        </p:spPr>
+        <p:txBody>
+          <a:bodyPr wrap="none" lIns="0" tIns="0" rIns="0" bIns="0" rtlCol="0">
+            <a:spAutoFit/>
+            <a:scene3d>
+              <a:camera prst="orthographicFront"/>
+              <a:lightRig rig="threePt" dir="t"/>
+            </a:scene3d>
+            <a:sp3d extrusionH="57150">
+              <a:bevelT w="38100" h="38100"/>
+            </a:sp3d>
+          </a:bodyPr>
+          <a:lstStyle/>
+          <a:p>
+            <a:r>
+              <a:rPr lang="en-US" sz="12500" b="1" dirty="0">
+                <a:solidFill>
+                  <a:schemeClr val="bg1"/>
+                </a:solidFill>
+                <a:effectLst>
+                  <a:outerShdw blurRad="50800" dist="38100" dir="2700000" algn="tl" rotWithShape="0">
+                    <a:prstClr val="black">
+                      <a:alpha val="40000"/>
+                    </a:prstClr>
+                  </a:outerShdw>
+                </a:effectLst>
+                <a:latin typeface="Tahoma" panose="020B0604030504040204" pitchFamily="34" charset="0"/>
+                <a:ea typeface="Tahoma" panose="020B0604030504040204" pitchFamily="34" charset="0"/>
+                <a:cs typeface="Tahoma" panose="020B0604030504040204" pitchFamily="34" charset="0"/>
+              </a:rPr>
+              <a:t>M</a:t>
+            </a:r>
+          </a:p>
+        </p:txBody>
+      </p:sp>
+    </p:spTree>
+    <p:extLst>
+      <p:ext uri="{BB962C8B-B14F-4D97-AF65-F5344CB8AC3E}">
+        <p14:creationId xmlns:p14="http://schemas.microsoft.com/office/powerpoint/2010/main" val="2413351996"/>
+      </p:ext>
+    </p:extLst>
+  </p:cSld>
+  <p:clrMapOvr>
+    <a:masterClrMapping/>
+  </p:clrMapOvr>
+</p:sld>
+</file>
+
+<file path=ppt/slides/slide4.xml><?xml version="1.0" encoding="utf-8"?>
 <p:sld xmlns:a="http://schemas.openxmlformats.org/drawingml/2006/main" xmlns:r="http://schemas.openxmlformats.org/officeDocument/2006/relationships" xmlns:p="http://schemas.openxmlformats.org/presentationml/2006/main">
   <p:cSld>
     <p:spTree>
@@ -5731,7 +6782,7 @@
 </p:sld>
 </file>
 
-<file path=ppt/slides/slide4.xml><?xml version="1.0" encoding="utf-8"?>
+<file path=ppt/slides/slide5.xml><?xml version="1.0" encoding="utf-8"?>
 <p:sld xmlns:a="http://schemas.openxmlformats.org/drawingml/2006/main" xmlns:r="http://schemas.openxmlformats.org/officeDocument/2006/relationships" xmlns:p="http://schemas.openxmlformats.org/presentationml/2006/main">
   <p:cSld>
     <p:spTree>
@@ -5762,10 +6813,10 @@
         </p:nvGrpSpPr>
         <p:grpSpPr>
           <a:xfrm>
-            <a:off x="4048816" y="1742877"/>
-            <a:ext cx="4966259" cy="4130863"/>
-            <a:chOff x="4048816" y="1742877"/>
-            <a:chExt cx="4966259" cy="4130863"/>
+            <a:off x="4713932" y="1316573"/>
+            <a:ext cx="4065047" cy="4776158"/>
+            <a:chOff x="4713932" y="1316573"/>
+            <a:chExt cx="4065047" cy="4776158"/>
           </a:xfrm>
         </p:grpSpPr>
         <p:sp>
@@ -5782,12 +6833,15 @@
           </p:nvSpPr>
           <p:spPr>
             <a:xfrm rot="2700000">
-              <a:off x="3599189" y="4062193"/>
-              <a:ext cx="2544793" cy="1078302"/>
+              <a:off x="3458631" y="2991401"/>
+              <a:ext cx="4356631" cy="1846030"/>
             </a:xfrm>
             <a:prstGeom prst="ellipse">
               <a:avLst/>
             </a:prstGeom>
+            <a:solidFill>
+              <a:srgbClr val="507BC8"/>
+            </a:solidFill>
             <a:ln w="28575"/>
           </p:spPr>
           <p:style>
@@ -5829,14 +6883,16 @@
           </p:nvSpPr>
           <p:spPr>
             <a:xfrm rot="2700000">
-              <a:off x="5291879" y="499814"/>
-              <a:ext cx="2480133" cy="4966259"/>
+              <a:off x="5744061" y="761788"/>
+              <a:ext cx="2480133" cy="3589703"/>
             </a:xfrm>
             <a:prstGeom prst="upArrow">
               <a:avLst/>
             </a:prstGeom>
             <a:solidFill>
-              <a:srgbClr val="4380BD"/>
+              <a:schemeClr val="accent6">
+                <a:lumMod val="75000"/>
+              </a:schemeClr>
             </a:solidFill>
             <a:ln w="28575">
               <a:solidFill>
@@ -6066,7 +7122,7 @@
 </p:sld>
 </file>
 
-<file path=ppt/slides/slide5.xml><?xml version="1.0" encoding="utf-8"?>
+<file path=ppt/slides/slide6.xml><?xml version="1.0" encoding="utf-8"?>
 <p:sld xmlns:a="http://schemas.openxmlformats.org/drawingml/2006/main" xmlns:r="http://schemas.openxmlformats.org/officeDocument/2006/relationships" xmlns:p="http://schemas.openxmlformats.org/presentationml/2006/main">
   <p:cSld>
     <p:spTree>
@@ -6327,7 +7383,7 @@
 </p:sld>
 </file>
 
-<file path=ppt/slides/slide6.xml><?xml version="1.0" encoding="utf-8"?>
+<file path=ppt/slides/slide7.xml><?xml version="1.0" encoding="utf-8"?>
 <p:sld xmlns:a="http://schemas.openxmlformats.org/drawingml/2006/main" xmlns:r="http://schemas.openxmlformats.org/officeDocument/2006/relationships" xmlns:p="http://schemas.openxmlformats.org/presentationml/2006/main">
   <p:cSld>
     <p:spTree>
@@ -7685,7 +8741,7 @@
 </p:sld>
 </file>
 
-<file path=ppt/slides/slide7.xml><?xml version="1.0" encoding="utf-8"?>
+<file path=ppt/slides/slide8.xml><?xml version="1.0" encoding="utf-8"?>
 <p:sld xmlns:a="http://schemas.openxmlformats.org/drawingml/2006/main" xmlns:r="http://schemas.openxmlformats.org/officeDocument/2006/relationships" xmlns:p="http://schemas.openxmlformats.org/presentationml/2006/main">
   <p:cSld>
     <p:spTree>
@@ -8805,7 +9861,7 @@
 </p:sld>
 </file>
 
-<file path=ppt/slides/slide8.xml><?xml version="1.0" encoding="utf-8"?>
+<file path=ppt/slides/slide9.xml><?xml version="1.0" encoding="utf-8"?>
 <p:sld xmlns:a="http://schemas.openxmlformats.org/drawingml/2006/main" xmlns:r="http://schemas.openxmlformats.org/officeDocument/2006/relationships" xmlns:p="http://schemas.openxmlformats.org/presentationml/2006/main">
   <p:cSld>
     <p:spTree>

</xml_diff>

<commit_message>
Added NicsView. Added Hex Integer fields and IP4 Address fields to Hexulator. Organized imports. Added comments.
</commit_message>
<xml_diff>
--- a/icons/JUtilsIcons.pptx
+++ b/icons/JUtilsIcons.pptx
@@ -268,7 +268,7 @@
           <a:p>
             <a:fld id="{4B23F753-79FB-41FF-B056-5F6BF77DE748}" type="datetimeFigureOut">
               <a:rPr lang="en-US" smtClean="0"/>
-              <a:t>7/26/2024</a:t>
+              <a:t>11/2/2024</a:t>
             </a:fld>
             <a:endParaRPr lang="en-US"/>
           </a:p>
@@ -579,7 +579,7 @@
           <a:p>
             <a:fld id="{4B23F753-79FB-41FF-B056-5F6BF77DE748}" type="datetimeFigureOut">
               <a:rPr lang="en-US" smtClean="0"/>
-              <a:t>7/26/2024</a:t>
+              <a:t>11/2/2024</a:t>
             </a:fld>
             <a:endParaRPr lang="en-US"/>
           </a:p>
@@ -867,7 +867,7 @@
           <a:p>
             <a:fld id="{4B23F753-79FB-41FF-B056-5F6BF77DE748}" type="datetimeFigureOut">
               <a:rPr lang="en-US" smtClean="0"/>
-              <a:t>7/26/2024</a:t>
+              <a:t>11/2/2024</a:t>
             </a:fld>
             <a:endParaRPr lang="en-US"/>
           </a:p>
@@ -1065,7 +1065,7 @@
           <a:p>
             <a:fld id="{4B23F753-79FB-41FF-B056-5F6BF77DE748}" type="datetimeFigureOut">
               <a:rPr lang="en-US" smtClean="0"/>
-              <a:t>7/26/2024</a:t>
+              <a:t>11/2/2024</a:t>
             </a:fld>
             <a:endParaRPr lang="en-US"/>
           </a:p>
@@ -1273,7 +1273,7 @@
           <a:p>
             <a:fld id="{4B23F753-79FB-41FF-B056-5F6BF77DE748}" type="datetimeFigureOut">
               <a:rPr lang="en-US" smtClean="0"/>
-              <a:t>7/26/2024</a:t>
+              <a:t>11/2/2024</a:t>
             </a:fld>
             <a:endParaRPr lang="en-US"/>
           </a:p>
@@ -1471,7 +1471,7 @@
           <a:p>
             <a:fld id="{4B23F753-79FB-41FF-B056-5F6BF77DE748}" type="datetimeFigureOut">
               <a:rPr lang="en-US" smtClean="0"/>
-              <a:t>7/26/2024</a:t>
+              <a:t>11/2/2024</a:t>
             </a:fld>
             <a:endParaRPr lang="en-US"/>
           </a:p>
@@ -1746,7 +1746,7 @@
           <a:p>
             <a:fld id="{4B23F753-79FB-41FF-B056-5F6BF77DE748}" type="datetimeFigureOut">
               <a:rPr lang="en-US" smtClean="0"/>
-              <a:t>7/26/2024</a:t>
+              <a:t>11/2/2024</a:t>
             </a:fld>
             <a:endParaRPr lang="en-US"/>
           </a:p>
@@ -2011,7 +2011,7 @@
           <a:p>
             <a:fld id="{4B23F753-79FB-41FF-B056-5F6BF77DE748}" type="datetimeFigureOut">
               <a:rPr lang="en-US" smtClean="0"/>
-              <a:t>7/26/2024</a:t>
+              <a:t>11/2/2024</a:t>
             </a:fld>
             <a:endParaRPr lang="en-US"/>
           </a:p>
@@ -2423,7 +2423,7 @@
           <a:p>
             <a:fld id="{4B23F753-79FB-41FF-B056-5F6BF77DE748}" type="datetimeFigureOut">
               <a:rPr lang="en-US" smtClean="0"/>
-              <a:t>7/26/2024</a:t>
+              <a:t>11/2/2024</a:t>
             </a:fld>
             <a:endParaRPr lang="en-US"/>
           </a:p>
@@ -2564,7 +2564,7 @@
           <a:p>
             <a:fld id="{4B23F753-79FB-41FF-B056-5F6BF77DE748}" type="datetimeFigureOut">
               <a:rPr lang="en-US" smtClean="0"/>
-              <a:t>7/26/2024</a:t>
+              <a:t>11/2/2024</a:t>
             </a:fld>
             <a:endParaRPr lang="en-US"/>
           </a:p>
@@ -2677,7 +2677,7 @@
           <a:p>
             <a:fld id="{4B23F753-79FB-41FF-B056-5F6BF77DE748}" type="datetimeFigureOut">
               <a:rPr lang="en-US" smtClean="0"/>
-              <a:t>7/26/2024</a:t>
+              <a:t>11/2/2024</a:t>
             </a:fld>
             <a:endParaRPr lang="en-US"/>
           </a:p>
@@ -2790,7 +2790,7 @@
           <a:p>
             <a:fld id="{4B23F753-79FB-41FF-B056-5F6BF77DE748}" type="datetimeFigureOut">
               <a:rPr lang="en-US" smtClean="0"/>
-              <a:t>7/26/2024</a:t>
+              <a:t>11/2/2024</a:t>
             </a:fld>
             <a:endParaRPr lang="en-US"/>
           </a:p>
@@ -2969,7 +2969,7 @@
           <a:p>
             <a:fld id="{4B23F753-79FB-41FF-B056-5F6BF77DE748}" type="datetimeFigureOut">
               <a:rPr lang="en-US" smtClean="0"/>
-              <a:t>7/26/2024</a:t>
+              <a:t>11/2/2024</a:t>
             </a:fld>
             <a:endParaRPr lang="en-US"/>
           </a:p>
@@ -4602,7 +4602,7 @@
           <a:p>
             <a:fld id="{4B23F753-79FB-41FF-B056-5F6BF77DE748}" type="datetimeFigureOut">
               <a:rPr lang="en-US" smtClean="0"/>
-              <a:t>7/26/2024</a:t>
+              <a:t>11/2/2024</a:t>
             </a:fld>
             <a:endParaRPr lang="en-US"/>
           </a:p>
@@ -9342,7 +9342,7 @@
         </p:nvSpPr>
         <p:spPr>
           <a:xfrm>
-            <a:off x="4585088" y="3727846"/>
+            <a:off x="4585088" y="4023684"/>
             <a:ext cx="622705" cy="337968"/>
           </a:xfrm>
           <a:prstGeom prst="roundRect">
@@ -9394,8 +9394,8 @@
         </p:nvSpPr>
         <p:spPr>
           <a:xfrm>
-            <a:off x="4892269" y="3727846"/>
-            <a:ext cx="318294" cy="951310"/>
+            <a:off x="4892269" y="4023684"/>
+            <a:ext cx="318294" cy="566738"/>
           </a:xfrm>
           <a:prstGeom prst="roundRect">
             <a:avLst/>
@@ -9446,7 +9446,7 @@
         </p:nvSpPr>
         <p:spPr>
           <a:xfrm>
-            <a:off x="4892268" y="4374356"/>
+            <a:off x="4892268" y="4365384"/>
             <a:ext cx="910838" cy="305844"/>
           </a:xfrm>
           <a:prstGeom prst="roundRect">
@@ -9498,7 +9498,7 @@
         </p:nvSpPr>
         <p:spPr>
           <a:xfrm>
-            <a:off x="6434241" y="4370918"/>
+            <a:off x="6434241" y="4361946"/>
             <a:ext cx="910838" cy="305844"/>
           </a:xfrm>
           <a:prstGeom prst="roundRect">
@@ -9550,7 +9550,7 @@
         </p:nvSpPr>
         <p:spPr>
           <a:xfrm>
-            <a:off x="5514974" y="4694875"/>
+            <a:off x="5514974" y="4685903"/>
             <a:ext cx="1226346" cy="305844"/>
           </a:xfrm>
           <a:prstGeom prst="roundRect">
@@ -9602,7 +9602,7 @@
         </p:nvSpPr>
         <p:spPr>
           <a:xfrm>
-            <a:off x="5506632" y="4374356"/>
+            <a:off x="5506632" y="4365389"/>
             <a:ext cx="318294" cy="625139"/>
           </a:xfrm>
           <a:prstGeom prst="roundRect">
@@ -9654,8 +9654,8 @@
         </p:nvSpPr>
         <p:spPr>
           <a:xfrm>
-            <a:off x="6422231" y="4371975"/>
-            <a:ext cx="318294" cy="627520"/>
+            <a:off x="6422231" y="4380938"/>
+            <a:ext cx="318294" cy="566738"/>
           </a:xfrm>
           <a:prstGeom prst="roundRect">
             <a:avLst/>
@@ -9706,8 +9706,8 @@
         </p:nvSpPr>
         <p:spPr>
           <a:xfrm>
-            <a:off x="7035127" y="3725032"/>
-            <a:ext cx="318294" cy="951310"/>
+            <a:off x="7035127" y="4020870"/>
+            <a:ext cx="318294" cy="650358"/>
           </a:xfrm>
           <a:prstGeom prst="roundRect">
             <a:avLst/>
@@ -9758,7 +9758,7 @@
         </p:nvSpPr>
         <p:spPr>
           <a:xfrm>
-            <a:off x="7050411" y="3724719"/>
+            <a:off x="7050411" y="4020557"/>
             <a:ext cx="622705" cy="337968"/>
           </a:xfrm>
           <a:prstGeom prst="roundRect">

</xml_diff>